<commit_message>
change code and dnn ppt file
</commit_message>
<xml_diff>
--- a/dnn/dnn_hyunq.pptx
+++ b/dnn/dnn_hyunq.pptx
@@ -13894,8 +13894,8 @@
         </p:nvSpPr>
         <p:spPr>
           <a:xfrm>
-            <a:off x="992560" y="1052736"/>
-            <a:ext cx="8208912" cy="2031325"/>
+            <a:off x="396438" y="4221088"/>
+            <a:ext cx="5036823" cy="1708160"/>
           </a:xfrm>
           <a:prstGeom prst="rect">
             <a:avLst/>
@@ -13908,107 +13908,269 @@
           </a:bodyPr>
           <a:lstStyle/>
           <a:p>
-            <a:r>
-              <a:rPr lang="ko-KR" altLang="en-US" dirty="0" smtClean="0"/>
-              <a:t>모델의 검증</a:t>
-            </a:r>
-            <a:r>
-              <a:rPr lang="en-US" altLang="ko-KR" dirty="0" smtClean="0"/>
-              <a:t>:</a:t>
-            </a:r>
-          </a:p>
-          <a:p>
-            <a:r>
-              <a:rPr lang="en-US" altLang="ko-KR" dirty="0" smtClean="0"/>
-              <a:t>K-fold Cross Validation :  </a:t>
-            </a:r>
-            <a:r>
-              <a:rPr lang="ko-KR" altLang="en-US" dirty="0" smtClean="0"/>
-              <a:t>모델을 평가하는 한 가지 방법으로</a:t>
-            </a:r>
-            <a:r>
-              <a:rPr lang="en-US" altLang="ko-KR" dirty="0" smtClean="0"/>
+            <a:pPr>
+              <a:lnSpc>
+                <a:spcPct val="150000"/>
+              </a:lnSpc>
+            </a:pPr>
+            <a:r>
+              <a:rPr lang="ko-KR" altLang="en-US" dirty="0" smtClean="0">
+                <a:solidFill>
+                  <a:schemeClr val="tx1">
+                    <a:lumMod val="65000"/>
+                    <a:lumOff val="35000"/>
+                  </a:schemeClr>
+                </a:solidFill>
+              </a:rPr>
+              <a:t>전체 </a:t>
+            </a:r>
+            <a:r>
+              <a:rPr lang="ko-KR" altLang="en-US" dirty="0" smtClean="0">
+                <a:solidFill>
+                  <a:schemeClr val="tx1">
+                    <a:lumMod val="65000"/>
+                    <a:lumOff val="35000"/>
+                  </a:schemeClr>
+                </a:solidFill>
+              </a:rPr>
+              <a:t>데이터의 일부를 </a:t>
+            </a:r>
+            <a:r>
+              <a:rPr lang="en-US" altLang="ko-KR" dirty="0" smtClean="0">
+                <a:solidFill>
+                  <a:schemeClr val="tx1">
+                    <a:lumMod val="65000"/>
+                    <a:lumOff val="35000"/>
+                  </a:schemeClr>
+                </a:solidFill>
+              </a:rPr>
+              <a:t>validation set </a:t>
+            </a:r>
+            <a:r>
+              <a:rPr lang="ko-KR" altLang="en-US" dirty="0" smtClean="0">
+                <a:solidFill>
+                  <a:schemeClr val="tx1">
+                    <a:lumMod val="65000"/>
+                    <a:lumOff val="35000"/>
+                  </a:schemeClr>
+                </a:solidFill>
+              </a:rPr>
+              <a:t>으로</a:t>
+            </a:r>
+            <a:r>
+              <a:rPr lang="en-US" altLang="ko-KR" dirty="0" smtClean="0">
+                <a:solidFill>
+                  <a:schemeClr val="tx1">
+                    <a:lumMod val="65000"/>
+                    <a:lumOff val="35000"/>
+                  </a:schemeClr>
+                </a:solidFill>
+              </a:rPr>
+              <a:t> </a:t>
+            </a:r>
+            <a:r>
+              <a:rPr lang="ko-KR" altLang="en-US" dirty="0" smtClean="0">
+                <a:solidFill>
+                  <a:schemeClr val="tx1">
+                    <a:lumMod val="65000"/>
+                    <a:lumOff val="35000"/>
+                  </a:schemeClr>
+                </a:solidFill>
+              </a:rPr>
+              <a:t>사용해 모델 성능을 평가하는 경우</a:t>
+            </a:r>
+            <a:r>
+              <a:rPr lang="en-US" altLang="ko-KR" dirty="0" smtClean="0">
+                <a:solidFill>
+                  <a:schemeClr val="tx1">
+                    <a:lumMod val="65000"/>
+                    <a:lumOff val="35000"/>
+                  </a:schemeClr>
+                </a:solidFill>
+              </a:rPr>
               <a:t>, </a:t>
             </a:r>
-          </a:p>
-          <a:p>
-            <a:r>
-              <a:rPr lang="ko-KR" altLang="en-US" dirty="0" smtClean="0"/>
-              <a:t>전체 데이터의 일부를 </a:t>
-            </a:r>
-            <a:r>
-              <a:rPr lang="en-US" altLang="ko-KR" dirty="0" smtClean="0"/>
-              <a:t>validation set </a:t>
-            </a:r>
-            <a:r>
-              <a:rPr lang="ko-KR" altLang="en-US" dirty="0" smtClean="0"/>
-              <a:t>으로</a:t>
-            </a:r>
-            <a:r>
-              <a:rPr lang="en-US" altLang="ko-KR" dirty="0" smtClean="0"/>
+            <a:r>
+              <a:rPr lang="ko-KR" altLang="en-US" dirty="0" err="1" smtClean="0">
+                <a:solidFill>
+                  <a:schemeClr val="tx1">
+                    <a:lumMod val="65000"/>
+                    <a:lumOff val="35000"/>
+                  </a:schemeClr>
+                </a:solidFill>
+              </a:rPr>
+              <a:t>데이터셋의</a:t>
+            </a:r>
+            <a:r>
+              <a:rPr lang="ko-KR" altLang="en-US" dirty="0" smtClean="0">
+                <a:solidFill>
+                  <a:schemeClr val="tx1">
+                    <a:lumMod val="65000"/>
+                    <a:lumOff val="35000"/>
+                  </a:schemeClr>
+                </a:solidFill>
+              </a:rPr>
               <a:t> </a:t>
             </a:r>
             <a:r>
-              <a:rPr lang="ko-KR" altLang="en-US" dirty="0" smtClean="0"/>
-              <a:t>사용해 모델 성능을 평가하는 경우</a:t>
-            </a:r>
-            <a:r>
-              <a:rPr lang="en-US" altLang="ko-KR" dirty="0" smtClean="0"/>
-              <a:t>, </a:t>
-            </a:r>
-            <a:r>
-              <a:rPr lang="ko-KR" altLang="en-US" dirty="0" err="1" smtClean="0"/>
-              <a:t>데이터셋의</a:t>
-            </a:r>
-            <a:r>
-              <a:rPr lang="ko-KR" altLang="en-US" dirty="0" smtClean="0"/>
-              <a:t> 크기가 작은 경우 </a:t>
-            </a:r>
-            <a:r>
-              <a:rPr lang="ko-KR" altLang="en-US" dirty="0" err="1" smtClean="0"/>
-              <a:t>테스트셋에</a:t>
-            </a:r>
-            <a:r>
-              <a:rPr lang="ko-KR" altLang="en-US" dirty="0" smtClean="0"/>
-              <a:t> 대한 성능 평가의 신뢰성이 떨어지게 된다</a:t>
-            </a:r>
-            <a:r>
-              <a:rPr lang="en-US" altLang="ko-KR" dirty="0" smtClean="0"/>
+              <a:rPr lang="ko-KR" altLang="en-US" dirty="0" smtClean="0">
+                <a:solidFill>
+                  <a:schemeClr val="tx1">
+                    <a:lumMod val="65000"/>
+                    <a:lumOff val="35000"/>
+                  </a:schemeClr>
+                </a:solidFill>
+              </a:rPr>
+              <a:t>크기가 </a:t>
+            </a:r>
+            <a:r>
+              <a:rPr lang="ko-KR" altLang="en-US" dirty="0" err="1" smtClean="0">
+                <a:solidFill>
+                  <a:schemeClr val="tx1">
+                    <a:lumMod val="65000"/>
+                    <a:lumOff val="35000"/>
+                  </a:schemeClr>
+                </a:solidFill>
+              </a:rPr>
+              <a:t>작을때</a:t>
+            </a:r>
+            <a:r>
+              <a:rPr lang="ko-KR" altLang="en-US" dirty="0" smtClean="0">
+                <a:solidFill>
+                  <a:schemeClr val="tx1">
+                    <a:lumMod val="65000"/>
+                    <a:lumOff val="35000"/>
+                  </a:schemeClr>
+                </a:solidFill>
+              </a:rPr>
+              <a:t> 성능 </a:t>
+            </a:r>
+            <a:r>
+              <a:rPr lang="ko-KR" altLang="en-US" dirty="0" smtClean="0">
+                <a:solidFill>
+                  <a:schemeClr val="tx1">
+                    <a:lumMod val="65000"/>
+                    <a:lumOff val="35000"/>
+                  </a:schemeClr>
+                </a:solidFill>
+              </a:rPr>
+              <a:t>평가의 신뢰성이 </a:t>
+            </a:r>
+            <a:r>
+              <a:rPr lang="ko-KR" altLang="en-US" dirty="0" smtClean="0">
+                <a:solidFill>
+                  <a:schemeClr val="tx1">
+                    <a:lumMod val="65000"/>
+                    <a:lumOff val="35000"/>
+                  </a:schemeClr>
+                </a:solidFill>
+              </a:rPr>
+              <a:t>떨어지는 문제를 해결하기 위해 고안된 방법</a:t>
+            </a:r>
+            <a:r>
+              <a:rPr lang="en-US" altLang="ko-KR" dirty="0">
+                <a:solidFill>
+                  <a:schemeClr val="tx1">
+                    <a:lumMod val="65000"/>
+                    <a:lumOff val="35000"/>
+                  </a:schemeClr>
+                </a:solidFill>
+              </a:rPr>
+              <a:t> </a:t>
+            </a:r>
+            <a:endParaRPr lang="en-US" altLang="ko-KR" dirty="0" smtClean="0">
+              <a:solidFill>
+                <a:schemeClr val="tx1">
+                  <a:lumMod val="65000"/>
+                  <a:lumOff val="35000"/>
+                </a:schemeClr>
+              </a:solidFill>
+            </a:endParaRPr>
+          </a:p>
+          <a:p>
+            <a:pPr>
+              <a:lnSpc>
+                <a:spcPct val="150000"/>
+              </a:lnSpc>
+            </a:pPr>
+            <a:r>
+              <a:rPr lang="en-US" altLang="ko-KR" dirty="0" smtClean="0">
+                <a:solidFill>
+                  <a:schemeClr val="tx1">
+                    <a:lumMod val="65000"/>
+                    <a:lumOff val="35000"/>
+                  </a:schemeClr>
+                </a:solidFill>
+              </a:rPr>
+              <a:t>(</a:t>
+            </a:r>
+            <a:r>
+              <a:rPr lang="ko-KR" altLang="en-US" dirty="0" smtClean="0">
+                <a:solidFill>
+                  <a:schemeClr val="tx1">
+                    <a:lumMod val="65000"/>
+                    <a:lumOff val="35000"/>
+                  </a:schemeClr>
+                </a:solidFill>
+              </a:rPr>
+              <a:t>모든 </a:t>
+            </a:r>
+            <a:r>
+              <a:rPr lang="ko-KR" altLang="en-US" dirty="0" smtClean="0">
+                <a:solidFill>
+                  <a:schemeClr val="tx1">
+                    <a:lumMod val="65000"/>
+                    <a:lumOff val="35000"/>
+                  </a:schemeClr>
+                </a:solidFill>
+              </a:rPr>
+              <a:t>데이터가 최소 한 번은 테스트셋으로 쓰이도록 한다</a:t>
+            </a:r>
+            <a:r>
+              <a:rPr lang="en-US" altLang="ko-KR" dirty="0" smtClean="0">
+                <a:solidFill>
+                  <a:schemeClr val="tx1">
+                    <a:lumMod val="65000"/>
+                    <a:lumOff val="35000"/>
+                  </a:schemeClr>
+                </a:solidFill>
+              </a:rPr>
               <a:t>. </a:t>
             </a:r>
-          </a:p>
-          <a:p>
-            <a:endParaRPr lang="en-US" altLang="ko-KR" dirty="0"/>
-          </a:p>
-          <a:p>
-            <a:r>
-              <a:rPr lang="ko-KR" altLang="en-US" dirty="0" smtClean="0"/>
-              <a:t>이를 해결하기 위해 </a:t>
-            </a:r>
-            <a:r>
-              <a:rPr lang="en-US" altLang="ko-KR" dirty="0" smtClean="0"/>
-              <a:t>K-fold Cross Validation</a:t>
-            </a:r>
-            <a:r>
-              <a:rPr lang="ko-KR" altLang="en-US" dirty="0" smtClean="0"/>
-              <a:t>은 모든 데이터가 최소 한 번은 테스트셋으로 쓰이도록 한다</a:t>
-            </a:r>
-            <a:r>
-              <a:rPr lang="en-US" altLang="ko-KR" dirty="0" smtClean="0"/>
-              <a:t>. </a:t>
-            </a:r>
-          </a:p>
-          <a:p>
-            <a:endParaRPr lang="en-US" altLang="ko-KR" dirty="0"/>
-          </a:p>
-          <a:p>
-            <a:r>
-              <a:rPr lang="en-US" altLang="ko-KR" dirty="0">
-                <a:hlinkClick r:id="rId2"/>
-              </a:rPr>
-              <a:t>https://3months.tistory.com/321</a:t>
-            </a:r>
-            <a:endParaRPr lang="en-US" altLang="ko-KR" dirty="0" smtClean="0"/>
+            <a:r>
+              <a:rPr lang="en-US" altLang="ko-KR" dirty="0" smtClean="0">
+                <a:solidFill>
+                  <a:schemeClr val="tx1">
+                    <a:lumMod val="65000"/>
+                    <a:lumOff val="35000"/>
+                  </a:schemeClr>
+                </a:solidFill>
+              </a:rPr>
+              <a:t>)</a:t>
+            </a:r>
+            <a:endParaRPr lang="en-US" altLang="ko-KR" dirty="0" smtClean="0">
+              <a:solidFill>
+                <a:schemeClr val="tx1">
+                  <a:lumMod val="65000"/>
+                  <a:lumOff val="35000"/>
+                </a:schemeClr>
+              </a:solidFill>
+            </a:endParaRPr>
+          </a:p>
+          <a:p>
+            <a:pPr>
+              <a:lnSpc>
+                <a:spcPct val="150000"/>
+              </a:lnSpc>
+            </a:pPr>
+            <a:endParaRPr lang="en-US" altLang="ko-KR" dirty="0">
+              <a:solidFill>
+                <a:schemeClr val="tx1">
+                  <a:lumMod val="65000"/>
+                  <a:lumOff val="35000"/>
+                </a:schemeClr>
+              </a:solidFill>
+            </a:endParaRPr>
           </a:p>
         </p:txBody>
       </p:sp>
@@ -14021,21 +14183,545 @@
           <p:nvPr/>
         </p:nvPicPr>
         <p:blipFill>
-          <a:blip r:embed="rId3"/>
+          <a:blip r:embed="rId2"/>
           <a:stretch>
             <a:fillRect/>
           </a:stretch>
         </p:blipFill>
         <p:spPr>
           <a:xfrm>
-            <a:off x="3224808" y="3124016"/>
-            <a:ext cx="4675909" cy="3597459"/>
+            <a:off x="5505903" y="3192878"/>
+            <a:ext cx="3864387" cy="2973106"/>
           </a:xfrm>
           <a:prstGeom prst="rect">
             <a:avLst/>
           </a:prstGeom>
         </p:spPr>
       </p:pic>
+      <p:sp>
+        <p:nvSpPr>
+          <p:cNvPr id="7" name="Rectangle 2"/>
+          <p:cNvSpPr txBox="1">
+            <a:spLocks noChangeArrowheads="1"/>
+          </p:cNvSpPr>
+          <p:nvPr/>
+        </p:nvSpPr>
+        <p:spPr bwMode="auto">
+          <a:xfrm>
+            <a:off x="128463" y="201122"/>
+            <a:ext cx="6867649" cy="400110"/>
+          </a:xfrm>
+          <a:prstGeom prst="rect">
+            <a:avLst/>
+          </a:prstGeom>
+          <a:noFill/>
+          <a:ln>
+            <a:noFill/>
+          </a:ln>
+          <a:extLst>
+            <a:ext uri="{909E8E84-426E-40DD-AFC4-6F175D3DCCD1}">
+              <a14:hiddenFill xmlns:a14="http://schemas.microsoft.com/office/drawing/2010/main">
+                <a:solidFill>
+                  <a:srgbClr val="FFFFFF"/>
+                </a:solidFill>
+              </a14:hiddenFill>
+            </a:ext>
+            <a:ext uri="{91240B29-F687-4F45-9708-019B960494DF}">
+              <a14:hiddenLine xmlns:a14="http://schemas.microsoft.com/office/drawing/2010/main" w="9525">
+                <a:solidFill>
+                  <a:srgbClr val="000000"/>
+                </a:solidFill>
+                <a:miter lim="800000"/>
+                <a:headEnd/>
+                <a:tailEnd/>
+              </a14:hiddenLine>
+            </a:ext>
+          </a:extLst>
+        </p:spPr>
+        <p:txBody>
+          <a:bodyPr wrap="square">
+            <a:spAutoFit/>
+          </a:bodyPr>
+          <a:lstStyle>
+            <a:lvl1pPr latinLnBrk="1">
+              <a:defRPr kumimoji="1" sz="1200" b="1">
+                <a:solidFill>
+                  <a:schemeClr val="tx1"/>
+                </a:solidFill>
+                <a:latin typeface="돋움" pitchFamily="50" charset="-127"/>
+                <a:ea typeface="굴림" charset="-127"/>
+              </a:defRPr>
+            </a:lvl1pPr>
+            <a:lvl2pPr marL="742950" indent="-285750" latinLnBrk="1">
+              <a:defRPr kumimoji="1" sz="1200" b="1">
+                <a:solidFill>
+                  <a:schemeClr val="tx1"/>
+                </a:solidFill>
+                <a:latin typeface="돋움" pitchFamily="50" charset="-127"/>
+                <a:ea typeface="굴림" charset="-127"/>
+              </a:defRPr>
+            </a:lvl2pPr>
+            <a:lvl3pPr marL="1143000" indent="-228600" latinLnBrk="1">
+              <a:defRPr kumimoji="1" sz="1200" b="1">
+                <a:solidFill>
+                  <a:schemeClr val="tx1"/>
+                </a:solidFill>
+                <a:latin typeface="돋움" pitchFamily="50" charset="-127"/>
+                <a:ea typeface="굴림" charset="-127"/>
+              </a:defRPr>
+            </a:lvl3pPr>
+            <a:lvl4pPr marL="1600200" indent="-228600" latinLnBrk="1">
+              <a:defRPr kumimoji="1" sz="1200" b="1">
+                <a:solidFill>
+                  <a:schemeClr val="tx1"/>
+                </a:solidFill>
+                <a:latin typeface="돋움" pitchFamily="50" charset="-127"/>
+                <a:ea typeface="굴림" charset="-127"/>
+              </a:defRPr>
+            </a:lvl4pPr>
+            <a:lvl5pPr marL="2057400" indent="-228600" latinLnBrk="1">
+              <a:defRPr kumimoji="1" sz="1200" b="1">
+                <a:solidFill>
+                  <a:schemeClr val="tx1"/>
+                </a:solidFill>
+                <a:latin typeface="돋움" pitchFamily="50" charset="-127"/>
+                <a:ea typeface="굴림" charset="-127"/>
+              </a:defRPr>
+            </a:lvl5pPr>
+            <a:lvl6pPr marL="2514600" indent="-228600" eaLnBrk="0" fontAlgn="base" hangingPunct="0">
+              <a:spcBef>
+                <a:spcPct val="0"/>
+              </a:spcBef>
+              <a:spcAft>
+                <a:spcPct val="0"/>
+              </a:spcAft>
+              <a:defRPr kumimoji="1" sz="1200" b="1">
+                <a:solidFill>
+                  <a:schemeClr val="tx1"/>
+                </a:solidFill>
+                <a:latin typeface="돋움" pitchFamily="50" charset="-127"/>
+                <a:ea typeface="굴림" charset="-127"/>
+              </a:defRPr>
+            </a:lvl6pPr>
+            <a:lvl7pPr marL="2971800" indent="-228600" eaLnBrk="0" fontAlgn="base" hangingPunct="0">
+              <a:spcBef>
+                <a:spcPct val="0"/>
+              </a:spcBef>
+              <a:spcAft>
+                <a:spcPct val="0"/>
+              </a:spcAft>
+              <a:defRPr kumimoji="1" sz="1200" b="1">
+                <a:solidFill>
+                  <a:schemeClr val="tx1"/>
+                </a:solidFill>
+                <a:latin typeface="돋움" pitchFamily="50" charset="-127"/>
+                <a:ea typeface="굴림" charset="-127"/>
+              </a:defRPr>
+            </a:lvl7pPr>
+            <a:lvl8pPr marL="3429000" indent="-228600" eaLnBrk="0" fontAlgn="base" hangingPunct="0">
+              <a:spcBef>
+                <a:spcPct val="0"/>
+              </a:spcBef>
+              <a:spcAft>
+                <a:spcPct val="0"/>
+              </a:spcAft>
+              <a:defRPr kumimoji="1" sz="1200" b="1">
+                <a:solidFill>
+                  <a:schemeClr val="tx1"/>
+                </a:solidFill>
+                <a:latin typeface="돋움" pitchFamily="50" charset="-127"/>
+                <a:ea typeface="굴림" charset="-127"/>
+              </a:defRPr>
+            </a:lvl8pPr>
+            <a:lvl9pPr marL="3886200" indent="-228600" eaLnBrk="0" fontAlgn="base" hangingPunct="0">
+              <a:spcBef>
+                <a:spcPct val="0"/>
+              </a:spcBef>
+              <a:spcAft>
+                <a:spcPct val="0"/>
+              </a:spcAft>
+              <a:defRPr kumimoji="1" sz="1200" b="1">
+                <a:solidFill>
+                  <a:schemeClr val="tx1"/>
+                </a:solidFill>
+                <a:latin typeface="돋움" pitchFamily="50" charset="-127"/>
+                <a:ea typeface="굴림" charset="-127"/>
+              </a:defRPr>
+            </a:lvl9pPr>
+          </a:lstStyle>
+          <a:p>
+            <a:pPr eaLnBrk="1" hangingPunct="1"/>
+            <a:r>
+              <a:rPr lang="en-US" altLang="ko-KR" sz="2000" dirty="0" smtClean="0">
+                <a:solidFill>
+                  <a:schemeClr val="bg1"/>
+                </a:solidFill>
+                <a:latin typeface="+mj-ea"/>
+                <a:ea typeface="+mj-ea"/>
+                <a:sym typeface="Wingdings" pitchFamily="2" charset="2"/>
+              </a:rPr>
+              <a:t> </a:t>
+            </a:r>
+            <a:r>
+              <a:rPr lang="ko-KR" altLang="en-US" sz="2000" dirty="0" smtClean="0">
+                <a:solidFill>
+                  <a:schemeClr val="bg1"/>
+                </a:solidFill>
+                <a:latin typeface="+mj-ea"/>
+                <a:ea typeface="+mj-ea"/>
+                <a:sym typeface="Wingdings" pitchFamily="2" charset="2"/>
+              </a:rPr>
+              <a:t>모델</a:t>
+            </a:r>
+            <a:r>
+              <a:rPr lang="en-US" altLang="ko-KR" sz="2000" dirty="0">
+                <a:solidFill>
+                  <a:schemeClr val="bg1"/>
+                </a:solidFill>
+                <a:latin typeface="+mj-ea"/>
+                <a:ea typeface="+mj-ea"/>
+                <a:sym typeface="Wingdings" pitchFamily="2" charset="2"/>
+              </a:rPr>
+              <a:t> </a:t>
+            </a:r>
+            <a:r>
+              <a:rPr lang="ko-KR" altLang="en-US" sz="2000" dirty="0" smtClean="0">
+                <a:solidFill>
+                  <a:schemeClr val="bg1"/>
+                </a:solidFill>
+                <a:latin typeface="+mj-ea"/>
+                <a:ea typeface="+mj-ea"/>
+                <a:sym typeface="Wingdings" pitchFamily="2" charset="2"/>
+              </a:rPr>
+              <a:t>평가</a:t>
+            </a:r>
+            <a:endParaRPr lang="en-US" altLang="ko-KR" sz="2000" dirty="0">
+              <a:solidFill>
+                <a:schemeClr val="bg1"/>
+              </a:solidFill>
+              <a:latin typeface="+mj-ea"/>
+              <a:ea typeface="+mj-ea"/>
+              <a:sym typeface="Wingdings" pitchFamily="2" charset="2"/>
+            </a:endParaRPr>
+          </a:p>
+        </p:txBody>
+      </p:sp>
+      <p:sp>
+        <p:nvSpPr>
+          <p:cNvPr id="2" name="직사각형 1"/>
+          <p:cNvSpPr/>
+          <p:nvPr/>
+        </p:nvSpPr>
+        <p:spPr>
+          <a:xfrm>
+            <a:off x="-87560" y="6957392"/>
+            <a:ext cx="2879314" cy="307777"/>
+          </a:xfrm>
+          <a:prstGeom prst="rect">
+            <a:avLst/>
+          </a:prstGeom>
+        </p:spPr>
+        <p:txBody>
+          <a:bodyPr wrap="none">
+            <a:spAutoFit/>
+          </a:bodyPr>
+          <a:lstStyle/>
+          <a:p>
+            <a:r>
+              <a:rPr lang="en-US" altLang="ko-KR" dirty="0">
+                <a:hlinkClick r:id="rId3"/>
+              </a:rPr>
+              <a:t>https://3months.tistory.com/321</a:t>
+            </a:r>
+            <a:endParaRPr lang="en-US" altLang="ko-KR" dirty="0"/>
+          </a:p>
+        </p:txBody>
+      </p:sp>
+      <p:sp>
+        <p:nvSpPr>
+          <p:cNvPr id="3" name="직사각형 2"/>
+          <p:cNvSpPr/>
+          <p:nvPr/>
+        </p:nvSpPr>
+        <p:spPr>
+          <a:xfrm>
+            <a:off x="396438" y="936011"/>
+            <a:ext cx="3796167" cy="338554"/>
+          </a:xfrm>
+          <a:prstGeom prst="rect">
+            <a:avLst/>
+          </a:prstGeom>
+        </p:spPr>
+        <p:txBody>
+          <a:bodyPr wrap="none">
+            <a:spAutoFit/>
+          </a:bodyPr>
+          <a:lstStyle/>
+          <a:p>
+            <a:r>
+              <a:rPr lang="en-US" altLang="ko-KR" sz="1600" dirty="0" smtClean="0">
+                <a:solidFill>
+                  <a:srgbClr val="222222"/>
+                </a:solidFill>
+                <a:latin typeface="+mj-ea"/>
+                <a:ea typeface="+mj-ea"/>
+              </a:rPr>
+              <a:t>Use a Automatic Verification Dataset</a:t>
+            </a:r>
+            <a:endParaRPr lang="en-US" altLang="ko-KR" sz="1600" dirty="0">
+              <a:solidFill>
+                <a:srgbClr val="222222"/>
+              </a:solidFill>
+              <a:latin typeface="+mj-ea"/>
+              <a:ea typeface="+mj-ea"/>
+            </a:endParaRPr>
+          </a:p>
+        </p:txBody>
+      </p:sp>
+      <p:sp>
+        <p:nvSpPr>
+          <p:cNvPr id="8" name="직사각형 7"/>
+          <p:cNvSpPr/>
+          <p:nvPr/>
+        </p:nvSpPr>
+        <p:spPr>
+          <a:xfrm>
+            <a:off x="396438" y="1940896"/>
+            <a:ext cx="3514937" cy="338554"/>
+          </a:xfrm>
+          <a:prstGeom prst="rect">
+            <a:avLst/>
+          </a:prstGeom>
+        </p:spPr>
+        <p:txBody>
+          <a:bodyPr wrap="none">
+            <a:spAutoFit/>
+          </a:bodyPr>
+          <a:lstStyle/>
+          <a:p>
+            <a:r>
+              <a:rPr lang="en-US" altLang="ko-KR" sz="1600" dirty="0" smtClean="0">
+                <a:solidFill>
+                  <a:srgbClr val="222222"/>
+                </a:solidFill>
+                <a:latin typeface="+mj-ea"/>
+                <a:ea typeface="+mj-ea"/>
+              </a:rPr>
+              <a:t>Use a Manual Verification Dataset</a:t>
+            </a:r>
+            <a:endParaRPr lang="en-US" altLang="ko-KR" sz="1600" dirty="0">
+              <a:solidFill>
+                <a:srgbClr val="222222"/>
+              </a:solidFill>
+              <a:latin typeface="+mj-ea"/>
+              <a:ea typeface="+mj-ea"/>
+            </a:endParaRPr>
+          </a:p>
+        </p:txBody>
+      </p:sp>
+      <p:sp>
+        <p:nvSpPr>
+          <p:cNvPr id="9" name="직사각형 8"/>
+          <p:cNvSpPr/>
+          <p:nvPr/>
+        </p:nvSpPr>
+        <p:spPr>
+          <a:xfrm>
+            <a:off x="396438" y="3789040"/>
+            <a:ext cx="2432333" cy="338554"/>
+          </a:xfrm>
+          <a:prstGeom prst="rect">
+            <a:avLst/>
+          </a:prstGeom>
+        </p:spPr>
+        <p:txBody>
+          <a:bodyPr wrap="none">
+            <a:spAutoFit/>
+          </a:bodyPr>
+          <a:lstStyle/>
+          <a:p>
+            <a:r>
+              <a:rPr lang="en-US" altLang="ko-KR" sz="1600" dirty="0">
+                <a:solidFill>
+                  <a:srgbClr val="222222"/>
+                </a:solidFill>
+                <a:latin typeface="+mj-ea"/>
+                <a:ea typeface="+mj-ea"/>
+              </a:rPr>
+              <a:t>k-Fold Cross Validation</a:t>
+            </a:r>
+          </a:p>
+        </p:txBody>
+      </p:sp>
+      <p:grpSp>
+        <p:nvGrpSpPr>
+          <p:cNvPr id="15" name="그룹 14"/>
+          <p:cNvGrpSpPr/>
+          <p:nvPr/>
+        </p:nvGrpSpPr>
+        <p:grpSpPr>
+          <a:xfrm>
+            <a:off x="2792760" y="1340768"/>
+            <a:ext cx="5229225" cy="533400"/>
+            <a:chOff x="3995738" y="1488293"/>
+            <a:chExt cx="5229225" cy="533400"/>
+          </a:xfrm>
+        </p:grpSpPr>
+        <p:pic>
+          <p:nvPicPr>
+            <p:cNvPr id="11" name="그림 10"/>
+            <p:cNvPicPr>
+              <a:picLocks noChangeAspect="1"/>
+            </p:cNvPicPr>
+            <p:nvPr/>
+          </p:nvPicPr>
+          <p:blipFill>
+            <a:blip r:embed="rId4"/>
+            <a:stretch>
+              <a:fillRect/>
+            </a:stretch>
+          </p:blipFill>
+          <p:spPr>
+            <a:xfrm>
+              <a:off x="3995738" y="1488293"/>
+              <a:ext cx="5229225" cy="533400"/>
+            </a:xfrm>
+            <a:prstGeom prst="rect">
+              <a:avLst/>
+            </a:prstGeom>
+          </p:spPr>
+        </p:pic>
+        <p:sp>
+          <p:nvSpPr>
+            <p:cNvPr id="13" name="직사각형 12"/>
+            <p:cNvSpPr/>
+            <p:nvPr/>
+          </p:nvSpPr>
+          <p:spPr>
+            <a:xfrm>
+              <a:off x="5169024" y="1537047"/>
+              <a:ext cx="1827088" cy="484646"/>
+            </a:xfrm>
+            <a:prstGeom prst="rect">
+              <a:avLst/>
+            </a:prstGeom>
+            <a:noFill/>
+            <a:ln w="25400">
+              <a:solidFill>
+                <a:srgbClr val="FF0000"/>
+              </a:solidFill>
+            </a:ln>
+          </p:spPr>
+          <p:style>
+            <a:lnRef idx="2">
+              <a:schemeClr val="accent1">
+                <a:shade val="50000"/>
+              </a:schemeClr>
+            </a:lnRef>
+            <a:fillRef idx="1">
+              <a:schemeClr val="accent1"/>
+            </a:fillRef>
+            <a:effectRef idx="0">
+              <a:schemeClr val="accent1"/>
+            </a:effectRef>
+            <a:fontRef idx="minor">
+              <a:schemeClr val="lt1"/>
+            </a:fontRef>
+          </p:style>
+          <p:txBody>
+            <a:bodyPr rtlCol="0" anchor="ctr"/>
+            <a:lstStyle/>
+            <a:p>
+              <a:pPr algn="ctr"/>
+              <a:endParaRPr lang="ko-KR" altLang="en-US"/>
+            </a:p>
+          </p:txBody>
+        </p:sp>
+      </p:grpSp>
+      <p:grpSp>
+        <p:nvGrpSpPr>
+          <p:cNvPr id="16" name="그룹 15"/>
+          <p:cNvGrpSpPr/>
+          <p:nvPr/>
+        </p:nvGrpSpPr>
+        <p:grpSpPr>
+          <a:xfrm>
+            <a:off x="2751117" y="2429501"/>
+            <a:ext cx="5246881" cy="514658"/>
+            <a:chOff x="4016896" y="2122254"/>
+            <a:chExt cx="5246881" cy="514658"/>
+          </a:xfrm>
+        </p:grpSpPr>
+        <p:pic>
+          <p:nvPicPr>
+            <p:cNvPr id="12" name="그림 11"/>
+            <p:cNvPicPr>
+              <a:picLocks noChangeAspect="1"/>
+            </p:cNvPicPr>
+            <p:nvPr/>
+          </p:nvPicPr>
+          <p:blipFill rotWithShape="1">
+            <a:blip r:embed="rId5"/>
+            <a:srcRect r="24229" b="-1576"/>
+            <a:stretch/>
+          </p:blipFill>
+          <p:spPr>
+            <a:xfrm>
+              <a:off x="4016896" y="2182181"/>
+              <a:ext cx="5246881" cy="454731"/>
+            </a:xfrm>
+            <a:prstGeom prst="rect">
+              <a:avLst/>
+            </a:prstGeom>
+          </p:spPr>
+        </p:pic>
+        <p:sp>
+          <p:nvSpPr>
+            <p:cNvPr id="14" name="직사각형 13"/>
+            <p:cNvSpPr/>
+            <p:nvPr/>
+          </p:nvSpPr>
+          <p:spPr>
+            <a:xfrm>
+              <a:off x="6167433" y="2122254"/>
+              <a:ext cx="2520280" cy="484646"/>
+            </a:xfrm>
+            <a:prstGeom prst="rect">
+              <a:avLst/>
+            </a:prstGeom>
+            <a:noFill/>
+            <a:ln w="25400">
+              <a:solidFill>
+                <a:srgbClr val="FF0000"/>
+              </a:solidFill>
+            </a:ln>
+          </p:spPr>
+          <p:style>
+            <a:lnRef idx="2">
+              <a:schemeClr val="accent1">
+                <a:shade val="50000"/>
+              </a:schemeClr>
+            </a:lnRef>
+            <a:fillRef idx="1">
+              <a:schemeClr val="accent1"/>
+            </a:fillRef>
+            <a:effectRef idx="0">
+              <a:schemeClr val="accent1"/>
+            </a:effectRef>
+            <a:fontRef idx="minor">
+              <a:schemeClr val="lt1"/>
+            </a:fontRef>
+          </p:style>
+          <p:txBody>
+            <a:bodyPr rtlCol="0" anchor="ctr"/>
+            <a:lstStyle/>
+            <a:p>
+              <a:pPr algn="ctr"/>
+              <a:endParaRPr lang="ko-KR" altLang="en-US"/>
+            </a:p>
+          </p:txBody>
+        </p:sp>
+      </p:grpSp>
     </p:spTree>
     <p:extLst>
       <p:ext uri="{BB962C8B-B14F-4D97-AF65-F5344CB8AC3E}">

</xml_diff>

<commit_message>
add dnn batch size test file
</commit_message>
<xml_diff>
--- a/dnn/dnn_hyunq.pptx
+++ b/dnn/dnn_hyunq.pptx
@@ -9,10 +9,10 @@
     <p:sldMasterId id="2147484183" r:id="rId5"/>
   </p:sldMasterIdLst>
   <p:notesMasterIdLst>
-    <p:notesMasterId r:id="rId24"/>
+    <p:notesMasterId r:id="rId25"/>
   </p:notesMasterIdLst>
   <p:handoutMasterIdLst>
-    <p:handoutMasterId r:id="rId25"/>
+    <p:handoutMasterId r:id="rId26"/>
   </p:handoutMasterIdLst>
   <p:sldIdLst>
     <p:sldId id="1214" r:id="rId6"/>
@@ -30,17 +30,18 @@
     <p:sldId id="1304" r:id="rId18"/>
     <p:sldId id="1297" r:id="rId19"/>
     <p:sldId id="1305" r:id="rId20"/>
-    <p:sldId id="1306" r:id="rId21"/>
-    <p:sldId id="1303" r:id="rId22"/>
-    <p:sldId id="1298" r:id="rId23"/>
+    <p:sldId id="1307" r:id="rId21"/>
+    <p:sldId id="1306" r:id="rId22"/>
+    <p:sldId id="1303" r:id="rId23"/>
+    <p:sldId id="1298" r:id="rId24"/>
   </p:sldIdLst>
   <p:sldSz cx="9906000" cy="6858000" type="A4"/>
   <p:notesSz cx="6797675" cy="9928225"/>
   <p:embeddedFontLst>
     <p:embeddedFont>
       <p:font typeface="맑은 고딕" panose="020B0503020000020004" pitchFamily="50" charset="-127"/>
-      <p:regular r:id="rId26"/>
-      <p:bold r:id="rId27"/>
+      <p:regular r:id="rId27"/>
+      <p:bold r:id="rId28"/>
     </p:embeddedFont>
   </p:embeddedFontLst>
   <p:defaultTextStyle>
@@ -409,7 +410,7 @@
             <a:fld id="{C036B14C-1EE6-40CC-B47F-D850A52A37F2}" type="datetimeFigureOut">
               <a:rPr lang="ko-KR" altLang="en-US" smtClean="0"/>
               <a:pPr/>
-              <a:t>2020-01-14</a:t>
+              <a:t>2020-01-15</a:t>
             </a:fld>
             <a:endParaRPr lang="ko-KR" altLang="en-US"/>
           </a:p>
@@ -1629,7 +1630,7 @@
             <a:fld id="{85971C86-2C5B-EB43-BE75-C1CF31CC9443}" type="datetime1">
               <a:rPr lang="ko-KR" altLang="en-US" smtClean="0"/>
               <a:pPr/>
-              <a:t>2020-01-14</a:t>
+              <a:t>2020-01-15</a:t>
             </a:fld>
             <a:endParaRPr lang="ko-KR" altLang="en-US"/>
           </a:p>
@@ -1913,7 +1914,7 @@
             <a:fld id="{5F96B0C1-D31C-2C4E-87C8-D33CB6019974}" type="datetime1">
               <a:rPr lang="ko-KR" altLang="en-US" smtClean="0"/>
               <a:pPr/>
-              <a:t>2020-01-14</a:t>
+              <a:t>2020-01-15</a:t>
             </a:fld>
             <a:endParaRPr lang="ko-KR" altLang="en-US"/>
           </a:p>
@@ -2174,7 +2175,7 @@
             <a:fld id="{5ECDD9AB-C603-1F47-8CC7-C2DC03A70B08}" type="datetime1">
               <a:rPr lang="ko-KR" altLang="en-US" smtClean="0"/>
               <a:pPr/>
-              <a:t>2020-01-14</a:t>
+              <a:t>2020-01-15</a:t>
             </a:fld>
             <a:endParaRPr lang="ko-KR" altLang="en-US"/>
           </a:p>
@@ -2351,7 +2352,7 @@
             <a:fld id="{E9C6FFBC-BA29-034A-B378-F9B169232D6B}" type="datetime1">
               <a:rPr lang="ko-KR" altLang="en-US" smtClean="0"/>
               <a:pPr/>
-              <a:t>2020-01-14</a:t>
+              <a:t>2020-01-15</a:t>
             </a:fld>
             <a:endParaRPr lang="ko-KR" altLang="en-US"/>
           </a:p>
@@ -2538,7 +2539,7 @@
             <a:fld id="{ABB0C4CB-EA9A-7043-A0E9-88EACA751849}" type="datetime1">
               <a:rPr lang="ko-KR" altLang="en-US" smtClean="0"/>
               <a:pPr/>
-              <a:t>2020-01-14</a:t>
+              <a:t>2020-01-15</a:t>
             </a:fld>
             <a:endParaRPr lang="ko-KR" altLang="en-US"/>
           </a:p>
@@ -2769,7 +2770,7 @@
             <a:fld id="{053B3F64-277D-4441-BC5D-2FE3F62AC76E}" type="datetime1">
               <a:rPr lang="ko-KR" altLang="en-US" smtClean="0"/>
               <a:pPr/>
-              <a:t>2020-01-14</a:t>
+              <a:t>2020-01-15</a:t>
             </a:fld>
             <a:endParaRPr lang="ko-KR" altLang="en-US"/>
           </a:p>
@@ -3020,7 +3021,7 @@
             <a:fld id="{B4DFDC0C-3D50-A845-A5C0-CAA9FC928EB4}" type="datetime1">
               <a:rPr lang="ko-KR" altLang="en-US" smtClean="0"/>
               <a:pPr/>
-              <a:t>2020-01-14</a:t>
+              <a:t>2020-01-15</a:t>
             </a:fld>
             <a:endParaRPr lang="ko-KR" altLang="en-US"/>
           </a:p>
@@ -3338,7 +3339,7 @@
             <a:fld id="{3D199F70-D683-734C-A8C5-87F26417ABAD}" type="datetime1">
               <a:rPr lang="ko-KR" altLang="en-US" smtClean="0"/>
               <a:pPr/>
-              <a:t>2020-01-14</a:t>
+              <a:t>2020-01-15</a:t>
             </a:fld>
             <a:endParaRPr lang="ko-KR" altLang="en-US"/>
           </a:p>
@@ -3654,7 +3655,7 @@
             <a:fld id="{960CF2B0-DA2E-1A42-B8B9-BA427F910D95}" type="datetime1">
               <a:rPr lang="ko-KR" altLang="en-US" smtClean="0"/>
               <a:pPr/>
-              <a:t>2020-01-14</a:t>
+              <a:t>2020-01-15</a:t>
             </a:fld>
             <a:endParaRPr lang="ko-KR" altLang="en-US"/>
           </a:p>
@@ -4118,7 +4119,7 @@
             <a:fld id="{8A46EEB6-2CD5-FE46-A18E-C13DD1993F9D}" type="datetime1">
               <a:rPr lang="ko-KR" altLang="en-US" smtClean="0"/>
               <a:pPr/>
-              <a:t>2020-01-14</a:t>
+              <a:t>2020-01-15</a:t>
             </a:fld>
             <a:endParaRPr lang="ko-KR" altLang="en-US"/>
           </a:p>
@@ -4341,7 +4342,7 @@
             <a:fld id="{9BA65E2A-BF59-814B-B4C8-F8BB7B392DA7}" type="datetime1">
               <a:rPr lang="ko-KR" altLang="en-US" smtClean="0"/>
               <a:pPr/>
-              <a:t>2020-01-14</a:t>
+              <a:t>2020-01-15</a:t>
             </a:fld>
             <a:endParaRPr lang="ko-KR" altLang="en-US"/>
           </a:p>
@@ -4491,7 +4492,7 @@
             <a:fld id="{706FBA2F-95FD-3043-80B4-FEF90E9BDAE5}" type="datetime1">
               <a:rPr lang="ko-KR" altLang="en-US" smtClean="0"/>
               <a:pPr/>
-              <a:t>2020-01-14</a:t>
+              <a:t>2020-01-15</a:t>
             </a:fld>
             <a:endParaRPr lang="ko-KR" altLang="en-US"/>
           </a:p>
@@ -4848,7 +4849,7 @@
             <a:fld id="{3A72648C-8F1F-974F-AB70-B3AC295DE470}" type="datetime1">
               <a:rPr lang="ko-KR" altLang="en-US" smtClean="0"/>
               <a:pPr/>
-              <a:t>2020-01-14</a:t>
+              <a:t>2020-01-15</a:t>
             </a:fld>
             <a:endParaRPr lang="ko-KR" altLang="en-US"/>
           </a:p>
@@ -5182,7 +5183,7 @@
             <a:fld id="{58E04696-D4C8-4A48-B253-48FEE500B95F}" type="datetime1">
               <a:rPr lang="ko-KR" altLang="en-US" smtClean="0"/>
               <a:pPr/>
-              <a:t>2020-01-14</a:t>
+              <a:t>2020-01-15</a:t>
             </a:fld>
             <a:endParaRPr lang="ko-KR" altLang="en-US"/>
           </a:p>
@@ -5433,7 +5434,7 @@
             <a:fld id="{2B331756-4AFB-DF44-A946-80057EFACDDE}" type="datetime1">
               <a:rPr lang="ko-KR" altLang="en-US" smtClean="0"/>
               <a:pPr/>
-              <a:t>2020-01-14</a:t>
+              <a:t>2020-01-15</a:t>
             </a:fld>
             <a:endParaRPr lang="ko-KR" altLang="en-US"/>
           </a:p>
@@ -5684,7 +5685,7 @@
             <a:fld id="{78C2EF14-9A85-044D-9E0D-CD60CFDAE00C}" type="datetime1">
               <a:rPr lang="ko-KR" altLang="en-US" smtClean="0"/>
               <a:pPr/>
-              <a:t>2020-01-14</a:t>
+              <a:t>2020-01-15</a:t>
             </a:fld>
             <a:endParaRPr lang="ko-KR" altLang="en-US"/>
           </a:p>
@@ -5828,7 +5829,7 @@
             <a:fld id="{5E7DFC15-5941-A048-8C41-5DB4C57DF04B}" type="datetime1">
               <a:rPr lang="ko-KR" altLang="en-US" smtClean="0"/>
               <a:pPr/>
-              <a:t>2020-01-14</a:t>
+              <a:t>2020-01-15</a:t>
             </a:fld>
             <a:endParaRPr lang="ko-KR" altLang="en-US"/>
           </a:p>
@@ -6093,7 +6094,7 @@
             <a:fld id="{6B78E568-C3F1-FF4D-94CB-CFEF044AD879}" type="datetime1">
               <a:rPr lang="ko-KR" altLang="en-US" smtClean="0"/>
               <a:pPr/>
-              <a:t>2020-01-14</a:t>
+              <a:t>2020-01-15</a:t>
             </a:fld>
             <a:endParaRPr lang="ko-KR" altLang="en-US"/>
           </a:p>
@@ -6270,7 +6271,7 @@
             <a:fld id="{C54433C8-06B1-D74D-925C-D5B79117A52B}" type="datetime1">
               <a:rPr lang="ko-KR" altLang="en-US" smtClean="0"/>
               <a:pPr/>
-              <a:t>2020-01-14</a:t>
+              <a:t>2020-01-15</a:t>
             </a:fld>
             <a:endParaRPr lang="ko-KR" altLang="en-US"/>
           </a:p>
@@ -6524,7 +6525,7 @@
             <a:fld id="{91087711-7130-694F-A36F-AE0AE5BBF389}" type="datetime1">
               <a:rPr lang="ko-KR" altLang="en-US" smtClean="0"/>
               <a:pPr/>
-              <a:t>2020-01-14</a:t>
+              <a:t>2020-01-15</a:t>
             </a:fld>
             <a:endParaRPr lang="ko-KR" altLang="en-US"/>
           </a:p>
@@ -6818,7 +6819,7 @@
             <a:fld id="{E3C9997B-A5F9-5249-A3BE-C0FFADAA8AD5}" type="datetime1">
               <a:rPr lang="ko-KR" altLang="en-US" smtClean="0"/>
               <a:pPr/>
-              <a:t>2020-01-14</a:t>
+              <a:t>2020-01-15</a:t>
             </a:fld>
             <a:endParaRPr lang="ko-KR" altLang="en-US"/>
           </a:p>
@@ -7246,7 +7247,7 @@
             <a:fld id="{B22D9A76-5AC8-A340-9F87-D4B239793FBE}" type="datetime1">
               <a:rPr lang="ko-KR" altLang="en-US" smtClean="0"/>
               <a:pPr/>
-              <a:t>2020-01-14</a:t>
+              <a:t>2020-01-15</a:t>
             </a:fld>
             <a:endParaRPr lang="ko-KR" altLang="en-US"/>
           </a:p>
@@ -7372,7 +7373,7 @@
             <a:fld id="{E3BCE3C1-E2DE-4342-8A94-641BD87BCA57}" type="datetime1">
               <a:rPr lang="ko-KR" altLang="en-US" smtClean="0"/>
               <a:pPr/>
-              <a:t>2020-01-14</a:t>
+              <a:t>2020-01-15</a:t>
             </a:fld>
             <a:endParaRPr lang="ko-KR" altLang="en-US"/>
           </a:p>
@@ -8612,7 +8613,7 @@
             <a:fld id="{81C152DC-6DE1-DA4E-B38A-16E700344C5F}" type="datetime1">
               <a:rPr lang="ko-KR" altLang="en-US" smtClean="0"/>
               <a:pPr/>
-              <a:t>2020-01-14</a:t>
+              <a:t>2020-01-15</a:t>
             </a:fld>
             <a:endParaRPr lang="ko-KR" altLang="en-US"/>
           </a:p>
@@ -14091,10 +14092,20 @@
                   <a:schemeClr val="bg1"/>
                 </a:solidFill>
                 <a:latin typeface="+mj-ea"/>
-                <a:ea typeface="+mj-ea"/>
                 <a:sym typeface="Wingdings" pitchFamily="2" charset="2"/>
               </a:rPr>
-              <a:t>Batch Size &amp; Epochs</a:t>
+              <a:t>Epoch &amp; </a:t>
+            </a:r>
+            <a:r>
+              <a:rPr lang="en-US" altLang="ko-KR" sz="2000" dirty="0" smtClean="0">
+                <a:solidFill>
+                  <a:schemeClr val="bg1"/>
+                </a:solidFill>
+                <a:latin typeface="+mj-ea"/>
+                <a:ea typeface="+mj-ea"/>
+                <a:sym typeface="Wingdings" pitchFamily="2" charset="2"/>
+              </a:rPr>
+              <a:t>Batch Size &amp; iteration</a:t>
             </a:r>
             <a:endParaRPr lang="en-US" altLang="ko-KR" sz="2000" dirty="0">
               <a:solidFill>
@@ -14123,13 +14134,17 @@
         </p:nvSpPr>
         <p:spPr bwMode="auto">
           <a:xfrm>
-            <a:off x="488504" y="980727"/>
-            <a:ext cx="9417496" cy="2376265"/>
+            <a:off x="776536" y="1340768"/>
+            <a:ext cx="8448427" cy="2836853"/>
           </a:xfrm>
           <a:prstGeom prst="rect">
             <a:avLst/>
           </a:prstGeom>
-          <a:noFill/>
+          <a:solidFill>
+            <a:schemeClr val="bg1">
+              <a:lumMod val="95000"/>
+            </a:schemeClr>
+          </a:solidFill>
           <a:ln w="9525" algn="ctr">
             <a:noFill/>
             <a:miter lim="800000"/>
@@ -14152,7 +14167,7 @@
                 <a:latin typeface="+mj-ea"/>
                 <a:ea typeface="+mj-ea"/>
               </a:rPr>
-              <a:t>Epoch = an Entire dataset is passed forward and backward through the neural network only once</a:t>
+              <a:t>Epoch</a:t>
             </a:r>
           </a:p>
           <a:p>
@@ -14161,6 +14176,34 @@
                 <a:spcPct val="150000"/>
               </a:lnSpc>
             </a:pPr>
+            <a:r>
+              <a:rPr lang="en-US" altLang="ko-KR" sz="1600" dirty="0" smtClean="0">
+                <a:latin typeface="+mj-ea"/>
+                <a:ea typeface="+mj-ea"/>
+              </a:rPr>
+              <a:t>  </a:t>
+            </a:r>
+            <a:r>
+              <a:rPr lang="en-US" altLang="ko-KR" b="0" dirty="0" smtClean="0">
+                <a:latin typeface="+mj-ea"/>
+                <a:ea typeface="+mj-ea"/>
+              </a:rPr>
+              <a:t>an </a:t>
+            </a:r>
+            <a:r>
+              <a:rPr lang="en-US" altLang="ko-KR" b="0" dirty="0" smtClean="0">
+                <a:latin typeface="+mj-ea"/>
+                <a:ea typeface="+mj-ea"/>
+              </a:rPr>
+              <a:t>Entire dataset is passed forward and backward through the neural network only </a:t>
+            </a:r>
+            <a:r>
+              <a:rPr lang="en-US" altLang="ko-KR" b="0" dirty="0" smtClean="0">
+                <a:latin typeface="+mj-ea"/>
+                <a:ea typeface="+mj-ea"/>
+              </a:rPr>
+              <a:t>once</a:t>
+            </a:r>
             <a:endParaRPr lang="en-US" altLang="ko-KR" sz="1600" dirty="0">
               <a:latin typeface="+mj-ea"/>
               <a:ea typeface="+mj-ea"/>
@@ -14177,7 +14220,49 @@
                 <a:latin typeface="+mj-ea"/>
                 <a:ea typeface="+mj-ea"/>
               </a:rPr>
-              <a:t>Batch size =Total number of training examples present in a single batch</a:t>
+              <a:t>Batch </a:t>
+            </a:r>
+            <a:r>
+              <a:rPr lang="en-US" altLang="ko-KR" sz="1600" dirty="0" smtClean="0">
+                <a:latin typeface="+mj-ea"/>
+                <a:ea typeface="+mj-ea"/>
+              </a:rPr>
+              <a:t>size</a:t>
+            </a:r>
+          </a:p>
+          <a:p>
+            <a:pPr latinLnBrk="0">
+              <a:lnSpc>
+                <a:spcPct val="150000"/>
+              </a:lnSpc>
+            </a:pPr>
+            <a:r>
+              <a:rPr lang="en-US" altLang="ko-KR" sz="1600" dirty="0">
+                <a:latin typeface="+mj-ea"/>
+                <a:ea typeface="+mj-ea"/>
+              </a:rPr>
+              <a:t> </a:t>
+            </a:r>
+            <a:r>
+              <a:rPr lang="en-US" altLang="ko-KR" sz="1600" dirty="0" smtClean="0">
+                <a:latin typeface="+mj-ea"/>
+                <a:ea typeface="+mj-ea"/>
+              </a:rPr>
+              <a:t> </a:t>
+            </a:r>
+            <a:r>
+              <a:rPr lang="en-US" altLang="ko-KR" b="0" dirty="0" smtClean="0">
+                <a:latin typeface="+mj-ea"/>
+                <a:ea typeface="+mj-ea"/>
+              </a:rPr>
+              <a:t>Total </a:t>
+            </a:r>
+            <a:r>
+              <a:rPr lang="en-US" altLang="ko-KR" b="0" dirty="0" smtClean="0">
+                <a:latin typeface="+mj-ea"/>
+                <a:ea typeface="+mj-ea"/>
+              </a:rPr>
+              <a:t>number of training examples present in a single batch</a:t>
             </a:r>
           </a:p>
           <a:p>
@@ -14189,7 +14274,7 @@
               <a:buChar char="à"/>
             </a:pPr>
             <a:r>
-              <a:rPr lang="ko-KR" altLang="en-US" sz="1600" dirty="0" smtClean="0">
+              <a:rPr lang="ko-KR" altLang="en-US" sz="1200" b="0" dirty="0" smtClean="0">
                 <a:latin typeface="+mj-ea"/>
                 <a:ea typeface="+mj-ea"/>
                 <a:sym typeface="Wingdings" panose="05000000000000000000" pitchFamily="2" charset="2"/>
@@ -14197,7 +14282,7 @@
               <a:t>컴퓨터의 연산에 한번에 데이터를 모두 넣어 학습 하게 할 수 없으니</a:t>
             </a:r>
             <a:r>
-              <a:rPr lang="en-US" altLang="ko-KR" sz="1600" dirty="0" smtClean="0">
+              <a:rPr lang="en-US" altLang="ko-KR" sz="1200" b="0" dirty="0" smtClean="0">
                 <a:latin typeface="+mj-ea"/>
                 <a:ea typeface="+mj-ea"/>
                 <a:sym typeface="Wingdings" panose="05000000000000000000" pitchFamily="2" charset="2"/>
@@ -14205,14 +14290,14 @@
               <a:t>, </a:t>
             </a:r>
             <a:r>
-              <a:rPr lang="ko-KR" altLang="en-US" sz="1600" dirty="0" smtClean="0">
+              <a:rPr lang="ko-KR" altLang="en-US" sz="1200" b="0" dirty="0" smtClean="0">
                 <a:latin typeface="+mj-ea"/>
                 <a:ea typeface="+mj-ea"/>
                 <a:sym typeface="Wingdings" panose="05000000000000000000" pitchFamily="2" charset="2"/>
               </a:rPr>
               <a:t>분할하여 학습에 사용하자</a:t>
             </a:r>
-            <a:endParaRPr lang="en-US" altLang="ko-KR" sz="1600" dirty="0" smtClean="0">
+            <a:endParaRPr lang="en-US" altLang="ko-KR" sz="1200" b="0" dirty="0" smtClean="0">
               <a:latin typeface="+mj-ea"/>
               <a:ea typeface="+mj-ea"/>
               <a:sym typeface="Wingdings" panose="05000000000000000000" pitchFamily="2" charset="2"/>
@@ -14227,38 +14312,30 @@
               <a:buChar char="à"/>
             </a:pPr>
             <a:r>
-              <a:rPr lang="ko-KR" altLang="en-US" sz="1600" dirty="0" smtClean="0">
+              <a:rPr lang="ko-KR" altLang="en-US" sz="1200" b="0" dirty="0" smtClean="0">
                 <a:latin typeface="+mj-ea"/>
                 <a:ea typeface="+mj-ea"/>
                 <a:sym typeface="Wingdings" panose="05000000000000000000" pitchFamily="2" charset="2"/>
               </a:rPr>
-              <a:t>이득</a:t>
-            </a:r>
-            <a:r>
-              <a:rPr lang="en-US" altLang="ko-KR" sz="1600" dirty="0" smtClean="0">
+              <a:t>메모리 </a:t>
+            </a:r>
+            <a:r>
+              <a:rPr lang="ko-KR" altLang="en-US" sz="1200" b="0" dirty="0" smtClean="0">
                 <a:latin typeface="+mj-ea"/>
                 <a:ea typeface="+mj-ea"/>
                 <a:sym typeface="Wingdings" panose="05000000000000000000" pitchFamily="2" charset="2"/>
               </a:rPr>
-              <a:t>: </a:t>
-            </a:r>
-            <a:r>
-              <a:rPr lang="ko-KR" altLang="en-US" sz="1600" dirty="0" smtClean="0">
+              <a:t>사용량 </a:t>
+            </a:r>
+            <a:r>
+              <a:rPr lang="ko-KR" altLang="en-US" sz="1200" b="0" dirty="0" smtClean="0">
                 <a:latin typeface="+mj-ea"/>
                 <a:ea typeface="+mj-ea"/>
                 <a:sym typeface="Wingdings" panose="05000000000000000000" pitchFamily="2" charset="2"/>
               </a:rPr>
-              <a:t>메모리 사용량 절감</a:t>
-            </a:r>
-            <a:r>
-              <a:rPr lang="en-US" altLang="ko-KR" sz="1600" dirty="0" smtClean="0">
-                <a:latin typeface="+mj-ea"/>
-                <a:ea typeface="+mj-ea"/>
-                <a:sym typeface="Wingdings" panose="05000000000000000000" pitchFamily="2" charset="2"/>
-              </a:rPr>
-              <a:t>/ </a:t>
-            </a:r>
-            <a:endParaRPr lang="en-US" altLang="ko-KR" sz="1600" dirty="0">
+              <a:t>절감</a:t>
+            </a:r>
+            <a:endParaRPr lang="en-US" altLang="ko-KR" b="0" dirty="0">
               <a:latin typeface="+mj-ea"/>
               <a:ea typeface="+mj-ea"/>
             </a:endParaRPr>
@@ -14274,9 +14351,44 @@
                 <a:latin typeface="+mj-ea"/>
                 <a:ea typeface="+mj-ea"/>
               </a:rPr>
-              <a:t>Iteration = the number of passes to complete one epoch</a:t>
-            </a:r>
-            <a:endParaRPr lang="en-US" altLang="ko-KR" sz="1600" dirty="0">
+              <a:t>Iteration</a:t>
+            </a:r>
+          </a:p>
+          <a:p>
+            <a:pPr latinLnBrk="0">
+              <a:lnSpc>
+                <a:spcPct val="150000"/>
+              </a:lnSpc>
+            </a:pPr>
+            <a:r>
+              <a:rPr lang="en-US" altLang="ko-KR" sz="1600" dirty="0" smtClean="0">
+                <a:latin typeface="+mj-ea"/>
+                <a:ea typeface="+mj-ea"/>
+              </a:rPr>
+              <a:t> </a:t>
+            </a:r>
+            <a:r>
+              <a:rPr lang="en-US" altLang="ko-KR" b="0" dirty="0" smtClean="0">
+                <a:latin typeface="+mj-ea"/>
+                <a:ea typeface="+mj-ea"/>
+              </a:rPr>
+              <a:t> </a:t>
+            </a:r>
+            <a:r>
+              <a:rPr lang="en-US" altLang="ko-KR" b="0" dirty="0" smtClean="0">
+                <a:latin typeface="+mj-ea"/>
+                <a:ea typeface="+mj-ea"/>
+              </a:rPr>
+              <a:t>the </a:t>
+            </a:r>
+            <a:r>
+              <a:rPr lang="en-US" altLang="ko-KR" b="0" dirty="0" smtClean="0">
+                <a:latin typeface="+mj-ea"/>
+                <a:ea typeface="+mj-ea"/>
+              </a:rPr>
+              <a:t>number of passes to complete one epoch</a:t>
+            </a:r>
+            <a:endParaRPr lang="en-US" altLang="ko-KR" b="0" dirty="0">
               <a:latin typeface="+mj-ea"/>
               <a:ea typeface="+mj-ea"/>
             </a:endParaRPr>
@@ -14299,8 +14411,8 @@
         </p:blipFill>
         <p:spPr>
           <a:xfrm>
-            <a:off x="2072680" y="3356992"/>
-            <a:ext cx="6276975" cy="1647825"/>
+            <a:off x="2825981" y="4451701"/>
+            <a:ext cx="4287259" cy="1125486"/>
           </a:xfrm>
           <a:prstGeom prst="rect">
             <a:avLst/>
@@ -14323,8 +14435,8 @@
         </p:nvSpPr>
         <p:spPr bwMode="auto">
           <a:xfrm>
-            <a:off x="488504" y="4869161"/>
-            <a:ext cx="8928992" cy="1152128"/>
+            <a:off x="3076227" y="5683090"/>
+            <a:ext cx="3786765" cy="865611"/>
           </a:xfrm>
           <a:prstGeom prst="rect">
             <a:avLst/>
@@ -14342,80 +14454,80 @@
           <a:bodyPr lIns="72000" tIns="0" rIns="0" bIns="0" anchor="t"/>
           <a:lstStyle/>
           <a:p>
-            <a:pPr latinLnBrk="0">
+            <a:pPr algn="ctr" latinLnBrk="0">
               <a:lnSpc>
                 <a:spcPct val="150000"/>
               </a:lnSpc>
             </a:pPr>
             <a:r>
-              <a:rPr lang="ko-KR" altLang="en-US" sz="1600" dirty="0" smtClean="0">
+              <a:rPr lang="ko-KR" altLang="en-US" sz="1200" b="0" dirty="0" smtClean="0">
                 <a:latin typeface="+mj-ea"/>
                 <a:ea typeface="+mj-ea"/>
               </a:rPr>
               <a:t>총 데이터가 </a:t>
             </a:r>
             <a:r>
-              <a:rPr lang="en-US" altLang="ko-KR" sz="1600" dirty="0" smtClean="0">
+              <a:rPr lang="en-US" altLang="ko-KR" sz="1200" b="0" dirty="0" smtClean="0">
                 <a:latin typeface="+mj-ea"/>
                 <a:ea typeface="+mj-ea"/>
               </a:rPr>
               <a:t>100</a:t>
             </a:r>
             <a:r>
-              <a:rPr lang="ko-KR" altLang="en-US" sz="1600" dirty="0" smtClean="0">
+              <a:rPr lang="ko-KR" altLang="en-US" sz="1200" b="0" dirty="0" smtClean="0">
                 <a:latin typeface="+mj-ea"/>
                 <a:ea typeface="+mj-ea"/>
               </a:rPr>
               <a:t>개</a:t>
             </a:r>
             <a:r>
-              <a:rPr lang="en-US" altLang="ko-KR" sz="1600" dirty="0" smtClean="0">
+              <a:rPr lang="en-US" altLang="ko-KR" sz="1200" b="0" dirty="0" smtClean="0">
                 <a:latin typeface="+mj-ea"/>
                 <a:ea typeface="+mj-ea"/>
               </a:rPr>
               <a:t>,  batch size</a:t>
             </a:r>
             <a:r>
-              <a:rPr lang="ko-KR" altLang="en-US" sz="1600" dirty="0" smtClean="0">
+              <a:rPr lang="ko-KR" altLang="en-US" sz="1200" b="0" dirty="0" smtClean="0">
                 <a:latin typeface="+mj-ea"/>
                 <a:ea typeface="+mj-ea"/>
               </a:rPr>
               <a:t>가 </a:t>
             </a:r>
             <a:r>
-              <a:rPr lang="en-US" altLang="ko-KR" sz="1600" dirty="0" smtClean="0">
+              <a:rPr lang="en-US" altLang="ko-KR" sz="1200" b="0" dirty="0" smtClean="0">
                 <a:latin typeface="+mj-ea"/>
                 <a:ea typeface="+mj-ea"/>
               </a:rPr>
               <a:t>10</a:t>
             </a:r>
             <a:r>
-              <a:rPr lang="ko-KR" altLang="en-US" sz="1600" dirty="0" smtClean="0">
+              <a:rPr lang="ko-KR" altLang="en-US" sz="1200" b="0" dirty="0" smtClean="0">
                 <a:latin typeface="+mj-ea"/>
                 <a:ea typeface="+mj-ea"/>
               </a:rPr>
               <a:t>이면</a:t>
             </a:r>
-            <a:endParaRPr lang="en-US" altLang="ko-KR" sz="1600" dirty="0" smtClean="0">
+            <a:endParaRPr lang="en-US" altLang="ko-KR" sz="1200" b="0" dirty="0" smtClean="0">
               <a:latin typeface="+mj-ea"/>
               <a:ea typeface="+mj-ea"/>
             </a:endParaRPr>
           </a:p>
           <a:p>
-            <a:pPr latinLnBrk="0">
+            <a:pPr algn="ctr" latinLnBrk="0">
               <a:lnSpc>
                 <a:spcPct val="150000"/>
               </a:lnSpc>
             </a:pPr>
             <a:r>
-              <a:rPr lang="ko-KR" altLang="en-US" sz="1600" dirty="0" smtClean="0">
+              <a:rPr lang="ko-KR" altLang="en-US" sz="1200" b="0" dirty="0" smtClean="0">
                 <a:latin typeface="+mj-ea"/>
                 <a:ea typeface="+mj-ea"/>
               </a:rPr>
               <a:t> </a:t>
             </a:r>
             <a:r>
-              <a:rPr lang="en-US" altLang="ko-KR" sz="1600" dirty="0" smtClean="0">
+              <a:rPr lang="en-US" altLang="ko-KR" sz="1200" b="0" dirty="0" smtClean="0">
                 <a:latin typeface="+mj-ea"/>
                 <a:ea typeface="+mj-ea"/>
                 <a:sym typeface="Wingdings" panose="05000000000000000000" pitchFamily="2" charset="2"/>
@@ -14423,49 +14535,41 @@
               <a:t> 1 Iteration = 10</a:t>
             </a:r>
             <a:r>
-              <a:rPr lang="ko-KR" altLang="en-US" sz="1600" dirty="0" smtClean="0">
+              <a:rPr lang="ko-KR" altLang="en-US" sz="1200" b="0" dirty="0" smtClean="0">
                 <a:latin typeface="+mj-ea"/>
                 <a:ea typeface="+mj-ea"/>
                 <a:sym typeface="Wingdings" panose="05000000000000000000" pitchFamily="2" charset="2"/>
               </a:rPr>
               <a:t>개 데이터에 대해서 학습</a:t>
             </a:r>
-            <a:endParaRPr lang="en-US" altLang="ko-KR" sz="1600" dirty="0" smtClean="0">
+            <a:endParaRPr lang="en-US" altLang="ko-KR" sz="1200" b="0" dirty="0" smtClean="0">
               <a:latin typeface="+mj-ea"/>
               <a:ea typeface="+mj-ea"/>
               <a:sym typeface="Wingdings" panose="05000000000000000000" pitchFamily="2" charset="2"/>
             </a:endParaRPr>
           </a:p>
           <a:p>
-            <a:pPr latinLnBrk="0">
+            <a:pPr algn="ctr" latinLnBrk="0">
               <a:lnSpc>
                 <a:spcPct val="150000"/>
               </a:lnSpc>
             </a:pPr>
             <a:r>
-              <a:rPr lang="en-US" altLang="ko-KR" sz="1600" dirty="0">
+              <a:rPr lang="en-US" altLang="ko-KR" sz="1200" b="0" dirty="0" smtClean="0">
                 <a:latin typeface="+mj-ea"/>
                 <a:ea typeface="+mj-ea"/>
                 <a:sym typeface="Wingdings" panose="05000000000000000000" pitchFamily="2" charset="2"/>
               </a:rPr>
-              <a:t> </a:t>
-            </a:r>
-            <a:r>
-              <a:rPr lang="en-US" altLang="ko-KR" sz="1600" dirty="0" smtClean="0">
-                <a:latin typeface="+mj-ea"/>
-                <a:ea typeface="+mj-ea"/>
-                <a:sym typeface="Wingdings" panose="05000000000000000000" pitchFamily="2" charset="2"/>
-              </a:rPr>
-              <a:t> 1 Epoch = 100/batch size = 10 iteration</a:t>
-            </a:r>
-          </a:p>
-          <a:p>
-            <a:pPr latinLnBrk="0">
+              <a:t>  1 Epoch = 100/batch size = 10 iteration</a:t>
+            </a:r>
+          </a:p>
+          <a:p>
+            <a:pPr algn="ctr" latinLnBrk="0">
               <a:lnSpc>
                 <a:spcPct val="150000"/>
               </a:lnSpc>
             </a:pPr>
-            <a:endParaRPr lang="en-US" altLang="ko-KR" sz="1600" dirty="0">
+            <a:endParaRPr lang="en-US" altLang="ko-KR" sz="1200" b="0" dirty="0">
               <a:latin typeface="+mj-ea"/>
               <a:ea typeface="+mj-ea"/>
             </a:endParaRPr>
@@ -14474,914 +14578,88 @@
       </p:sp>
       <p:sp>
         <p:nvSpPr>
-          <p:cNvPr id="9" name="Rectangle 41">
-            <a:extLst>
-              <a:ext uri="{FF2B5EF4-FFF2-40B4-BE49-F238E27FC236}">
-                <a16:creationId xmlns:a16="http://schemas.microsoft.com/office/drawing/2014/main" id="{83FF4C79-FD07-4B45-A74F-F47818CE5E37}"/>
-              </a:ext>
-            </a:extLst>
-          </p:cNvPr>
-          <p:cNvSpPr>
-            <a:spLocks noChangeArrowheads="1"/>
-          </p:cNvSpPr>
-          <p:nvPr/>
-        </p:nvSpPr>
-        <p:spPr bwMode="auto">
-          <a:xfrm>
-            <a:off x="488504" y="6188771"/>
-            <a:ext cx="8928992" cy="2384622"/>
-          </a:xfrm>
-          <a:prstGeom prst="rect">
-            <a:avLst/>
-          </a:prstGeom>
-          <a:noFill/>
-          <a:ln w="9525" algn="ctr">
-            <a:noFill/>
-            <a:miter lim="800000"/>
-            <a:headEnd/>
-            <a:tailEnd/>
-          </a:ln>
-          <a:effectLst/>
-        </p:spPr>
-        <p:txBody>
-          <a:bodyPr lIns="72000" tIns="0" rIns="0" bIns="0" anchor="t"/>
-          <a:lstStyle/>
-          <a:p>
-            <a:pPr latinLnBrk="0">
-              <a:lnSpc>
-                <a:spcPct val="150000"/>
-              </a:lnSpc>
-            </a:pPr>
-            <a:r>
-              <a:rPr lang="en-US" altLang="ko-KR" sz="1600" dirty="0" smtClean="0">
-                <a:latin typeface="+mj-ea"/>
-                <a:ea typeface="+mj-ea"/>
-              </a:rPr>
-              <a:t>In general: Large batch sizes result in faster progress in training, but don’t always converge as fast. Smaller batch sizes train slower, but can converge faster. It’s definitely problem dependent.</a:t>
-            </a:r>
-          </a:p>
-          <a:p>
-            <a:pPr latinLnBrk="0">
-              <a:lnSpc>
-                <a:spcPct val="150000"/>
-              </a:lnSpc>
-            </a:pPr>
-            <a:endParaRPr lang="en-US" altLang="ko-KR" sz="1600" dirty="0">
-              <a:latin typeface="+mj-ea"/>
-              <a:ea typeface="+mj-ea"/>
-            </a:endParaRPr>
-          </a:p>
-          <a:p>
-            <a:pPr latinLnBrk="0">
-              <a:lnSpc>
-                <a:spcPct val="150000"/>
-              </a:lnSpc>
-            </a:pPr>
-            <a:r>
-              <a:rPr lang="en-US" altLang="ko-KR" sz="1600" dirty="0" smtClean="0">
-                <a:latin typeface="+mj-ea"/>
-                <a:ea typeface="+mj-ea"/>
-              </a:rPr>
-              <a:t>In general: The models improve with more epochs of training, to a point. They’ll start to plateau in accuracy as they converge. </a:t>
-            </a:r>
-          </a:p>
-          <a:p>
-            <a:pPr latinLnBrk="0">
-              <a:lnSpc>
-                <a:spcPct val="150000"/>
-              </a:lnSpc>
-            </a:pPr>
-            <a:endParaRPr lang="en-US" altLang="ko-KR" sz="1600" dirty="0">
-              <a:latin typeface="+mj-ea"/>
-              <a:ea typeface="+mj-ea"/>
-            </a:endParaRPr>
-          </a:p>
-          <a:p>
-            <a:pPr latinLnBrk="0">
-              <a:lnSpc>
-                <a:spcPct val="150000"/>
-              </a:lnSpc>
-            </a:pPr>
-            <a:endParaRPr lang="en-US" altLang="ko-KR" sz="1600" dirty="0">
-              <a:latin typeface="+mj-ea"/>
-              <a:ea typeface="+mj-ea"/>
-            </a:endParaRPr>
-          </a:p>
-        </p:txBody>
-      </p:sp>
-      <p:pic>
-        <p:nvPicPr>
-          <p:cNvPr id="10" name="그림 9"/>
-          <p:cNvPicPr>
-            <a:picLocks noChangeAspect="1"/>
-          </p:cNvPicPr>
-          <p:nvPr/>
-        </p:nvPicPr>
-        <p:blipFill>
-          <a:blip r:embed="rId4"/>
-          <a:stretch>
-            <a:fillRect/>
-          </a:stretch>
-        </p:blipFill>
-        <p:spPr>
-          <a:xfrm>
-            <a:off x="2363192" y="-1412318"/>
-            <a:ext cx="5695950" cy="2409825"/>
-          </a:xfrm>
-          <a:prstGeom prst="rect">
-            <a:avLst/>
-          </a:prstGeom>
-        </p:spPr>
-      </p:pic>
-      <p:pic>
-        <p:nvPicPr>
-          <p:cNvPr id="11" name="그림 10"/>
-          <p:cNvPicPr>
-            <a:picLocks noChangeAspect="1"/>
-          </p:cNvPicPr>
-          <p:nvPr/>
-        </p:nvPicPr>
-        <p:blipFill>
-          <a:blip r:embed="rId5"/>
-          <a:stretch>
-            <a:fillRect/>
-          </a:stretch>
-        </p:blipFill>
-        <p:spPr>
-          <a:xfrm>
-            <a:off x="9933831" y="1412776"/>
-            <a:ext cx="6762750" cy="3781425"/>
-          </a:xfrm>
-          <a:prstGeom prst="rect">
-            <a:avLst/>
-          </a:prstGeom>
-        </p:spPr>
-      </p:pic>
-      <p:sp>
-        <p:nvSpPr>
-          <p:cNvPr id="12" name="TextBox 11"/>
-          <p:cNvSpPr txBox="1"/>
-          <p:nvPr/>
-        </p:nvSpPr>
-        <p:spPr>
-          <a:xfrm>
-            <a:off x="11073680" y="5445225"/>
-            <a:ext cx="5184576" cy="1169551"/>
-          </a:xfrm>
-          <a:prstGeom prst="rect">
-            <a:avLst/>
-          </a:prstGeom>
-          <a:noFill/>
-        </p:spPr>
-        <p:txBody>
-          <a:bodyPr wrap="square" rtlCol="0">
-            <a:spAutoFit/>
-          </a:bodyPr>
-          <a:lstStyle/>
-          <a:p>
-            <a:r>
-              <a:rPr lang="en-US" altLang="ko-KR" dirty="0" smtClean="0">
-                <a:latin typeface="+mj-ea"/>
-                <a:ea typeface="+mj-ea"/>
-              </a:rPr>
-              <a:t>Stochastic (batch size =1 )</a:t>
-            </a:r>
-          </a:p>
-          <a:p>
-            <a:r>
-              <a:rPr lang="ko-KR" altLang="en-US" dirty="0" smtClean="0">
-                <a:latin typeface="+mj-ea"/>
-                <a:ea typeface="+mj-ea"/>
-              </a:rPr>
-              <a:t>배치가 너무 작을 수록 정확도가 낮다</a:t>
-            </a:r>
-            <a:endParaRPr lang="en-US" altLang="ko-KR" dirty="0" smtClean="0">
-              <a:latin typeface="+mj-ea"/>
-              <a:ea typeface="+mj-ea"/>
-            </a:endParaRPr>
-          </a:p>
-          <a:p>
-            <a:endParaRPr lang="en-US" altLang="ko-KR" dirty="0">
-              <a:latin typeface="+mj-ea"/>
-              <a:ea typeface="+mj-ea"/>
-            </a:endParaRPr>
-          </a:p>
-          <a:p>
-            <a:r>
-              <a:rPr lang="en-US" altLang="ko-KR" dirty="0">
-                <a:latin typeface="+mj-ea"/>
-                <a:ea typeface="+mj-ea"/>
-                <a:hlinkClick r:id="rId6"/>
-              </a:rPr>
-              <a:t>https://stats.stackexchange.com/questions/153531/what-is-batch-size-in-neural-network</a:t>
-            </a:r>
-            <a:endParaRPr lang="ko-KR" altLang="en-US" dirty="0">
-              <a:latin typeface="+mj-ea"/>
-              <a:ea typeface="+mj-ea"/>
-            </a:endParaRPr>
-          </a:p>
-        </p:txBody>
-      </p:sp>
-      <p:sp>
-        <p:nvSpPr>
-          <p:cNvPr id="13" name="TextBox 12"/>
-          <p:cNvSpPr txBox="1"/>
-          <p:nvPr/>
-        </p:nvSpPr>
-        <p:spPr>
-          <a:xfrm>
-            <a:off x="8639224" y="-1889372"/>
-            <a:ext cx="5184576" cy="954107"/>
-          </a:xfrm>
-          <a:prstGeom prst="rect">
-            <a:avLst/>
-          </a:prstGeom>
-          <a:noFill/>
-        </p:spPr>
-        <p:txBody>
-          <a:bodyPr wrap="square" rtlCol="0">
-            <a:spAutoFit/>
-          </a:bodyPr>
-          <a:lstStyle/>
-          <a:p>
-            <a:r>
-              <a:rPr lang="en-US" altLang="ko-KR" dirty="0">
-                <a:latin typeface="+mj-ea"/>
-                <a:ea typeface="+mj-ea"/>
-                <a:hlinkClick r:id="rId7"/>
-              </a:rPr>
-              <a:t>https://blog.lunit.io/2018/08/03/batch-size-in-deep-learning/</a:t>
-            </a:r>
-            <a:endParaRPr lang="en-US" altLang="ko-KR" dirty="0" smtClean="0">
-              <a:latin typeface="+mj-ea"/>
-              <a:ea typeface="+mj-ea"/>
-            </a:endParaRPr>
-          </a:p>
-          <a:p>
-            <a:r>
-              <a:rPr lang="en-US" altLang="ko-KR" dirty="0" smtClean="0">
-                <a:latin typeface="+mj-ea"/>
-                <a:ea typeface="+mj-ea"/>
-              </a:rPr>
-              <a:t>Batch size</a:t>
-            </a:r>
-            <a:r>
-              <a:rPr lang="ko-KR" altLang="en-US" dirty="0" smtClean="0">
-                <a:latin typeface="+mj-ea"/>
-                <a:ea typeface="+mj-ea"/>
-              </a:rPr>
-              <a:t>가 클수록 </a:t>
-            </a:r>
-            <a:r>
-              <a:rPr lang="en-US" altLang="ko-KR" dirty="0" smtClean="0">
-                <a:latin typeface="+mj-ea"/>
-                <a:ea typeface="+mj-ea"/>
-              </a:rPr>
-              <a:t>gradient </a:t>
-            </a:r>
-            <a:r>
-              <a:rPr lang="ko-KR" altLang="en-US" dirty="0" smtClean="0">
-                <a:latin typeface="+mj-ea"/>
-                <a:ea typeface="+mj-ea"/>
-              </a:rPr>
-              <a:t>가</a:t>
-            </a:r>
-            <a:r>
-              <a:rPr lang="en-US" altLang="ko-KR" dirty="0" smtClean="0">
-                <a:latin typeface="+mj-ea"/>
-                <a:ea typeface="+mj-ea"/>
-              </a:rPr>
-              <a:t> </a:t>
-            </a:r>
-            <a:r>
-              <a:rPr lang="ko-KR" altLang="en-US" dirty="0" smtClean="0">
-                <a:latin typeface="+mj-ea"/>
-                <a:ea typeface="+mj-ea"/>
-              </a:rPr>
-              <a:t>정확해지지만 한 </a:t>
-            </a:r>
-            <a:r>
-              <a:rPr lang="en-US" altLang="ko-KR" dirty="0" smtClean="0">
-                <a:latin typeface="+mj-ea"/>
-                <a:ea typeface="+mj-ea"/>
-              </a:rPr>
-              <a:t>iteration</a:t>
-            </a:r>
-            <a:r>
-              <a:rPr lang="ko-KR" altLang="en-US" dirty="0" smtClean="0">
-                <a:latin typeface="+mj-ea"/>
-                <a:ea typeface="+mj-ea"/>
-              </a:rPr>
-              <a:t>에 대한 </a:t>
-            </a:r>
-            <a:r>
-              <a:rPr lang="ko-KR" altLang="en-US" dirty="0" err="1" smtClean="0">
-                <a:latin typeface="+mj-ea"/>
-                <a:ea typeface="+mj-ea"/>
-              </a:rPr>
-              <a:t>계산량이</a:t>
-            </a:r>
-            <a:r>
-              <a:rPr lang="ko-KR" altLang="en-US" dirty="0" smtClean="0">
-                <a:latin typeface="+mj-ea"/>
-                <a:ea typeface="+mj-ea"/>
-              </a:rPr>
-              <a:t> 늘어나게 된다</a:t>
-            </a:r>
-            <a:r>
-              <a:rPr lang="en-US" altLang="ko-KR" dirty="0" smtClean="0">
-                <a:latin typeface="+mj-ea"/>
-                <a:ea typeface="+mj-ea"/>
-              </a:rPr>
-              <a:t>. </a:t>
-            </a:r>
-            <a:endParaRPr lang="ko-KR" altLang="en-US" dirty="0">
-              <a:latin typeface="+mj-ea"/>
-              <a:ea typeface="+mj-ea"/>
-            </a:endParaRPr>
-          </a:p>
-        </p:txBody>
-      </p:sp>
-      <p:pic>
-        <p:nvPicPr>
-          <p:cNvPr id="14" name="그림 13"/>
-          <p:cNvPicPr>
-            <a:picLocks noChangeAspect="1"/>
-          </p:cNvPicPr>
-          <p:nvPr/>
-        </p:nvPicPr>
-        <p:blipFill>
-          <a:blip r:embed="rId8"/>
-          <a:stretch>
-            <a:fillRect/>
-          </a:stretch>
-        </p:blipFill>
-        <p:spPr>
-          <a:xfrm>
-            <a:off x="8481392" y="-4078581"/>
-            <a:ext cx="8372475" cy="2181225"/>
-          </a:xfrm>
-          <a:prstGeom prst="rect">
-            <a:avLst/>
-          </a:prstGeom>
-        </p:spPr>
-      </p:pic>
-      <p:sp>
-        <p:nvSpPr>
-          <p:cNvPr id="15" name="직사각형 14"/>
+          <p:cNvPr id="2" name="직사각형 1"/>
           <p:cNvSpPr/>
           <p:nvPr/>
         </p:nvSpPr>
         <p:spPr>
           <a:xfrm>
-            <a:off x="8895356" y="-983818"/>
-            <a:ext cx="4953000" cy="1384995"/>
+            <a:off x="488504" y="908720"/>
+            <a:ext cx="588623" cy="412292"/>
           </a:xfrm>
           <a:prstGeom prst="rect">
             <a:avLst/>
           </a:prstGeom>
         </p:spPr>
         <p:txBody>
-          <a:bodyPr>
+          <a:bodyPr wrap="none">
             <a:spAutoFit/>
           </a:bodyPr>
           <a:lstStyle/>
           <a:p>
-            <a:r>
-              <a:rPr lang="en-US" altLang="ko-KR" b="0" dirty="0">
-                <a:solidFill>
-                  <a:srgbClr val="5D5D5D"/>
-                </a:solidFill>
-                <a:latin typeface="+mj-ea"/>
-                <a:ea typeface="+mj-ea"/>
-              </a:rPr>
-              <a:t>Deep neural network</a:t>
-            </a:r>
-            <a:r>
-              <a:rPr lang="ko-KR" altLang="en-US" b="0" dirty="0">
-                <a:solidFill>
-                  <a:srgbClr val="5D5D5D"/>
-                </a:solidFill>
-                <a:latin typeface="+mj-ea"/>
-                <a:ea typeface="+mj-ea"/>
-              </a:rPr>
-              <a:t>의 </a:t>
-            </a:r>
-            <a:r>
-              <a:rPr lang="en-US" altLang="ko-KR" b="0" dirty="0">
-                <a:solidFill>
-                  <a:srgbClr val="5D5D5D"/>
-                </a:solidFill>
-                <a:latin typeface="+mj-ea"/>
-                <a:ea typeface="+mj-ea"/>
-              </a:rPr>
-              <a:t>loss function</a:t>
-            </a:r>
-            <a:r>
-              <a:rPr lang="ko-KR" altLang="en-US" b="0" dirty="0">
-                <a:solidFill>
-                  <a:srgbClr val="5D5D5D"/>
-                </a:solidFill>
-                <a:latin typeface="+mj-ea"/>
-                <a:ea typeface="+mj-ea"/>
-              </a:rPr>
-              <a:t>과 같이 복잡한 </a:t>
-            </a:r>
-            <a:r>
-              <a:rPr lang="en-US" altLang="ko-KR" b="0" dirty="0">
-                <a:solidFill>
-                  <a:srgbClr val="5D5D5D"/>
-                </a:solidFill>
-                <a:latin typeface="+mj-ea"/>
-                <a:ea typeface="+mj-ea"/>
-              </a:rPr>
-              <a:t>non-convex function</a:t>
-            </a:r>
-            <a:r>
-              <a:rPr lang="ko-KR" altLang="en-US" b="0" dirty="0">
-                <a:solidFill>
-                  <a:srgbClr val="5D5D5D"/>
-                </a:solidFill>
-                <a:latin typeface="+mj-ea"/>
-                <a:ea typeface="+mj-ea"/>
-              </a:rPr>
-              <a:t>일수록 </a:t>
-            </a:r>
-            <a:r>
-              <a:rPr lang="en-US" altLang="ko-KR" b="0" dirty="0">
-                <a:solidFill>
-                  <a:srgbClr val="5D5D5D"/>
-                </a:solidFill>
-                <a:latin typeface="+mj-ea"/>
-                <a:ea typeface="+mj-ea"/>
-              </a:rPr>
-              <a:t>gradient </a:t>
-            </a:r>
-            <a:r>
-              <a:rPr lang="ko-KR" altLang="en-US" b="0" dirty="0">
-                <a:solidFill>
-                  <a:srgbClr val="5D5D5D"/>
-                </a:solidFill>
-                <a:latin typeface="+mj-ea"/>
-                <a:ea typeface="+mj-ea"/>
-              </a:rPr>
-              <a:t>값은 </a:t>
-            </a:r>
-            <a:r>
-              <a:rPr lang="en-US" altLang="ko-KR" b="0" dirty="0">
-                <a:solidFill>
-                  <a:srgbClr val="5D5D5D"/>
-                </a:solidFill>
-                <a:latin typeface="+mj-ea"/>
-                <a:ea typeface="+mj-ea"/>
-              </a:rPr>
-              <a:t>parameter </a:t>
-            </a:r>
-            <a:r>
-              <a:rPr lang="ko-KR" altLang="en-US" b="0" dirty="0">
-                <a:solidFill>
-                  <a:srgbClr val="5D5D5D"/>
-                </a:solidFill>
-                <a:latin typeface="+mj-ea"/>
-                <a:ea typeface="+mj-ea"/>
-              </a:rPr>
-              <a:t>상태에 따라 크게 변하므로</a:t>
-            </a:r>
-            <a:r>
-              <a:rPr lang="en-US" altLang="ko-KR" b="0" dirty="0">
-                <a:solidFill>
-                  <a:srgbClr val="5D5D5D"/>
-                </a:solidFill>
-                <a:latin typeface="+mj-ea"/>
-                <a:ea typeface="+mj-ea"/>
-              </a:rPr>
-              <a:t>, large batch</a:t>
-            </a:r>
-            <a:r>
-              <a:rPr lang="ko-KR" altLang="en-US" b="0" dirty="0">
-                <a:solidFill>
-                  <a:srgbClr val="5D5D5D"/>
-                </a:solidFill>
-                <a:latin typeface="+mj-ea"/>
-                <a:ea typeface="+mj-ea"/>
-              </a:rPr>
-              <a:t>를 사용하면 오래전 </a:t>
-            </a:r>
-            <a:r>
-              <a:rPr lang="en-US" altLang="ko-KR" b="0" dirty="0">
-                <a:solidFill>
-                  <a:srgbClr val="5D5D5D"/>
-                </a:solidFill>
-                <a:latin typeface="+mj-ea"/>
-                <a:ea typeface="+mj-ea"/>
-              </a:rPr>
-              <a:t>gradient</a:t>
-            </a:r>
-            <a:r>
-              <a:rPr lang="ko-KR" altLang="en-US" b="0" dirty="0">
-                <a:solidFill>
-                  <a:srgbClr val="5D5D5D"/>
-                </a:solidFill>
-                <a:latin typeface="+mj-ea"/>
-                <a:ea typeface="+mj-ea"/>
-              </a:rPr>
-              <a:t>로 부정확한 </a:t>
-            </a:r>
-            <a:r>
-              <a:rPr lang="en-US" altLang="ko-KR" b="0" dirty="0">
-                <a:solidFill>
-                  <a:srgbClr val="5D5D5D"/>
-                </a:solidFill>
-                <a:latin typeface="+mj-ea"/>
-                <a:ea typeface="+mj-ea"/>
-              </a:rPr>
-              <a:t>weight update</a:t>
-            </a:r>
-            <a:r>
-              <a:rPr lang="ko-KR" altLang="en-US" b="0" dirty="0">
-                <a:solidFill>
-                  <a:srgbClr val="5D5D5D"/>
-                </a:solidFill>
-                <a:latin typeface="+mj-ea"/>
-                <a:ea typeface="+mj-ea"/>
-              </a:rPr>
-              <a:t>를 하게 될 위험이 커지게 되고</a:t>
-            </a:r>
-            <a:r>
-              <a:rPr lang="en-US" altLang="ko-KR" b="0" dirty="0">
-                <a:solidFill>
-                  <a:srgbClr val="5D5D5D"/>
-                </a:solidFill>
-                <a:latin typeface="+mj-ea"/>
-                <a:ea typeface="+mj-ea"/>
-              </a:rPr>
-              <a:t>, base learning rate</a:t>
-            </a:r>
-            <a:r>
-              <a:rPr lang="ko-KR" altLang="en-US" b="0" dirty="0">
-                <a:solidFill>
-                  <a:srgbClr val="5D5D5D"/>
-                </a:solidFill>
-                <a:latin typeface="+mj-ea"/>
-                <a:ea typeface="+mj-ea"/>
-              </a:rPr>
-              <a:t>를 크게 가져가지 못하는 원인이 될 수 있습니다</a:t>
-            </a:r>
-            <a:r>
-              <a:rPr lang="en-US" altLang="ko-KR" b="0" dirty="0">
-                <a:solidFill>
-                  <a:srgbClr val="5D5D5D"/>
-                </a:solidFill>
-                <a:latin typeface="+mj-ea"/>
-                <a:ea typeface="+mj-ea"/>
-              </a:rPr>
-              <a:t>.</a:t>
-            </a:r>
-            <a:endParaRPr lang="ko-KR" altLang="en-US" dirty="0">
+            <a:pPr>
+              <a:lnSpc>
+                <a:spcPct val="150000"/>
+              </a:lnSpc>
+            </a:pPr>
+            <a:r>
+              <a:rPr lang="ko-KR" altLang="en-US" sz="1600" dirty="0" smtClean="0">
+                <a:solidFill>
+                  <a:srgbClr val="242729"/>
+                </a:solidFill>
+                <a:latin typeface="+mj-ea"/>
+              </a:rPr>
+              <a:t>정의</a:t>
+            </a:r>
+            <a:endParaRPr lang="en-US" altLang="ko-KR" sz="1600" dirty="0">
+              <a:solidFill>
+                <a:srgbClr val="242729"/>
+              </a:solidFill>
               <a:latin typeface="+mj-ea"/>
-              <a:ea typeface="+mj-ea"/>
             </a:endParaRPr>
           </a:p>
         </p:txBody>
       </p:sp>
-      <p:pic>
-        <p:nvPicPr>
-          <p:cNvPr id="16" name="그림 15"/>
-          <p:cNvPicPr>
-            <a:picLocks noChangeAspect="1"/>
-          </p:cNvPicPr>
-          <p:nvPr/>
-        </p:nvPicPr>
-        <p:blipFill>
-          <a:blip r:embed="rId9"/>
-          <a:stretch>
-            <a:fillRect/>
-          </a:stretch>
-        </p:blipFill>
-        <p:spPr>
-          <a:xfrm>
-            <a:off x="-159568" y="-6300484"/>
-            <a:ext cx="8439150" cy="3648075"/>
-          </a:xfrm>
-          <a:prstGeom prst="rect">
-            <a:avLst/>
-          </a:prstGeom>
-        </p:spPr>
-      </p:pic>
       <p:sp>
         <p:nvSpPr>
-          <p:cNvPr id="17" name="직사각형 16"/>
+          <p:cNvPr id="21" name="직사각형 20"/>
           <p:cNvSpPr/>
           <p:nvPr/>
         </p:nvSpPr>
         <p:spPr>
           <a:xfrm>
-            <a:off x="467916" y="-3064503"/>
-            <a:ext cx="4953000" cy="1384995"/>
+            <a:off x="490364" y="4217428"/>
+            <a:ext cx="588623" cy="461665"/>
           </a:xfrm>
           <a:prstGeom prst="rect">
             <a:avLst/>
           </a:prstGeom>
         </p:spPr>
         <p:txBody>
-          <a:bodyPr>
+          <a:bodyPr wrap="none">
             <a:spAutoFit/>
           </a:bodyPr>
           <a:lstStyle/>
           <a:p>
-            <a:r>
-              <a:rPr lang="en-US" altLang="ko-KR" b="0" dirty="0">
-                <a:solidFill>
-                  <a:srgbClr val="5D5D5D"/>
-                </a:solidFill>
-                <a:latin typeface="+mj-ea"/>
-                <a:ea typeface="+mj-ea"/>
-              </a:rPr>
-              <a:t>Learning rate</a:t>
-            </a:r>
-            <a:r>
-              <a:rPr lang="ko-KR" altLang="en-US" b="0" dirty="0">
-                <a:solidFill>
-                  <a:srgbClr val="5D5D5D"/>
-                </a:solidFill>
-                <a:latin typeface="+mj-ea"/>
-                <a:ea typeface="+mj-ea"/>
-              </a:rPr>
-              <a:t>를 고정하고 </a:t>
-            </a:r>
-            <a:r>
-              <a:rPr lang="en-US" altLang="ko-KR" b="0" dirty="0">
-                <a:solidFill>
-                  <a:srgbClr val="5D5D5D"/>
-                </a:solidFill>
-                <a:latin typeface="+mj-ea"/>
-                <a:ea typeface="+mj-ea"/>
-              </a:rPr>
-              <a:t>batch size</a:t>
-            </a:r>
-            <a:r>
-              <a:rPr lang="ko-KR" altLang="en-US" b="0" dirty="0">
-                <a:solidFill>
-                  <a:srgbClr val="5D5D5D"/>
-                </a:solidFill>
-                <a:latin typeface="+mj-ea"/>
-                <a:ea typeface="+mj-ea"/>
-              </a:rPr>
-              <a:t>를 변화시킨 그래프 </a:t>
-            </a:r>
-            <a:r>
-              <a:rPr lang="en-US" altLang="ko-KR" b="0" dirty="0">
-                <a:solidFill>
-                  <a:srgbClr val="5D5D5D"/>
-                </a:solidFill>
-                <a:latin typeface="+mj-ea"/>
-                <a:ea typeface="+mj-ea"/>
-              </a:rPr>
-              <a:t>(</a:t>
-            </a:r>
-            <a:r>
-              <a:rPr lang="ko-KR" altLang="en-US" b="0" dirty="0">
-                <a:solidFill>
-                  <a:srgbClr val="5D5D5D"/>
-                </a:solidFill>
-                <a:latin typeface="+mj-ea"/>
-                <a:ea typeface="+mj-ea"/>
-              </a:rPr>
-              <a:t>왼쪽</a:t>
-            </a:r>
-            <a:r>
-              <a:rPr lang="en-US" altLang="ko-KR" b="0" dirty="0">
-                <a:solidFill>
-                  <a:srgbClr val="5D5D5D"/>
-                </a:solidFill>
-                <a:latin typeface="+mj-ea"/>
-                <a:ea typeface="+mj-ea"/>
-              </a:rPr>
-              <a:t>)</a:t>
-            </a:r>
-            <a:r>
-              <a:rPr lang="ko-KR" altLang="en-US" b="0" dirty="0">
-                <a:solidFill>
-                  <a:srgbClr val="5D5D5D"/>
-                </a:solidFill>
-                <a:latin typeface="+mj-ea"/>
-                <a:ea typeface="+mj-ea"/>
-              </a:rPr>
-              <a:t>는 작은 </a:t>
-            </a:r>
-            <a:r>
-              <a:rPr lang="en-US" altLang="ko-KR" b="0" dirty="0">
-                <a:solidFill>
-                  <a:srgbClr val="5D5D5D"/>
-                </a:solidFill>
-                <a:latin typeface="+mj-ea"/>
-                <a:ea typeface="+mj-ea"/>
-              </a:rPr>
-              <a:t>batch size</a:t>
-            </a:r>
-            <a:r>
-              <a:rPr lang="ko-KR" altLang="en-US" b="0" dirty="0">
-                <a:solidFill>
-                  <a:srgbClr val="5D5D5D"/>
-                </a:solidFill>
-                <a:latin typeface="+mj-ea"/>
-                <a:ea typeface="+mj-ea"/>
-              </a:rPr>
-              <a:t>에서 보다 높은 </a:t>
-            </a:r>
-            <a:r>
-              <a:rPr lang="en-US" altLang="ko-KR" b="0" dirty="0">
-                <a:solidFill>
-                  <a:srgbClr val="5D5D5D"/>
-                </a:solidFill>
-                <a:latin typeface="+mj-ea"/>
-                <a:ea typeface="+mj-ea"/>
-              </a:rPr>
-              <a:t>test accuracy</a:t>
-            </a:r>
-            <a:r>
-              <a:rPr lang="ko-KR" altLang="en-US" b="0" dirty="0">
-                <a:solidFill>
-                  <a:srgbClr val="5D5D5D"/>
-                </a:solidFill>
-                <a:latin typeface="+mj-ea"/>
-                <a:ea typeface="+mj-ea"/>
-              </a:rPr>
-              <a:t>를 얻을 수 있음을 보여줍니다</a:t>
-            </a:r>
-            <a:r>
-              <a:rPr lang="en-US" altLang="ko-KR" b="0" dirty="0">
-                <a:solidFill>
-                  <a:srgbClr val="5D5D5D"/>
-                </a:solidFill>
-                <a:latin typeface="+mj-ea"/>
-                <a:ea typeface="+mj-ea"/>
-              </a:rPr>
-              <a:t>. </a:t>
-            </a:r>
-            <a:r>
-              <a:rPr lang="ko-KR" altLang="en-US" b="0" dirty="0">
-                <a:solidFill>
-                  <a:srgbClr val="5D5D5D"/>
-                </a:solidFill>
-                <a:latin typeface="+mj-ea"/>
-                <a:ea typeface="+mj-ea"/>
-              </a:rPr>
-              <a:t>또한 </a:t>
-            </a:r>
-            <a:r>
-              <a:rPr lang="en-US" altLang="ko-KR" b="0" dirty="0">
-                <a:solidFill>
-                  <a:srgbClr val="5D5D5D"/>
-                </a:solidFill>
-                <a:latin typeface="+mj-ea"/>
-                <a:ea typeface="+mj-ea"/>
-              </a:rPr>
-              <a:t>batch size</a:t>
-            </a:r>
-            <a:r>
-              <a:rPr lang="ko-KR" altLang="en-US" b="0" dirty="0">
-                <a:solidFill>
-                  <a:srgbClr val="5D5D5D"/>
-                </a:solidFill>
-                <a:latin typeface="+mj-ea"/>
-                <a:ea typeface="+mj-ea"/>
-              </a:rPr>
-              <a:t>를 고정하고 </a:t>
-            </a:r>
-            <a:r>
-              <a:rPr lang="en-US" altLang="ko-KR" b="0" dirty="0">
-                <a:solidFill>
-                  <a:srgbClr val="5D5D5D"/>
-                </a:solidFill>
-                <a:latin typeface="+mj-ea"/>
-                <a:ea typeface="+mj-ea"/>
-              </a:rPr>
-              <a:t>learning rate</a:t>
-            </a:r>
-            <a:r>
-              <a:rPr lang="ko-KR" altLang="en-US" b="0" dirty="0">
-                <a:solidFill>
-                  <a:srgbClr val="5D5D5D"/>
-                </a:solidFill>
-                <a:latin typeface="+mj-ea"/>
-                <a:ea typeface="+mj-ea"/>
-              </a:rPr>
-              <a:t>를 변화시킨 그래프 </a:t>
-            </a:r>
-            <a:r>
-              <a:rPr lang="en-US" altLang="ko-KR" b="0" dirty="0">
-                <a:solidFill>
-                  <a:srgbClr val="5D5D5D"/>
-                </a:solidFill>
-                <a:latin typeface="+mj-ea"/>
-                <a:ea typeface="+mj-ea"/>
-              </a:rPr>
-              <a:t>(</a:t>
-            </a:r>
-            <a:r>
-              <a:rPr lang="ko-KR" altLang="en-US" b="0" dirty="0">
-                <a:solidFill>
-                  <a:srgbClr val="5D5D5D"/>
-                </a:solidFill>
-                <a:latin typeface="+mj-ea"/>
-                <a:ea typeface="+mj-ea"/>
-              </a:rPr>
-              <a:t>오른쪽</a:t>
-            </a:r>
-            <a:r>
-              <a:rPr lang="en-US" altLang="ko-KR" b="0" dirty="0">
-                <a:solidFill>
-                  <a:srgbClr val="5D5D5D"/>
-                </a:solidFill>
-                <a:latin typeface="+mj-ea"/>
-                <a:ea typeface="+mj-ea"/>
-              </a:rPr>
-              <a:t>)</a:t>
-            </a:r>
-            <a:r>
-              <a:rPr lang="ko-KR" altLang="en-US" b="0" dirty="0">
-                <a:solidFill>
-                  <a:srgbClr val="5D5D5D"/>
-                </a:solidFill>
-                <a:latin typeface="+mj-ea"/>
-                <a:ea typeface="+mj-ea"/>
-              </a:rPr>
-              <a:t>를 보면</a:t>
-            </a:r>
-            <a:r>
-              <a:rPr lang="en-US" altLang="ko-KR" b="0" dirty="0">
-                <a:solidFill>
-                  <a:srgbClr val="5D5D5D"/>
-                </a:solidFill>
-                <a:latin typeface="+mj-ea"/>
-                <a:ea typeface="+mj-ea"/>
-              </a:rPr>
-              <a:t>, </a:t>
-            </a:r>
-            <a:r>
-              <a:rPr lang="ko-KR" altLang="en-US" b="0" dirty="0">
-                <a:solidFill>
-                  <a:srgbClr val="5D5D5D"/>
-                </a:solidFill>
-                <a:latin typeface="+mj-ea"/>
-                <a:ea typeface="+mj-ea"/>
-              </a:rPr>
-              <a:t>작은 </a:t>
-            </a:r>
-            <a:r>
-              <a:rPr lang="en-US" altLang="ko-KR" b="0" dirty="0">
-                <a:solidFill>
-                  <a:srgbClr val="5D5D5D"/>
-                </a:solidFill>
-                <a:latin typeface="+mj-ea"/>
-                <a:ea typeface="+mj-ea"/>
-              </a:rPr>
-              <a:t>batch</a:t>
-            </a:r>
-            <a:r>
-              <a:rPr lang="ko-KR" altLang="en-US" b="0" dirty="0">
-                <a:solidFill>
-                  <a:srgbClr val="5D5D5D"/>
-                </a:solidFill>
-                <a:latin typeface="+mj-ea"/>
-                <a:ea typeface="+mj-ea"/>
-              </a:rPr>
-              <a:t>를 사용할 경우 더 넓은 범위의 </a:t>
-            </a:r>
-            <a:r>
-              <a:rPr lang="en-US" altLang="ko-KR" b="0" dirty="0">
-                <a:solidFill>
-                  <a:srgbClr val="5D5D5D"/>
-                </a:solidFill>
-                <a:latin typeface="+mj-ea"/>
-                <a:ea typeface="+mj-ea"/>
-              </a:rPr>
-              <a:t>learning rate</a:t>
-            </a:r>
-            <a:r>
-              <a:rPr lang="ko-KR" altLang="en-US" b="0" dirty="0">
-                <a:solidFill>
-                  <a:srgbClr val="5D5D5D"/>
-                </a:solidFill>
-                <a:latin typeface="+mj-ea"/>
-                <a:ea typeface="+mj-ea"/>
-              </a:rPr>
-              <a:t>에서 안정적인 학습이 가능함을 알 수 있습니다</a:t>
-            </a:r>
-            <a:r>
-              <a:rPr lang="en-US" altLang="ko-KR" b="0" dirty="0">
-                <a:solidFill>
-                  <a:srgbClr val="5D5D5D"/>
-                </a:solidFill>
-                <a:latin typeface="+mj-ea"/>
-                <a:ea typeface="+mj-ea"/>
-              </a:rPr>
-              <a:t>.</a:t>
-            </a:r>
-            <a:endParaRPr lang="ko-KR" altLang="en-US" dirty="0">
+            <a:pPr>
+              <a:lnSpc>
+                <a:spcPct val="150000"/>
+              </a:lnSpc>
+            </a:pPr>
+            <a:r>
+              <a:rPr lang="ko-KR" altLang="en-US" sz="1600" dirty="0" smtClean="0">
+                <a:solidFill>
+                  <a:srgbClr val="242729"/>
+                </a:solidFill>
+                <a:latin typeface="+mj-ea"/>
+              </a:rPr>
+              <a:t>예제</a:t>
+            </a:r>
+            <a:endParaRPr lang="en-US" altLang="ko-KR" sz="1600" dirty="0">
+              <a:solidFill>
+                <a:srgbClr val="242729"/>
+              </a:solidFill>
               <a:latin typeface="+mj-ea"/>
-              <a:ea typeface="+mj-ea"/>
             </a:endParaRPr>
           </a:p>
         </p:txBody>
@@ -15432,17 +14710,120 @@
           <a:lstStyle/>
           <a:p>
             <a:fld id="{33796E3F-F6B7-490E-938A-9F8EC05675D0}" type="slidenum">
-              <a:rPr lang="ko-KR" altLang="en-US" smtClean="0"/>
+              <a:rPr lang="ko-KR" altLang="en-US" smtClean="0">
+                <a:latin typeface="+mj-ea"/>
+                <a:ea typeface="+mj-ea"/>
+              </a:rPr>
               <a:pPr/>
               <a:t>15</a:t>
             </a:fld>
-            <a:endParaRPr lang="ko-KR" altLang="en-US"/>
+            <a:endParaRPr lang="ko-KR" altLang="en-US">
+              <a:latin typeface="+mj-ea"/>
+              <a:ea typeface="+mj-ea"/>
+            </a:endParaRPr>
           </a:p>
         </p:txBody>
       </p:sp>
       <p:sp>
         <p:nvSpPr>
-          <p:cNvPr id="5" name="Rectangle 2"/>
+          <p:cNvPr id="8" name="Rectangle 41">
+            <a:extLst>
+              <a:ext uri="{FF2B5EF4-FFF2-40B4-BE49-F238E27FC236}">
+                <a16:creationId xmlns:a16="http://schemas.microsoft.com/office/drawing/2014/main" id="{83FF4C79-FD07-4B45-A74F-F47818CE5E37}"/>
+              </a:ext>
+            </a:extLst>
+          </p:cNvPr>
+          <p:cNvSpPr>
+            <a:spLocks noChangeArrowheads="1"/>
+          </p:cNvSpPr>
+          <p:nvPr/>
+        </p:nvSpPr>
+        <p:spPr bwMode="auto">
+          <a:xfrm>
+            <a:off x="4448944" y="-2042242"/>
+            <a:ext cx="8928992" cy="2384622"/>
+          </a:xfrm>
+          <a:prstGeom prst="rect">
+            <a:avLst/>
+          </a:prstGeom>
+          <a:noFill/>
+          <a:ln w="9525" algn="ctr">
+            <a:noFill/>
+            <a:miter lim="800000"/>
+            <a:headEnd/>
+            <a:tailEnd/>
+          </a:ln>
+          <a:effectLst/>
+        </p:spPr>
+        <p:txBody>
+          <a:bodyPr lIns="72000" tIns="0" rIns="0" bIns="0" anchor="t"/>
+          <a:lstStyle/>
+          <a:p>
+            <a:pPr latinLnBrk="0">
+              <a:lnSpc>
+                <a:spcPct val="150000"/>
+              </a:lnSpc>
+            </a:pPr>
+            <a:r>
+              <a:rPr lang="en-US" altLang="ko-KR" sz="1600" dirty="0" smtClean="0">
+                <a:latin typeface="+mj-ea"/>
+                <a:ea typeface="+mj-ea"/>
+              </a:rPr>
+              <a:t>In general: Large batch sizes result in faster progress in training, but don’t always converge as fast. Smaller batch sizes train slower, but can converge faster. It’s definitely problem dependent.</a:t>
+            </a:r>
+          </a:p>
+          <a:p>
+            <a:pPr latinLnBrk="0">
+              <a:lnSpc>
+                <a:spcPct val="150000"/>
+              </a:lnSpc>
+            </a:pPr>
+            <a:endParaRPr lang="en-US" altLang="ko-KR" sz="1600" dirty="0">
+              <a:latin typeface="+mj-ea"/>
+              <a:ea typeface="+mj-ea"/>
+            </a:endParaRPr>
+          </a:p>
+          <a:p>
+            <a:pPr latinLnBrk="0">
+              <a:lnSpc>
+                <a:spcPct val="150000"/>
+              </a:lnSpc>
+            </a:pPr>
+            <a:r>
+              <a:rPr lang="en-US" altLang="ko-KR" sz="1600" dirty="0" smtClean="0">
+                <a:latin typeface="+mj-ea"/>
+                <a:ea typeface="+mj-ea"/>
+              </a:rPr>
+              <a:t>In general: The models improve with more epochs of training, to a point. They’ll start to plateau in accuracy as they converge. </a:t>
+            </a:r>
+          </a:p>
+          <a:p>
+            <a:pPr latinLnBrk="0">
+              <a:lnSpc>
+                <a:spcPct val="150000"/>
+              </a:lnSpc>
+            </a:pPr>
+            <a:endParaRPr lang="en-US" altLang="ko-KR" sz="1600" dirty="0">
+              <a:latin typeface="+mj-ea"/>
+              <a:ea typeface="+mj-ea"/>
+            </a:endParaRPr>
+          </a:p>
+          <a:p>
+            <a:pPr latinLnBrk="0">
+              <a:lnSpc>
+                <a:spcPct val="150000"/>
+              </a:lnSpc>
+            </a:pPr>
+            <a:endParaRPr lang="en-US" altLang="ko-KR" sz="1600" dirty="0">
+              <a:latin typeface="+mj-ea"/>
+              <a:ea typeface="+mj-ea"/>
+            </a:endParaRPr>
+          </a:p>
+        </p:txBody>
+      </p:sp>
+      <p:sp>
+        <p:nvSpPr>
+          <p:cNvPr id="11" name="Rectangle 2"/>
           <p:cNvSpPr txBox="1">
             <a:spLocks noChangeArrowheads="1"/>
           </p:cNvSpPr>
@@ -15450,7 +14831,7 @@
         </p:nvSpPr>
         <p:spPr bwMode="auto">
           <a:xfrm>
-            <a:off x="128463" y="201122"/>
+            <a:off x="128464" y="215600"/>
             <a:ext cx="6867649" cy="400110"/>
           </a:xfrm>
           <a:prstGeom prst="rect">
@@ -15592,7 +14973,17 @@
             </a:lvl9pPr>
           </a:lstStyle>
           <a:p>
-            <a:pPr eaLnBrk="1" hangingPunct="1"/>
+            <a:r>
+              <a:rPr lang="en-US" altLang="ko-KR" sz="2000" dirty="0" smtClean="0">
+                <a:solidFill>
+                  <a:schemeClr val="bg1"/>
+                </a:solidFill>
+                <a:latin typeface="+mj-ea"/>
+                <a:ea typeface="+mj-ea"/>
+                <a:sym typeface="Wingdings" pitchFamily="2" charset="2"/>
+              </a:rPr>
+              <a:t> </a:t>
+            </a:r>
             <a:r>
               <a:rPr lang="en-US" altLang="ko-KR" sz="2000" dirty="0">
                 <a:solidFill>
@@ -15602,7 +14993,7 @@
                 <a:ea typeface="+mj-ea"/>
                 <a:sym typeface="Wingdings" pitchFamily="2" charset="2"/>
               </a:rPr>
-              <a:t> </a:t>
+              <a:t>Large </a:t>
             </a:r>
             <a:r>
               <a:rPr lang="en-US" altLang="ko-KR" sz="2000" dirty="0" smtClean="0">
@@ -15613,7 +15004,18 @@
                 <a:ea typeface="+mj-ea"/>
                 <a:sym typeface="Wingdings" pitchFamily="2" charset="2"/>
               </a:rPr>
-              <a:t>Learning Rate</a:t>
+              <a:t>Batch vs </a:t>
+            </a:r>
+            <a:r>
+              <a:rPr lang="en-US" altLang="ko-KR" sz="2000" dirty="0" smtClean="0">
+                <a:solidFill>
+                  <a:schemeClr val="bg1"/>
+                </a:solidFill>
+                <a:latin typeface="+mj-ea"/>
+                <a:ea typeface="+mj-ea"/>
+                <a:sym typeface="Wingdings" pitchFamily="2" charset="2"/>
+              </a:rPr>
+              <a:t>Small Batch</a:t>
             </a:r>
             <a:endParaRPr lang="en-US" altLang="ko-KR" sz="2000" dirty="0">
               <a:solidFill>
@@ -15626,10 +15028,1111 @@
           </a:p>
         </p:txBody>
       </p:sp>
+      <p:grpSp>
+        <p:nvGrpSpPr>
+          <p:cNvPr id="20" name="그룹 19"/>
+          <p:cNvGrpSpPr/>
+          <p:nvPr/>
+        </p:nvGrpSpPr>
+        <p:grpSpPr>
+          <a:xfrm>
+            <a:off x="1021223" y="1260875"/>
+            <a:ext cx="7632848" cy="3805145"/>
+            <a:chOff x="1021223" y="1400540"/>
+            <a:chExt cx="7632848" cy="3805145"/>
+          </a:xfrm>
+        </p:grpSpPr>
+        <p:sp>
+          <p:nvSpPr>
+            <p:cNvPr id="12" name="직사각형 11"/>
+            <p:cNvSpPr/>
+            <p:nvPr/>
+          </p:nvSpPr>
+          <p:spPr>
+            <a:xfrm>
+              <a:off x="1021223" y="1400540"/>
+              <a:ext cx="3816424" cy="3805145"/>
+            </a:xfrm>
+            <a:prstGeom prst="rect">
+              <a:avLst/>
+            </a:prstGeom>
+            <a:solidFill>
+              <a:schemeClr val="bg1"/>
+            </a:solidFill>
+            <a:ln>
+              <a:solidFill>
+                <a:schemeClr val="tx1">
+                  <a:lumMod val="50000"/>
+                  <a:lumOff val="50000"/>
+                </a:schemeClr>
+              </a:solidFill>
+            </a:ln>
+          </p:spPr>
+          <p:style>
+            <a:lnRef idx="2">
+              <a:schemeClr val="accent1">
+                <a:shade val="50000"/>
+              </a:schemeClr>
+            </a:lnRef>
+            <a:fillRef idx="1">
+              <a:schemeClr val="accent1"/>
+            </a:fillRef>
+            <a:effectRef idx="0">
+              <a:schemeClr val="accent1"/>
+            </a:effectRef>
+            <a:fontRef idx="minor">
+              <a:schemeClr val="lt1"/>
+            </a:fontRef>
+          </p:style>
+          <p:txBody>
+            <a:bodyPr rtlCol="0" anchor="ctr"/>
+            <a:lstStyle/>
+            <a:p>
+              <a:pPr algn="ctr"/>
+              <a:endParaRPr lang="ko-KR" altLang="en-US">
+                <a:latin typeface="+mj-ea"/>
+                <a:ea typeface="+mj-ea"/>
+              </a:endParaRPr>
+            </a:p>
+          </p:txBody>
+        </p:sp>
+        <p:sp>
+          <p:nvSpPr>
+            <p:cNvPr id="13" name="직사각형 12"/>
+            <p:cNvSpPr/>
+            <p:nvPr/>
+          </p:nvSpPr>
+          <p:spPr>
+            <a:xfrm>
+              <a:off x="4837647" y="1400540"/>
+              <a:ext cx="3816424" cy="3805145"/>
+            </a:xfrm>
+            <a:prstGeom prst="rect">
+              <a:avLst/>
+            </a:prstGeom>
+            <a:solidFill>
+              <a:schemeClr val="bg1"/>
+            </a:solidFill>
+            <a:ln>
+              <a:solidFill>
+                <a:schemeClr val="tx1">
+                  <a:lumMod val="50000"/>
+                  <a:lumOff val="50000"/>
+                </a:schemeClr>
+              </a:solidFill>
+            </a:ln>
+          </p:spPr>
+          <p:style>
+            <a:lnRef idx="2">
+              <a:schemeClr val="accent1">
+                <a:shade val="50000"/>
+              </a:schemeClr>
+            </a:lnRef>
+            <a:fillRef idx="1">
+              <a:schemeClr val="accent1"/>
+            </a:fillRef>
+            <a:effectRef idx="0">
+              <a:schemeClr val="accent1"/>
+            </a:effectRef>
+            <a:fontRef idx="minor">
+              <a:schemeClr val="lt1"/>
+            </a:fontRef>
+          </p:style>
+          <p:txBody>
+            <a:bodyPr rtlCol="0" anchor="ctr"/>
+            <a:lstStyle/>
+            <a:p>
+              <a:pPr algn="ctr"/>
+              <a:endParaRPr lang="ko-KR" altLang="en-US">
+                <a:latin typeface="+mj-ea"/>
+                <a:ea typeface="+mj-ea"/>
+              </a:endParaRPr>
+            </a:p>
+          </p:txBody>
+        </p:sp>
+        <p:sp>
+          <p:nvSpPr>
+            <p:cNvPr id="14" name="직사각형 13"/>
+            <p:cNvSpPr/>
+            <p:nvPr/>
+          </p:nvSpPr>
+          <p:spPr>
+            <a:xfrm>
+              <a:off x="1021223" y="1400540"/>
+              <a:ext cx="3816424" cy="588300"/>
+            </a:xfrm>
+            <a:prstGeom prst="rect">
+              <a:avLst/>
+            </a:prstGeom>
+            <a:solidFill>
+              <a:schemeClr val="bg1">
+                <a:lumMod val="65000"/>
+              </a:schemeClr>
+            </a:solidFill>
+            <a:ln>
+              <a:solidFill>
+                <a:schemeClr val="tx1">
+                  <a:lumMod val="50000"/>
+                  <a:lumOff val="50000"/>
+                </a:schemeClr>
+              </a:solidFill>
+            </a:ln>
+          </p:spPr>
+          <p:style>
+            <a:lnRef idx="2">
+              <a:schemeClr val="accent1">
+                <a:shade val="50000"/>
+              </a:schemeClr>
+            </a:lnRef>
+            <a:fillRef idx="1">
+              <a:schemeClr val="accent1"/>
+            </a:fillRef>
+            <a:effectRef idx="0">
+              <a:schemeClr val="accent1"/>
+            </a:effectRef>
+            <a:fontRef idx="minor">
+              <a:schemeClr val="lt1"/>
+            </a:fontRef>
+          </p:style>
+          <p:txBody>
+            <a:bodyPr rtlCol="0" anchor="ctr"/>
+            <a:lstStyle/>
+            <a:p>
+              <a:pPr algn="ctr"/>
+              <a:r>
+                <a:rPr lang="en-US" altLang="ko-KR" sz="1600" dirty="0" smtClean="0">
+                  <a:latin typeface="+mj-ea"/>
+                  <a:ea typeface="+mj-ea"/>
+                </a:rPr>
+                <a:t>Large Batch</a:t>
+              </a:r>
+              <a:endParaRPr lang="ko-KR" altLang="en-US" sz="1600" dirty="0">
+                <a:latin typeface="+mj-ea"/>
+                <a:ea typeface="+mj-ea"/>
+              </a:endParaRPr>
+            </a:p>
+          </p:txBody>
+        </p:sp>
+        <p:sp>
+          <p:nvSpPr>
+            <p:cNvPr id="15" name="직사각형 14"/>
+            <p:cNvSpPr/>
+            <p:nvPr/>
+          </p:nvSpPr>
+          <p:spPr>
+            <a:xfrm>
+              <a:off x="4837647" y="1400540"/>
+              <a:ext cx="3816424" cy="588300"/>
+            </a:xfrm>
+            <a:prstGeom prst="rect">
+              <a:avLst/>
+            </a:prstGeom>
+            <a:solidFill>
+              <a:schemeClr val="bg1">
+                <a:lumMod val="65000"/>
+              </a:schemeClr>
+            </a:solidFill>
+            <a:ln>
+              <a:solidFill>
+                <a:schemeClr val="tx1">
+                  <a:lumMod val="50000"/>
+                  <a:lumOff val="50000"/>
+                </a:schemeClr>
+              </a:solidFill>
+            </a:ln>
+          </p:spPr>
+          <p:style>
+            <a:lnRef idx="2">
+              <a:schemeClr val="accent1">
+                <a:shade val="50000"/>
+              </a:schemeClr>
+            </a:lnRef>
+            <a:fillRef idx="1">
+              <a:schemeClr val="accent1"/>
+            </a:fillRef>
+            <a:effectRef idx="0">
+              <a:schemeClr val="accent1"/>
+            </a:effectRef>
+            <a:fontRef idx="minor">
+              <a:schemeClr val="lt1"/>
+            </a:fontRef>
+          </p:style>
+          <p:txBody>
+            <a:bodyPr rtlCol="0" anchor="ctr"/>
+            <a:lstStyle/>
+            <a:p>
+              <a:pPr algn="ctr"/>
+              <a:r>
+                <a:rPr lang="en-US" altLang="ko-KR" sz="1600" dirty="0" smtClean="0">
+                  <a:latin typeface="+mj-ea"/>
+                  <a:ea typeface="+mj-ea"/>
+                </a:rPr>
+                <a:t>Small Batch</a:t>
+              </a:r>
+              <a:endParaRPr lang="ko-KR" altLang="en-US" sz="1600" dirty="0">
+                <a:latin typeface="+mj-ea"/>
+                <a:ea typeface="+mj-ea"/>
+              </a:endParaRPr>
+            </a:p>
+          </p:txBody>
+        </p:sp>
+        <p:sp>
+          <p:nvSpPr>
+            <p:cNvPr id="17" name="TextBox 16"/>
+            <p:cNvSpPr txBox="1"/>
+            <p:nvPr/>
+          </p:nvSpPr>
+          <p:spPr>
+            <a:xfrm>
+              <a:off x="1236829" y="2204864"/>
+              <a:ext cx="3356131" cy="3000821"/>
+            </a:xfrm>
+            <a:prstGeom prst="rect">
+              <a:avLst/>
+            </a:prstGeom>
+            <a:noFill/>
+          </p:spPr>
+          <p:txBody>
+            <a:bodyPr wrap="square" rtlCol="0">
+              <a:spAutoFit/>
+            </a:bodyPr>
+            <a:lstStyle/>
+            <a:p>
+              <a:pPr marL="285750" indent="-285750">
+                <a:lnSpc>
+                  <a:spcPct val="150000"/>
+                </a:lnSpc>
+                <a:buFont typeface="Arial" panose="020B0604020202020204" pitchFamily="34" charset="0"/>
+                <a:buChar char="•"/>
+              </a:pPr>
+              <a:r>
+                <a:rPr lang="en-US" altLang="ko-KR" b="0" dirty="0" smtClean="0">
+                  <a:latin typeface="+mj-ea"/>
+                  <a:ea typeface="+mj-ea"/>
+                </a:rPr>
+                <a:t>Gradient</a:t>
+              </a:r>
+              <a:r>
+                <a:rPr lang="ko-KR" altLang="en-US" b="0" dirty="0" smtClean="0">
+                  <a:latin typeface="+mj-ea"/>
+                  <a:ea typeface="+mj-ea"/>
+                </a:rPr>
+                <a:t>에 대한 정확한 추정</a:t>
+              </a:r>
+              <a:r>
+                <a:rPr lang="en-US" altLang="ko-KR" b="0" dirty="0" smtClean="0">
+                  <a:latin typeface="+mj-ea"/>
+                  <a:ea typeface="+mj-ea"/>
+                </a:rPr>
+                <a:t/>
+              </a:r>
+              <a:br>
+                <a:rPr lang="en-US" altLang="ko-KR" b="0" dirty="0" smtClean="0">
+                  <a:latin typeface="+mj-ea"/>
+                  <a:ea typeface="+mj-ea"/>
+                </a:rPr>
+              </a:br>
+              <a:r>
+                <a:rPr lang="en-US" altLang="ko-KR" b="0" dirty="0" smtClean="0">
+                  <a:latin typeface="+mj-ea"/>
+                  <a:ea typeface="+mj-ea"/>
+                </a:rPr>
+                <a:t>(low </a:t>
+              </a:r>
+              <a:r>
+                <a:rPr lang="en-US" altLang="ko-KR" b="0" dirty="0" err="1" smtClean="0">
+                  <a:latin typeface="+mj-ea"/>
+                  <a:ea typeface="+mj-ea"/>
+                </a:rPr>
+                <a:t>varience</a:t>
+              </a:r>
+              <a:r>
+                <a:rPr lang="en-US" altLang="ko-KR" b="0" dirty="0" smtClean="0">
+                  <a:latin typeface="+mj-ea"/>
+                  <a:ea typeface="+mj-ea"/>
+                </a:rPr>
+                <a:t>) </a:t>
+              </a:r>
+            </a:p>
+            <a:p>
+              <a:pPr marL="285750" indent="-285750">
+                <a:lnSpc>
+                  <a:spcPct val="150000"/>
+                </a:lnSpc>
+                <a:buFont typeface="Arial" panose="020B0604020202020204" pitchFamily="34" charset="0"/>
+                <a:buChar char="•"/>
+              </a:pPr>
+              <a:r>
+                <a:rPr lang="ko-KR" altLang="en-US" b="0" dirty="0" smtClean="0">
+                  <a:latin typeface="+mj-ea"/>
+                  <a:ea typeface="+mj-ea"/>
+                </a:rPr>
+                <a:t>각 </a:t>
+              </a:r>
+              <a:r>
+                <a:rPr lang="en-US" altLang="ko-KR" b="0" dirty="0" smtClean="0">
+                  <a:latin typeface="+mj-ea"/>
+                  <a:ea typeface="+mj-ea"/>
+                </a:rPr>
+                <a:t>iteration </a:t>
+              </a:r>
+              <a:r>
+                <a:rPr lang="ko-KR" altLang="en-US" b="0" dirty="0" smtClean="0">
+                  <a:latin typeface="+mj-ea"/>
+                  <a:ea typeface="+mj-ea"/>
+                </a:rPr>
+                <a:t>마다 컴퓨팅 자원 많이 소모</a:t>
+              </a:r>
+              <a:endParaRPr lang="en-US" altLang="ko-KR" b="0" dirty="0" smtClean="0">
+                <a:latin typeface="+mj-ea"/>
+                <a:ea typeface="+mj-ea"/>
+              </a:endParaRPr>
+            </a:p>
+            <a:p>
+              <a:pPr marL="285750" indent="-285750">
+                <a:lnSpc>
+                  <a:spcPct val="150000"/>
+                </a:lnSpc>
+                <a:buFont typeface="Arial" panose="020B0604020202020204" pitchFamily="34" charset="0"/>
+                <a:buChar char="•"/>
+              </a:pPr>
+              <a:r>
+                <a:rPr lang="ko-KR" altLang="en-US" b="0" dirty="0" err="1" smtClean="0">
+                  <a:latin typeface="+mj-ea"/>
+                  <a:ea typeface="+mj-ea"/>
+                </a:rPr>
+                <a:t>병렬처리에</a:t>
+              </a:r>
+              <a:r>
+                <a:rPr lang="ko-KR" altLang="en-US" b="0" dirty="0" smtClean="0">
+                  <a:latin typeface="+mj-ea"/>
+                  <a:ea typeface="+mj-ea"/>
+                </a:rPr>
+                <a:t> 용이함</a:t>
+              </a:r>
+              <a:endParaRPr lang="en-US" altLang="ko-KR" b="0" dirty="0" smtClean="0">
+                <a:latin typeface="+mj-ea"/>
+                <a:ea typeface="+mj-ea"/>
+              </a:endParaRPr>
+            </a:p>
+            <a:p>
+              <a:pPr marL="285750" indent="-285750">
+                <a:lnSpc>
+                  <a:spcPct val="150000"/>
+                </a:lnSpc>
+                <a:buFont typeface="Arial" panose="020B0604020202020204" pitchFamily="34" charset="0"/>
+                <a:buChar char="•"/>
+              </a:pPr>
+              <a:r>
+                <a:rPr lang="en-US" altLang="ko-KR" b="0" dirty="0" smtClean="0">
+                  <a:latin typeface="+mj-ea"/>
+                  <a:ea typeface="+mj-ea"/>
+                </a:rPr>
+                <a:t>Gradient</a:t>
+              </a:r>
+              <a:r>
+                <a:rPr lang="ko-KR" altLang="en-US" b="0" dirty="0" smtClean="0">
+                  <a:latin typeface="+mj-ea"/>
+                  <a:ea typeface="+mj-ea"/>
+                </a:rPr>
+                <a:t>의 </a:t>
+              </a:r>
+              <a:r>
+                <a:rPr lang="ko-KR" altLang="en-US" b="0" dirty="0" err="1" smtClean="0">
+                  <a:latin typeface="+mj-ea"/>
+                  <a:ea typeface="+mj-ea"/>
+                </a:rPr>
+                <a:t>없데이트가</a:t>
+              </a:r>
+              <a:r>
+                <a:rPr lang="ko-KR" altLang="en-US" b="0" dirty="0" smtClean="0">
+                  <a:latin typeface="+mj-ea"/>
+                  <a:ea typeface="+mj-ea"/>
+                </a:rPr>
+                <a:t> 느려 </a:t>
+              </a:r>
+              <a:r>
+                <a:rPr lang="en-US" altLang="ko-KR" b="0" dirty="0" smtClean="0">
+                  <a:latin typeface="+mj-ea"/>
+                  <a:ea typeface="+mj-ea"/>
+                </a:rPr>
+                <a:t>weight update</a:t>
+              </a:r>
+              <a:r>
+                <a:rPr lang="ko-KR" altLang="en-US" b="0" dirty="0" smtClean="0">
+                  <a:latin typeface="+mj-ea"/>
+                  <a:ea typeface="+mj-ea"/>
+                </a:rPr>
+                <a:t>가 부정확해 질 수 있다</a:t>
+              </a:r>
+              <a:r>
+                <a:rPr lang="en-US" altLang="ko-KR" b="0" dirty="0" smtClean="0">
+                  <a:latin typeface="+mj-ea"/>
+                  <a:ea typeface="+mj-ea"/>
+                </a:rPr>
+                <a:t/>
+              </a:r>
+              <a:br>
+                <a:rPr lang="en-US" altLang="ko-KR" b="0" dirty="0" smtClean="0">
+                  <a:latin typeface="+mj-ea"/>
+                  <a:ea typeface="+mj-ea"/>
+                </a:rPr>
+              </a:br>
+              <a:r>
+                <a:rPr lang="en-US" altLang="ko-KR" b="0" dirty="0" smtClean="0">
+                  <a:latin typeface="+mj-ea"/>
+                  <a:ea typeface="+mj-ea"/>
+                  <a:sym typeface="Wingdings" panose="05000000000000000000" pitchFamily="2" charset="2"/>
+                </a:rPr>
+                <a:t> learning rate</a:t>
+              </a:r>
+              <a:r>
+                <a:rPr lang="ko-KR" altLang="en-US" b="0" dirty="0" smtClean="0">
+                  <a:latin typeface="+mj-ea"/>
+                  <a:ea typeface="+mj-ea"/>
+                  <a:sym typeface="Wingdings" panose="05000000000000000000" pitchFamily="2" charset="2"/>
+                </a:rPr>
+                <a:t>를 크게 가져가지 못한다</a:t>
+              </a:r>
+              <a:r>
+                <a:rPr lang="en-US" altLang="ko-KR" b="0" dirty="0" smtClean="0">
+                  <a:latin typeface="+mj-ea"/>
+                  <a:ea typeface="+mj-ea"/>
+                  <a:sym typeface="Wingdings" panose="05000000000000000000" pitchFamily="2" charset="2"/>
+                </a:rPr>
+                <a:t>.</a:t>
+              </a:r>
+              <a:endParaRPr lang="en-US" altLang="ko-KR" b="0" dirty="0" smtClean="0">
+                <a:latin typeface="+mj-ea"/>
+                <a:ea typeface="+mj-ea"/>
+              </a:endParaRPr>
+            </a:p>
+          </p:txBody>
+        </p:sp>
+        <p:sp>
+          <p:nvSpPr>
+            <p:cNvPr id="18" name="TextBox 17"/>
+            <p:cNvSpPr txBox="1"/>
+            <p:nvPr/>
+          </p:nvSpPr>
+          <p:spPr>
+            <a:xfrm>
+              <a:off x="5101784" y="2204864"/>
+              <a:ext cx="3356131" cy="2677656"/>
+            </a:xfrm>
+            <a:prstGeom prst="rect">
+              <a:avLst/>
+            </a:prstGeom>
+            <a:noFill/>
+          </p:spPr>
+          <p:txBody>
+            <a:bodyPr wrap="square" rtlCol="0">
+              <a:spAutoFit/>
+            </a:bodyPr>
+            <a:lstStyle/>
+            <a:p>
+              <a:pPr marL="285750" indent="-285750">
+                <a:lnSpc>
+                  <a:spcPct val="150000"/>
+                </a:lnSpc>
+                <a:buFont typeface="Arial" panose="020B0604020202020204" pitchFamily="34" charset="0"/>
+                <a:buChar char="•"/>
+              </a:pPr>
+              <a:r>
+                <a:rPr lang="en-US" altLang="ko-KR" b="0" dirty="0" smtClean="0">
+                  <a:latin typeface="+mj-ea"/>
+                  <a:ea typeface="+mj-ea"/>
+                </a:rPr>
+                <a:t>Gradient</a:t>
+              </a:r>
+              <a:r>
+                <a:rPr lang="ko-KR" altLang="en-US" b="0" dirty="0" smtClean="0">
+                  <a:latin typeface="+mj-ea"/>
+                  <a:ea typeface="+mj-ea"/>
+                </a:rPr>
+                <a:t>에 대한 부정확한 추정</a:t>
+              </a:r>
+              <a:r>
+                <a:rPr lang="en-US" altLang="ko-KR" b="0" dirty="0" smtClean="0">
+                  <a:latin typeface="+mj-ea"/>
+                  <a:ea typeface="+mj-ea"/>
+                </a:rPr>
+                <a:t/>
+              </a:r>
+              <a:br>
+                <a:rPr lang="en-US" altLang="ko-KR" b="0" dirty="0" smtClean="0">
+                  <a:latin typeface="+mj-ea"/>
+                  <a:ea typeface="+mj-ea"/>
+                </a:rPr>
+              </a:br>
+              <a:r>
+                <a:rPr lang="en-US" altLang="ko-KR" b="0" dirty="0" smtClean="0">
+                  <a:latin typeface="+mj-ea"/>
+                  <a:ea typeface="+mj-ea"/>
+                </a:rPr>
+                <a:t>(high variance)</a:t>
+              </a:r>
+            </a:p>
+            <a:p>
+              <a:pPr marL="285750" indent="-285750">
+                <a:lnSpc>
+                  <a:spcPct val="150000"/>
+                </a:lnSpc>
+                <a:buFont typeface="Arial" panose="020B0604020202020204" pitchFamily="34" charset="0"/>
+                <a:buChar char="•"/>
+              </a:pPr>
+              <a:r>
+                <a:rPr lang="ko-KR" altLang="en-US" b="0" dirty="0" smtClean="0">
+                  <a:latin typeface="+mj-ea"/>
+                  <a:ea typeface="+mj-ea"/>
+                </a:rPr>
+                <a:t>각 </a:t>
+              </a:r>
+              <a:r>
+                <a:rPr lang="en-US" altLang="ko-KR" b="0" dirty="0" smtClean="0">
+                  <a:latin typeface="+mj-ea"/>
+                  <a:ea typeface="+mj-ea"/>
+                </a:rPr>
+                <a:t>iteration </a:t>
+              </a:r>
+              <a:r>
+                <a:rPr lang="ko-KR" altLang="en-US" b="0" dirty="0" smtClean="0">
+                  <a:latin typeface="+mj-ea"/>
+                  <a:ea typeface="+mj-ea"/>
+                </a:rPr>
+                <a:t>마다 컴퓨팅 자원 조금 소모</a:t>
+              </a:r>
+              <a:endParaRPr lang="en-US" altLang="ko-KR" b="0" dirty="0" smtClean="0">
+                <a:latin typeface="+mj-ea"/>
+                <a:ea typeface="+mj-ea"/>
+              </a:endParaRPr>
+            </a:p>
+            <a:p>
+              <a:pPr marL="285750" indent="-285750">
+                <a:lnSpc>
+                  <a:spcPct val="150000"/>
+                </a:lnSpc>
+                <a:buFont typeface="Arial" panose="020B0604020202020204" pitchFamily="34" charset="0"/>
+                <a:buChar char="•"/>
+              </a:pPr>
+              <a:r>
+                <a:rPr lang="ko-KR" altLang="en-US" b="0" dirty="0" err="1" smtClean="0">
+                  <a:latin typeface="+mj-ea"/>
+                  <a:ea typeface="+mj-ea"/>
+                </a:rPr>
+                <a:t>병렬처리에</a:t>
+              </a:r>
+              <a:r>
+                <a:rPr lang="ko-KR" altLang="en-US" b="0" dirty="0" smtClean="0">
+                  <a:latin typeface="+mj-ea"/>
+                  <a:ea typeface="+mj-ea"/>
+                </a:rPr>
+                <a:t> 용이하지 않음</a:t>
+              </a:r>
+              <a:endParaRPr lang="en-US" altLang="ko-KR" b="0" dirty="0" smtClean="0">
+                <a:latin typeface="+mj-ea"/>
+                <a:ea typeface="+mj-ea"/>
+              </a:endParaRPr>
+            </a:p>
+            <a:p>
+              <a:pPr marL="285750" indent="-285750">
+                <a:lnSpc>
+                  <a:spcPct val="150000"/>
+                </a:lnSpc>
+                <a:buFont typeface="Arial" panose="020B0604020202020204" pitchFamily="34" charset="0"/>
+                <a:buChar char="•"/>
+              </a:pPr>
+              <a:r>
+                <a:rPr lang="ko-KR" altLang="en-US" b="0" dirty="0" smtClean="0">
+                  <a:latin typeface="+mj-ea"/>
+                  <a:ea typeface="+mj-ea"/>
+                </a:rPr>
+                <a:t>빠르다</a:t>
+              </a:r>
+              <a:endParaRPr lang="en-US" altLang="ko-KR" b="0" dirty="0" smtClean="0">
+                <a:latin typeface="+mj-ea"/>
+                <a:ea typeface="+mj-ea"/>
+              </a:endParaRPr>
+            </a:p>
+            <a:p>
+              <a:pPr marL="285750" indent="-285750">
+                <a:lnSpc>
+                  <a:spcPct val="150000"/>
+                </a:lnSpc>
+                <a:buFont typeface="Arial" panose="020B0604020202020204" pitchFamily="34" charset="0"/>
+                <a:buChar char="•"/>
+              </a:pPr>
+              <a:r>
+                <a:rPr lang="ko-KR" altLang="en-US" b="0" dirty="0" smtClean="0">
+                  <a:latin typeface="+mj-ea"/>
+                  <a:ea typeface="+mj-ea"/>
+                </a:rPr>
+                <a:t>노이즈가 발생하여 일반화 오류를 </a:t>
+              </a:r>
+              <a:r>
+                <a:rPr lang="ko-KR" altLang="en-US" b="0" dirty="0" err="1" smtClean="0">
+                  <a:latin typeface="+mj-ea"/>
+                  <a:ea typeface="+mj-ea"/>
+                </a:rPr>
+                <a:t>줄일수</a:t>
+              </a:r>
+              <a:r>
+                <a:rPr lang="ko-KR" altLang="en-US" b="0" dirty="0" smtClean="0">
+                  <a:latin typeface="+mj-ea"/>
+                  <a:ea typeface="+mj-ea"/>
+                </a:rPr>
+                <a:t> 있음</a:t>
+              </a:r>
+              <a:endParaRPr lang="en-US" altLang="ko-KR" b="0" dirty="0" smtClean="0">
+                <a:latin typeface="+mj-ea"/>
+                <a:ea typeface="+mj-ea"/>
+              </a:endParaRPr>
+            </a:p>
+          </p:txBody>
+        </p:sp>
+      </p:grpSp>
+      <p:sp>
+        <p:nvSpPr>
+          <p:cNvPr id="21" name="TextBox 20"/>
+          <p:cNvSpPr txBox="1"/>
+          <p:nvPr/>
+        </p:nvSpPr>
+        <p:spPr>
+          <a:xfrm>
+            <a:off x="1021223" y="5282044"/>
+            <a:ext cx="7632848" cy="523220"/>
+          </a:xfrm>
+          <a:prstGeom prst="rect">
+            <a:avLst/>
+          </a:prstGeom>
+          <a:noFill/>
+        </p:spPr>
+        <p:txBody>
+          <a:bodyPr wrap="square" rtlCol="0">
+            <a:spAutoFit/>
+          </a:bodyPr>
+          <a:lstStyle/>
+          <a:p>
+            <a:r>
+              <a:rPr lang="ko-KR" altLang="en-US" dirty="0" smtClean="0">
+                <a:solidFill>
+                  <a:schemeClr val="tx1">
+                    <a:lumMod val="75000"/>
+                    <a:lumOff val="25000"/>
+                  </a:schemeClr>
+                </a:solidFill>
+                <a:latin typeface="+mj-ea"/>
+                <a:ea typeface="+mj-ea"/>
+              </a:rPr>
+              <a:t>문제에 따라 </a:t>
+            </a:r>
+            <a:r>
+              <a:rPr lang="en-US" altLang="ko-KR" dirty="0" smtClean="0">
+                <a:solidFill>
+                  <a:schemeClr val="tx1">
+                    <a:lumMod val="75000"/>
+                    <a:lumOff val="25000"/>
+                  </a:schemeClr>
+                </a:solidFill>
+                <a:latin typeface="+mj-ea"/>
+                <a:ea typeface="+mj-ea"/>
+              </a:rPr>
+              <a:t>batch size </a:t>
+            </a:r>
+            <a:r>
+              <a:rPr lang="ko-KR" altLang="en-US" dirty="0" smtClean="0">
+                <a:solidFill>
+                  <a:schemeClr val="tx1">
+                    <a:lumMod val="75000"/>
+                    <a:lumOff val="25000"/>
+                  </a:schemeClr>
+                </a:solidFill>
+                <a:latin typeface="+mj-ea"/>
+                <a:ea typeface="+mj-ea"/>
+              </a:rPr>
+              <a:t>가</a:t>
+            </a:r>
+            <a:r>
+              <a:rPr lang="en-US" altLang="ko-KR" dirty="0" smtClean="0">
+                <a:solidFill>
+                  <a:schemeClr val="tx1">
+                    <a:lumMod val="75000"/>
+                    <a:lumOff val="25000"/>
+                  </a:schemeClr>
+                </a:solidFill>
+                <a:latin typeface="+mj-ea"/>
+                <a:ea typeface="+mj-ea"/>
+              </a:rPr>
+              <a:t> </a:t>
+            </a:r>
+            <a:r>
+              <a:rPr lang="ko-KR" altLang="en-US" dirty="0" smtClean="0">
+                <a:solidFill>
+                  <a:schemeClr val="tx1">
+                    <a:lumMod val="75000"/>
+                    <a:lumOff val="25000"/>
+                  </a:schemeClr>
+                </a:solidFill>
+                <a:latin typeface="+mj-ea"/>
+                <a:ea typeface="+mj-ea"/>
+              </a:rPr>
+              <a:t>작용하는 특징은 다르기 때문에 그때그때 적절한 </a:t>
+            </a:r>
+            <a:r>
+              <a:rPr lang="en-US" altLang="ko-KR" dirty="0" smtClean="0">
+                <a:solidFill>
+                  <a:schemeClr val="tx1">
+                    <a:lumMod val="75000"/>
+                    <a:lumOff val="25000"/>
+                  </a:schemeClr>
+                </a:solidFill>
+                <a:latin typeface="+mj-ea"/>
+                <a:ea typeface="+mj-ea"/>
+              </a:rPr>
+              <a:t>batch size</a:t>
+            </a:r>
+            <a:r>
+              <a:rPr lang="ko-KR" altLang="en-US" dirty="0" smtClean="0">
+                <a:solidFill>
+                  <a:schemeClr val="tx1">
+                    <a:lumMod val="75000"/>
+                    <a:lumOff val="25000"/>
+                  </a:schemeClr>
+                </a:solidFill>
+                <a:latin typeface="+mj-ea"/>
+                <a:ea typeface="+mj-ea"/>
+              </a:rPr>
+              <a:t>를 선정하는 것이 중요하다</a:t>
+            </a:r>
+            <a:r>
+              <a:rPr lang="en-US" altLang="ko-KR" dirty="0" smtClean="0">
+                <a:solidFill>
+                  <a:schemeClr val="tx1">
+                    <a:lumMod val="75000"/>
+                    <a:lumOff val="25000"/>
+                  </a:schemeClr>
+                </a:solidFill>
+                <a:latin typeface="+mj-ea"/>
+                <a:ea typeface="+mj-ea"/>
+              </a:rPr>
+              <a:t>.</a:t>
+            </a:r>
+            <a:r>
+              <a:rPr lang="ko-KR" altLang="en-US" dirty="0" smtClean="0">
+                <a:solidFill>
+                  <a:schemeClr val="tx1">
+                    <a:lumMod val="75000"/>
+                    <a:lumOff val="25000"/>
+                  </a:schemeClr>
+                </a:solidFill>
+                <a:latin typeface="+mj-ea"/>
+                <a:ea typeface="+mj-ea"/>
+              </a:rPr>
+              <a:t> </a:t>
+            </a:r>
+            <a:endParaRPr lang="ko-KR" altLang="en-US" dirty="0">
+              <a:solidFill>
+                <a:schemeClr val="tx1">
+                  <a:lumMod val="75000"/>
+                  <a:lumOff val="25000"/>
+                </a:schemeClr>
+              </a:solidFill>
+              <a:latin typeface="+mj-ea"/>
+              <a:ea typeface="+mj-ea"/>
+            </a:endParaRPr>
+          </a:p>
+        </p:txBody>
+      </p:sp>
+      <p:sp>
+        <p:nvSpPr>
+          <p:cNvPr id="22" name="직사각형 21"/>
+          <p:cNvSpPr/>
+          <p:nvPr/>
+        </p:nvSpPr>
+        <p:spPr>
+          <a:xfrm>
+            <a:off x="0" y="7029400"/>
+            <a:ext cx="4953000" cy="1384995"/>
+          </a:xfrm>
+          <a:prstGeom prst="rect">
+            <a:avLst/>
+          </a:prstGeom>
+        </p:spPr>
+        <p:txBody>
+          <a:bodyPr>
+            <a:spAutoFit/>
+          </a:bodyPr>
+          <a:lstStyle/>
+          <a:p>
+            <a:r>
+              <a:rPr lang="en-US" altLang="ko-KR" dirty="0">
+                <a:latin typeface="+mj-ea"/>
+                <a:ea typeface="+mj-ea"/>
+                <a:hlinkClick r:id="rId2"/>
+              </a:rPr>
+              <a:t>https://blog.lunit.io/2018/08/03/batch-size-in-deep-learning</a:t>
+            </a:r>
+            <a:r>
+              <a:rPr lang="en-US" altLang="ko-KR" dirty="0" smtClean="0">
+                <a:latin typeface="+mj-ea"/>
+                <a:ea typeface="+mj-ea"/>
+                <a:hlinkClick r:id="rId2"/>
+              </a:rPr>
+              <a:t>/</a:t>
+            </a:r>
+            <a:endParaRPr lang="en-US" altLang="ko-KR" dirty="0" smtClean="0">
+              <a:latin typeface="+mj-ea"/>
+              <a:ea typeface="+mj-ea"/>
+            </a:endParaRPr>
+          </a:p>
+          <a:p>
+            <a:endParaRPr lang="en-US" altLang="ko-KR" dirty="0">
+              <a:latin typeface="+mj-ea"/>
+              <a:ea typeface="+mj-ea"/>
+            </a:endParaRPr>
+          </a:p>
+          <a:p>
+            <a:r>
+              <a:rPr lang="en-US" altLang="ko-KR" dirty="0">
+                <a:latin typeface="+mj-ea"/>
+                <a:ea typeface="+mj-ea"/>
+                <a:hlinkClick r:id="rId3"/>
+              </a:rPr>
+              <a:t>https://stats.stackexchange.com/questions/153531/what-is-batch-size-in-neural-network</a:t>
+            </a:r>
+            <a:endParaRPr lang="ko-KR" altLang="en-US" dirty="0">
+              <a:latin typeface="+mj-ea"/>
+              <a:ea typeface="+mj-ea"/>
+            </a:endParaRPr>
+          </a:p>
+          <a:p>
+            <a:endParaRPr lang="en-US" altLang="ko-KR" dirty="0">
+              <a:latin typeface="+mj-ea"/>
+              <a:ea typeface="+mj-ea"/>
+            </a:endParaRPr>
+          </a:p>
+        </p:txBody>
+      </p:sp>
+      <p:sp>
+        <p:nvSpPr>
+          <p:cNvPr id="23" name="직사각형 22"/>
+          <p:cNvSpPr/>
+          <p:nvPr/>
+        </p:nvSpPr>
+        <p:spPr>
+          <a:xfrm>
+            <a:off x="9224963" y="1156677"/>
+            <a:ext cx="5616624" cy="1384995"/>
+          </a:xfrm>
+          <a:prstGeom prst="rect">
+            <a:avLst/>
+          </a:prstGeom>
+        </p:spPr>
+        <p:txBody>
+          <a:bodyPr wrap="square">
+            <a:spAutoFit/>
+          </a:bodyPr>
+          <a:lstStyle/>
+          <a:p>
+            <a:pPr>
+              <a:buFont typeface="Arial" panose="020B0604020202020204" pitchFamily="34" charset="0"/>
+              <a:buChar char="•"/>
+            </a:pPr>
+            <a:r>
+              <a:rPr lang="en-US" altLang="ko-KR" b="0" dirty="0">
+                <a:solidFill>
+                  <a:srgbClr val="555555"/>
+                </a:solidFill>
+                <a:latin typeface="+mj-ea"/>
+                <a:ea typeface="+mj-ea"/>
+              </a:rPr>
+              <a:t>Batch size controls the accuracy of the estimate of the error gradient when training neural networks.</a:t>
+            </a:r>
+          </a:p>
+          <a:p>
+            <a:pPr>
+              <a:buFont typeface="Arial" panose="020B0604020202020204" pitchFamily="34" charset="0"/>
+              <a:buChar char="•"/>
+            </a:pPr>
+            <a:r>
+              <a:rPr lang="en-US" altLang="ko-KR" b="0" dirty="0">
+                <a:solidFill>
+                  <a:srgbClr val="555555"/>
+                </a:solidFill>
+                <a:latin typeface="+mj-ea"/>
+                <a:ea typeface="+mj-ea"/>
+              </a:rPr>
+              <a:t>Batch, Stochastic, and </a:t>
+            </a:r>
+            <a:r>
+              <a:rPr lang="en-US" altLang="ko-KR" b="0" dirty="0" err="1">
+                <a:solidFill>
+                  <a:srgbClr val="555555"/>
+                </a:solidFill>
+                <a:latin typeface="+mj-ea"/>
+                <a:ea typeface="+mj-ea"/>
+              </a:rPr>
+              <a:t>Minibatch</a:t>
+            </a:r>
+            <a:r>
+              <a:rPr lang="en-US" altLang="ko-KR" b="0" dirty="0">
+                <a:solidFill>
+                  <a:srgbClr val="555555"/>
+                </a:solidFill>
+                <a:latin typeface="+mj-ea"/>
+                <a:ea typeface="+mj-ea"/>
+              </a:rPr>
+              <a:t> gradient descent are the three main flavors of the learning algorithm.</a:t>
+            </a:r>
+          </a:p>
+          <a:p>
+            <a:pPr>
+              <a:buFont typeface="Arial" panose="020B0604020202020204" pitchFamily="34" charset="0"/>
+              <a:buChar char="•"/>
+            </a:pPr>
+            <a:r>
+              <a:rPr lang="en-US" altLang="ko-KR" b="0" dirty="0">
+                <a:solidFill>
+                  <a:srgbClr val="555555"/>
+                </a:solidFill>
+                <a:latin typeface="+mj-ea"/>
+                <a:ea typeface="+mj-ea"/>
+              </a:rPr>
+              <a:t>There is a tension between batch size and the speed and stability of the learning process.</a:t>
+            </a:r>
+            <a:endParaRPr lang="en-US" altLang="ko-KR" b="0" i="0" dirty="0">
+              <a:solidFill>
+                <a:srgbClr val="555555"/>
+              </a:solidFill>
+              <a:effectLst/>
+              <a:latin typeface="+mj-ea"/>
+              <a:ea typeface="+mj-ea"/>
+            </a:endParaRPr>
+          </a:p>
+        </p:txBody>
+      </p:sp>
+      <p:sp>
+        <p:nvSpPr>
+          <p:cNvPr id="24" name="직사각형 23"/>
+          <p:cNvSpPr/>
+          <p:nvPr/>
+        </p:nvSpPr>
+        <p:spPr>
+          <a:xfrm>
+            <a:off x="9489504" y="3131331"/>
+            <a:ext cx="4953000" cy="1384995"/>
+          </a:xfrm>
+          <a:prstGeom prst="rect">
+            <a:avLst/>
+          </a:prstGeom>
+        </p:spPr>
+        <p:txBody>
+          <a:bodyPr>
+            <a:spAutoFit/>
+          </a:bodyPr>
+          <a:lstStyle/>
+          <a:p>
+            <a:pPr>
+              <a:buFont typeface="Arial" panose="020B0604020202020204" pitchFamily="34" charset="0"/>
+              <a:buChar char="•"/>
+            </a:pPr>
+            <a:r>
+              <a:rPr lang="en-US" altLang="ko-KR" dirty="0">
+                <a:solidFill>
+                  <a:srgbClr val="555555"/>
+                </a:solidFill>
+                <a:latin typeface="+mj-ea"/>
+                <a:ea typeface="+mj-ea"/>
+              </a:rPr>
+              <a:t>Batch Gradient Descent</a:t>
+            </a:r>
+            <a:r>
+              <a:rPr lang="en-US" altLang="ko-KR" b="0" dirty="0">
+                <a:solidFill>
+                  <a:srgbClr val="555555"/>
+                </a:solidFill>
+                <a:latin typeface="+mj-ea"/>
+                <a:ea typeface="+mj-ea"/>
+              </a:rPr>
+              <a:t>. Batch size is set to the total number of examples in the training dataset.</a:t>
+            </a:r>
+          </a:p>
+          <a:p>
+            <a:pPr>
+              <a:buFont typeface="Arial" panose="020B0604020202020204" pitchFamily="34" charset="0"/>
+              <a:buChar char="•"/>
+            </a:pPr>
+            <a:r>
+              <a:rPr lang="en-US" altLang="ko-KR" dirty="0">
+                <a:solidFill>
+                  <a:srgbClr val="555555"/>
+                </a:solidFill>
+                <a:latin typeface="+mj-ea"/>
+                <a:ea typeface="+mj-ea"/>
+              </a:rPr>
+              <a:t>Stochastic Gradient Descent</a:t>
+            </a:r>
+            <a:r>
+              <a:rPr lang="en-US" altLang="ko-KR" b="0" dirty="0">
+                <a:solidFill>
+                  <a:srgbClr val="555555"/>
+                </a:solidFill>
+                <a:latin typeface="+mj-ea"/>
+                <a:ea typeface="+mj-ea"/>
+              </a:rPr>
+              <a:t>. Batch size is set to one.</a:t>
+            </a:r>
+          </a:p>
+          <a:p>
+            <a:pPr>
+              <a:buFont typeface="Arial" panose="020B0604020202020204" pitchFamily="34" charset="0"/>
+              <a:buChar char="•"/>
+            </a:pPr>
+            <a:r>
+              <a:rPr lang="en-US" altLang="ko-KR" dirty="0" err="1">
+                <a:solidFill>
+                  <a:srgbClr val="555555"/>
+                </a:solidFill>
+                <a:latin typeface="+mj-ea"/>
+                <a:ea typeface="+mj-ea"/>
+              </a:rPr>
+              <a:t>Minibatch</a:t>
+            </a:r>
+            <a:r>
+              <a:rPr lang="en-US" altLang="ko-KR" dirty="0">
+                <a:solidFill>
+                  <a:srgbClr val="555555"/>
+                </a:solidFill>
+                <a:latin typeface="+mj-ea"/>
+                <a:ea typeface="+mj-ea"/>
+              </a:rPr>
+              <a:t> Gradient Descent</a:t>
+            </a:r>
+            <a:r>
+              <a:rPr lang="en-US" altLang="ko-KR" b="0" dirty="0">
+                <a:solidFill>
+                  <a:srgbClr val="555555"/>
+                </a:solidFill>
+                <a:latin typeface="+mj-ea"/>
+                <a:ea typeface="+mj-ea"/>
+              </a:rPr>
+              <a:t>. Batch size is set to more than one and less than the total number of examples in the training dataset.</a:t>
+            </a:r>
+            <a:endParaRPr lang="en-US" altLang="ko-KR" b="0" i="0" dirty="0">
+              <a:solidFill>
+                <a:srgbClr val="555555"/>
+              </a:solidFill>
+              <a:effectLst/>
+              <a:latin typeface="+mj-ea"/>
+              <a:ea typeface="+mj-ea"/>
+            </a:endParaRPr>
+          </a:p>
+        </p:txBody>
+      </p:sp>
     </p:spTree>
     <p:extLst>
       <p:ext uri="{BB962C8B-B14F-4D97-AF65-F5344CB8AC3E}">
-        <p14:creationId xmlns:p14="http://schemas.microsoft.com/office/powerpoint/2010/main" val="2588564445"/>
+        <p14:creationId xmlns:p14="http://schemas.microsoft.com/office/powerpoint/2010/main" val="4202501542"/>
       </p:ext>
     </p:extLst>
   </p:cSld>
@@ -15675,6 +16178,612 @@
               <a:rPr lang="ko-KR" altLang="en-US" smtClean="0"/>
               <a:pPr/>
               <a:t>16</a:t>
+            </a:fld>
+            <a:endParaRPr lang="ko-KR" altLang="en-US"/>
+          </a:p>
+        </p:txBody>
+      </p:sp>
+      <p:sp>
+        <p:nvSpPr>
+          <p:cNvPr id="5" name="Rectangle 2"/>
+          <p:cNvSpPr txBox="1">
+            <a:spLocks noChangeArrowheads="1"/>
+          </p:cNvSpPr>
+          <p:nvPr/>
+        </p:nvSpPr>
+        <p:spPr bwMode="auto">
+          <a:xfrm>
+            <a:off x="128463" y="201122"/>
+            <a:ext cx="6867649" cy="400110"/>
+          </a:xfrm>
+          <a:prstGeom prst="rect">
+            <a:avLst/>
+          </a:prstGeom>
+          <a:noFill/>
+          <a:ln>
+            <a:noFill/>
+          </a:ln>
+          <a:extLst>
+            <a:ext uri="{909E8E84-426E-40DD-AFC4-6F175D3DCCD1}">
+              <a14:hiddenFill xmlns:a14="http://schemas.microsoft.com/office/drawing/2010/main">
+                <a:solidFill>
+                  <a:srgbClr val="FFFFFF"/>
+                </a:solidFill>
+              </a14:hiddenFill>
+            </a:ext>
+            <a:ext uri="{91240B29-F687-4F45-9708-019B960494DF}">
+              <a14:hiddenLine xmlns:a14="http://schemas.microsoft.com/office/drawing/2010/main" w="9525">
+                <a:solidFill>
+                  <a:srgbClr val="000000"/>
+                </a:solidFill>
+                <a:miter lim="800000"/>
+                <a:headEnd/>
+                <a:tailEnd/>
+              </a14:hiddenLine>
+            </a:ext>
+          </a:extLst>
+        </p:spPr>
+        <p:txBody>
+          <a:bodyPr wrap="square">
+            <a:spAutoFit/>
+          </a:bodyPr>
+          <a:lstStyle>
+            <a:lvl1pPr latinLnBrk="1">
+              <a:defRPr kumimoji="1" sz="1200" b="1">
+                <a:solidFill>
+                  <a:schemeClr val="tx1"/>
+                </a:solidFill>
+                <a:latin typeface="돋움" pitchFamily="50" charset="-127"/>
+                <a:ea typeface="굴림" charset="-127"/>
+              </a:defRPr>
+            </a:lvl1pPr>
+            <a:lvl2pPr marL="742950" indent="-285750" latinLnBrk="1">
+              <a:defRPr kumimoji="1" sz="1200" b="1">
+                <a:solidFill>
+                  <a:schemeClr val="tx1"/>
+                </a:solidFill>
+                <a:latin typeface="돋움" pitchFamily="50" charset="-127"/>
+                <a:ea typeface="굴림" charset="-127"/>
+              </a:defRPr>
+            </a:lvl2pPr>
+            <a:lvl3pPr marL="1143000" indent="-228600" latinLnBrk="1">
+              <a:defRPr kumimoji="1" sz="1200" b="1">
+                <a:solidFill>
+                  <a:schemeClr val="tx1"/>
+                </a:solidFill>
+                <a:latin typeface="돋움" pitchFamily="50" charset="-127"/>
+                <a:ea typeface="굴림" charset="-127"/>
+              </a:defRPr>
+            </a:lvl3pPr>
+            <a:lvl4pPr marL="1600200" indent="-228600" latinLnBrk="1">
+              <a:defRPr kumimoji="1" sz="1200" b="1">
+                <a:solidFill>
+                  <a:schemeClr val="tx1"/>
+                </a:solidFill>
+                <a:latin typeface="돋움" pitchFamily="50" charset="-127"/>
+                <a:ea typeface="굴림" charset="-127"/>
+              </a:defRPr>
+            </a:lvl4pPr>
+            <a:lvl5pPr marL="2057400" indent="-228600" latinLnBrk="1">
+              <a:defRPr kumimoji="1" sz="1200" b="1">
+                <a:solidFill>
+                  <a:schemeClr val="tx1"/>
+                </a:solidFill>
+                <a:latin typeface="돋움" pitchFamily="50" charset="-127"/>
+                <a:ea typeface="굴림" charset="-127"/>
+              </a:defRPr>
+            </a:lvl5pPr>
+            <a:lvl6pPr marL="2514600" indent="-228600" eaLnBrk="0" fontAlgn="base" hangingPunct="0">
+              <a:spcBef>
+                <a:spcPct val="0"/>
+              </a:spcBef>
+              <a:spcAft>
+                <a:spcPct val="0"/>
+              </a:spcAft>
+              <a:defRPr kumimoji="1" sz="1200" b="1">
+                <a:solidFill>
+                  <a:schemeClr val="tx1"/>
+                </a:solidFill>
+                <a:latin typeface="돋움" pitchFamily="50" charset="-127"/>
+                <a:ea typeface="굴림" charset="-127"/>
+              </a:defRPr>
+            </a:lvl6pPr>
+            <a:lvl7pPr marL="2971800" indent="-228600" eaLnBrk="0" fontAlgn="base" hangingPunct="0">
+              <a:spcBef>
+                <a:spcPct val="0"/>
+              </a:spcBef>
+              <a:spcAft>
+                <a:spcPct val="0"/>
+              </a:spcAft>
+              <a:defRPr kumimoji="1" sz="1200" b="1">
+                <a:solidFill>
+                  <a:schemeClr val="tx1"/>
+                </a:solidFill>
+                <a:latin typeface="돋움" pitchFamily="50" charset="-127"/>
+                <a:ea typeface="굴림" charset="-127"/>
+              </a:defRPr>
+            </a:lvl7pPr>
+            <a:lvl8pPr marL="3429000" indent="-228600" eaLnBrk="0" fontAlgn="base" hangingPunct="0">
+              <a:spcBef>
+                <a:spcPct val="0"/>
+              </a:spcBef>
+              <a:spcAft>
+                <a:spcPct val="0"/>
+              </a:spcAft>
+              <a:defRPr kumimoji="1" sz="1200" b="1">
+                <a:solidFill>
+                  <a:schemeClr val="tx1"/>
+                </a:solidFill>
+                <a:latin typeface="돋움" pitchFamily="50" charset="-127"/>
+                <a:ea typeface="굴림" charset="-127"/>
+              </a:defRPr>
+            </a:lvl8pPr>
+            <a:lvl9pPr marL="3886200" indent="-228600" eaLnBrk="0" fontAlgn="base" hangingPunct="0">
+              <a:spcBef>
+                <a:spcPct val="0"/>
+              </a:spcBef>
+              <a:spcAft>
+                <a:spcPct val="0"/>
+              </a:spcAft>
+              <a:defRPr kumimoji="1" sz="1200" b="1">
+                <a:solidFill>
+                  <a:schemeClr val="tx1"/>
+                </a:solidFill>
+                <a:latin typeface="돋움" pitchFamily="50" charset="-127"/>
+                <a:ea typeface="굴림" charset="-127"/>
+              </a:defRPr>
+            </a:lvl9pPr>
+          </a:lstStyle>
+          <a:p>
+            <a:pPr eaLnBrk="1" hangingPunct="1"/>
+            <a:r>
+              <a:rPr lang="en-US" altLang="ko-KR" sz="2000" dirty="0">
+                <a:solidFill>
+                  <a:schemeClr val="bg1"/>
+                </a:solidFill>
+                <a:latin typeface="+mj-ea"/>
+                <a:ea typeface="+mj-ea"/>
+                <a:sym typeface="Wingdings" pitchFamily="2" charset="2"/>
+              </a:rPr>
+              <a:t> </a:t>
+            </a:r>
+            <a:r>
+              <a:rPr lang="en-US" altLang="ko-KR" sz="2000" dirty="0" smtClean="0">
+                <a:solidFill>
+                  <a:schemeClr val="bg1"/>
+                </a:solidFill>
+                <a:latin typeface="+mj-ea"/>
+                <a:ea typeface="+mj-ea"/>
+                <a:sym typeface="Wingdings" pitchFamily="2" charset="2"/>
+              </a:rPr>
+              <a:t>Learning Rate</a:t>
+            </a:r>
+            <a:endParaRPr lang="en-US" altLang="ko-KR" sz="2000" dirty="0">
+              <a:solidFill>
+                <a:schemeClr val="bg1"/>
+              </a:solidFill>
+              <a:latin typeface="+mj-ea"/>
+              <a:ea typeface="+mj-ea"/>
+              <a:sym typeface="Wingdings" pitchFamily="2" charset="2"/>
+            </a:endParaRPr>
+          </a:p>
+        </p:txBody>
+      </p:sp>
+      <p:pic>
+        <p:nvPicPr>
+          <p:cNvPr id="6" name="그림 5"/>
+          <p:cNvPicPr>
+            <a:picLocks noChangeAspect="1"/>
+          </p:cNvPicPr>
+          <p:nvPr/>
+        </p:nvPicPr>
+        <p:blipFill>
+          <a:blip r:embed="rId2"/>
+          <a:stretch>
+            <a:fillRect/>
+          </a:stretch>
+        </p:blipFill>
+        <p:spPr>
+          <a:xfrm>
+            <a:off x="632520" y="5445224"/>
+            <a:ext cx="5695950" cy="2409825"/>
+          </a:xfrm>
+          <a:prstGeom prst="rect">
+            <a:avLst/>
+          </a:prstGeom>
+        </p:spPr>
+      </p:pic>
+      <p:pic>
+        <p:nvPicPr>
+          <p:cNvPr id="7" name="그림 6"/>
+          <p:cNvPicPr>
+            <a:picLocks noChangeAspect="1"/>
+          </p:cNvPicPr>
+          <p:nvPr/>
+        </p:nvPicPr>
+        <p:blipFill>
+          <a:blip r:embed="rId3"/>
+          <a:stretch>
+            <a:fillRect/>
+          </a:stretch>
+        </p:blipFill>
+        <p:spPr>
+          <a:xfrm>
+            <a:off x="-87560" y="601232"/>
+            <a:ext cx="8439150" cy="3648075"/>
+          </a:xfrm>
+          <a:prstGeom prst="rect">
+            <a:avLst/>
+          </a:prstGeom>
+        </p:spPr>
+      </p:pic>
+      <p:sp>
+        <p:nvSpPr>
+          <p:cNvPr id="8" name="직사각형 7"/>
+          <p:cNvSpPr/>
+          <p:nvPr/>
+        </p:nvSpPr>
+        <p:spPr>
+          <a:xfrm>
+            <a:off x="622152" y="4060229"/>
+            <a:ext cx="4953000" cy="1384995"/>
+          </a:xfrm>
+          <a:prstGeom prst="rect">
+            <a:avLst/>
+          </a:prstGeom>
+        </p:spPr>
+        <p:txBody>
+          <a:bodyPr>
+            <a:spAutoFit/>
+          </a:bodyPr>
+          <a:lstStyle/>
+          <a:p>
+            <a:r>
+              <a:rPr lang="en-US" altLang="ko-KR" b="0" dirty="0">
+                <a:solidFill>
+                  <a:srgbClr val="5D5D5D"/>
+                </a:solidFill>
+                <a:latin typeface="+mj-ea"/>
+                <a:ea typeface="+mj-ea"/>
+              </a:rPr>
+              <a:t>Learning rate</a:t>
+            </a:r>
+            <a:r>
+              <a:rPr lang="ko-KR" altLang="en-US" b="0" dirty="0">
+                <a:solidFill>
+                  <a:srgbClr val="5D5D5D"/>
+                </a:solidFill>
+                <a:latin typeface="+mj-ea"/>
+                <a:ea typeface="+mj-ea"/>
+              </a:rPr>
+              <a:t>를 고정하고 </a:t>
+            </a:r>
+            <a:r>
+              <a:rPr lang="en-US" altLang="ko-KR" b="0" dirty="0">
+                <a:solidFill>
+                  <a:srgbClr val="5D5D5D"/>
+                </a:solidFill>
+                <a:latin typeface="+mj-ea"/>
+                <a:ea typeface="+mj-ea"/>
+              </a:rPr>
+              <a:t>batch size</a:t>
+            </a:r>
+            <a:r>
+              <a:rPr lang="ko-KR" altLang="en-US" b="0" dirty="0">
+                <a:solidFill>
+                  <a:srgbClr val="5D5D5D"/>
+                </a:solidFill>
+                <a:latin typeface="+mj-ea"/>
+                <a:ea typeface="+mj-ea"/>
+              </a:rPr>
+              <a:t>를 변화시킨 그래프 </a:t>
+            </a:r>
+            <a:r>
+              <a:rPr lang="en-US" altLang="ko-KR" b="0" dirty="0">
+                <a:solidFill>
+                  <a:srgbClr val="5D5D5D"/>
+                </a:solidFill>
+                <a:latin typeface="+mj-ea"/>
+                <a:ea typeface="+mj-ea"/>
+              </a:rPr>
+              <a:t>(</a:t>
+            </a:r>
+            <a:r>
+              <a:rPr lang="ko-KR" altLang="en-US" b="0" dirty="0">
+                <a:solidFill>
+                  <a:srgbClr val="5D5D5D"/>
+                </a:solidFill>
+                <a:latin typeface="+mj-ea"/>
+                <a:ea typeface="+mj-ea"/>
+              </a:rPr>
+              <a:t>왼쪽</a:t>
+            </a:r>
+            <a:r>
+              <a:rPr lang="en-US" altLang="ko-KR" b="0" dirty="0">
+                <a:solidFill>
+                  <a:srgbClr val="5D5D5D"/>
+                </a:solidFill>
+                <a:latin typeface="+mj-ea"/>
+                <a:ea typeface="+mj-ea"/>
+              </a:rPr>
+              <a:t>)</a:t>
+            </a:r>
+            <a:r>
+              <a:rPr lang="ko-KR" altLang="en-US" b="0" dirty="0">
+                <a:solidFill>
+                  <a:srgbClr val="5D5D5D"/>
+                </a:solidFill>
+                <a:latin typeface="+mj-ea"/>
+                <a:ea typeface="+mj-ea"/>
+              </a:rPr>
+              <a:t>는 작은 </a:t>
+            </a:r>
+            <a:r>
+              <a:rPr lang="en-US" altLang="ko-KR" b="0" dirty="0">
+                <a:solidFill>
+                  <a:srgbClr val="5D5D5D"/>
+                </a:solidFill>
+                <a:latin typeface="+mj-ea"/>
+                <a:ea typeface="+mj-ea"/>
+              </a:rPr>
+              <a:t>batch size</a:t>
+            </a:r>
+            <a:r>
+              <a:rPr lang="ko-KR" altLang="en-US" b="0" dirty="0">
+                <a:solidFill>
+                  <a:srgbClr val="5D5D5D"/>
+                </a:solidFill>
+                <a:latin typeface="+mj-ea"/>
+                <a:ea typeface="+mj-ea"/>
+              </a:rPr>
+              <a:t>에서 보다 높은 </a:t>
+            </a:r>
+            <a:r>
+              <a:rPr lang="en-US" altLang="ko-KR" b="0" dirty="0">
+                <a:solidFill>
+                  <a:srgbClr val="5D5D5D"/>
+                </a:solidFill>
+                <a:latin typeface="+mj-ea"/>
+                <a:ea typeface="+mj-ea"/>
+              </a:rPr>
+              <a:t>test accuracy</a:t>
+            </a:r>
+            <a:r>
+              <a:rPr lang="ko-KR" altLang="en-US" b="0" dirty="0">
+                <a:solidFill>
+                  <a:srgbClr val="5D5D5D"/>
+                </a:solidFill>
+                <a:latin typeface="+mj-ea"/>
+                <a:ea typeface="+mj-ea"/>
+              </a:rPr>
+              <a:t>를 얻을 수 있음을 보여줍니다</a:t>
+            </a:r>
+            <a:r>
+              <a:rPr lang="en-US" altLang="ko-KR" b="0" dirty="0">
+                <a:solidFill>
+                  <a:srgbClr val="5D5D5D"/>
+                </a:solidFill>
+                <a:latin typeface="+mj-ea"/>
+                <a:ea typeface="+mj-ea"/>
+              </a:rPr>
+              <a:t>. </a:t>
+            </a:r>
+            <a:r>
+              <a:rPr lang="ko-KR" altLang="en-US" b="0" dirty="0">
+                <a:solidFill>
+                  <a:srgbClr val="5D5D5D"/>
+                </a:solidFill>
+                <a:latin typeface="+mj-ea"/>
+                <a:ea typeface="+mj-ea"/>
+              </a:rPr>
+              <a:t>또한 </a:t>
+            </a:r>
+            <a:r>
+              <a:rPr lang="en-US" altLang="ko-KR" b="0" dirty="0">
+                <a:solidFill>
+                  <a:srgbClr val="5D5D5D"/>
+                </a:solidFill>
+                <a:latin typeface="+mj-ea"/>
+                <a:ea typeface="+mj-ea"/>
+              </a:rPr>
+              <a:t>batch size</a:t>
+            </a:r>
+            <a:r>
+              <a:rPr lang="ko-KR" altLang="en-US" b="0" dirty="0">
+                <a:solidFill>
+                  <a:srgbClr val="5D5D5D"/>
+                </a:solidFill>
+                <a:latin typeface="+mj-ea"/>
+                <a:ea typeface="+mj-ea"/>
+              </a:rPr>
+              <a:t>를 고정하고 </a:t>
+            </a:r>
+            <a:r>
+              <a:rPr lang="en-US" altLang="ko-KR" b="0" dirty="0">
+                <a:solidFill>
+                  <a:srgbClr val="5D5D5D"/>
+                </a:solidFill>
+                <a:latin typeface="+mj-ea"/>
+                <a:ea typeface="+mj-ea"/>
+              </a:rPr>
+              <a:t>learning rate</a:t>
+            </a:r>
+            <a:r>
+              <a:rPr lang="ko-KR" altLang="en-US" b="0" dirty="0">
+                <a:solidFill>
+                  <a:srgbClr val="5D5D5D"/>
+                </a:solidFill>
+                <a:latin typeface="+mj-ea"/>
+                <a:ea typeface="+mj-ea"/>
+              </a:rPr>
+              <a:t>를 변화시킨 그래프 </a:t>
+            </a:r>
+            <a:r>
+              <a:rPr lang="en-US" altLang="ko-KR" b="0" dirty="0">
+                <a:solidFill>
+                  <a:srgbClr val="5D5D5D"/>
+                </a:solidFill>
+                <a:latin typeface="+mj-ea"/>
+                <a:ea typeface="+mj-ea"/>
+              </a:rPr>
+              <a:t>(</a:t>
+            </a:r>
+            <a:r>
+              <a:rPr lang="ko-KR" altLang="en-US" b="0" dirty="0">
+                <a:solidFill>
+                  <a:srgbClr val="5D5D5D"/>
+                </a:solidFill>
+                <a:latin typeface="+mj-ea"/>
+                <a:ea typeface="+mj-ea"/>
+              </a:rPr>
+              <a:t>오른쪽</a:t>
+            </a:r>
+            <a:r>
+              <a:rPr lang="en-US" altLang="ko-KR" b="0" dirty="0">
+                <a:solidFill>
+                  <a:srgbClr val="5D5D5D"/>
+                </a:solidFill>
+                <a:latin typeface="+mj-ea"/>
+                <a:ea typeface="+mj-ea"/>
+              </a:rPr>
+              <a:t>)</a:t>
+            </a:r>
+            <a:r>
+              <a:rPr lang="ko-KR" altLang="en-US" b="0" dirty="0">
+                <a:solidFill>
+                  <a:srgbClr val="5D5D5D"/>
+                </a:solidFill>
+                <a:latin typeface="+mj-ea"/>
+                <a:ea typeface="+mj-ea"/>
+              </a:rPr>
+              <a:t>를 보면</a:t>
+            </a:r>
+            <a:r>
+              <a:rPr lang="en-US" altLang="ko-KR" b="0" dirty="0">
+                <a:solidFill>
+                  <a:srgbClr val="5D5D5D"/>
+                </a:solidFill>
+                <a:latin typeface="+mj-ea"/>
+                <a:ea typeface="+mj-ea"/>
+              </a:rPr>
+              <a:t>, </a:t>
+            </a:r>
+            <a:r>
+              <a:rPr lang="ko-KR" altLang="en-US" b="0" dirty="0">
+                <a:solidFill>
+                  <a:srgbClr val="5D5D5D"/>
+                </a:solidFill>
+                <a:latin typeface="+mj-ea"/>
+                <a:ea typeface="+mj-ea"/>
+              </a:rPr>
+              <a:t>작은 </a:t>
+            </a:r>
+            <a:r>
+              <a:rPr lang="en-US" altLang="ko-KR" b="0" dirty="0">
+                <a:solidFill>
+                  <a:srgbClr val="5D5D5D"/>
+                </a:solidFill>
+                <a:latin typeface="+mj-ea"/>
+                <a:ea typeface="+mj-ea"/>
+              </a:rPr>
+              <a:t>batch</a:t>
+            </a:r>
+            <a:r>
+              <a:rPr lang="ko-KR" altLang="en-US" b="0" dirty="0">
+                <a:solidFill>
+                  <a:srgbClr val="5D5D5D"/>
+                </a:solidFill>
+                <a:latin typeface="+mj-ea"/>
+                <a:ea typeface="+mj-ea"/>
+              </a:rPr>
+              <a:t>를 사용할 경우 더 넓은 범위의 </a:t>
+            </a:r>
+            <a:r>
+              <a:rPr lang="en-US" altLang="ko-KR" b="0" dirty="0">
+                <a:solidFill>
+                  <a:srgbClr val="5D5D5D"/>
+                </a:solidFill>
+                <a:latin typeface="+mj-ea"/>
+                <a:ea typeface="+mj-ea"/>
+              </a:rPr>
+              <a:t>learning rate</a:t>
+            </a:r>
+            <a:r>
+              <a:rPr lang="ko-KR" altLang="en-US" b="0" dirty="0">
+                <a:solidFill>
+                  <a:srgbClr val="5D5D5D"/>
+                </a:solidFill>
+                <a:latin typeface="+mj-ea"/>
+                <a:ea typeface="+mj-ea"/>
+              </a:rPr>
+              <a:t>에서 안정적인 학습이 가능함을 알 수 있습니다</a:t>
+            </a:r>
+            <a:r>
+              <a:rPr lang="en-US" altLang="ko-KR" b="0" dirty="0">
+                <a:solidFill>
+                  <a:srgbClr val="5D5D5D"/>
+                </a:solidFill>
+                <a:latin typeface="+mj-ea"/>
+                <a:ea typeface="+mj-ea"/>
+              </a:rPr>
+              <a:t>.</a:t>
+            </a:r>
+            <a:endParaRPr lang="ko-KR" altLang="en-US" dirty="0">
+              <a:latin typeface="+mj-ea"/>
+              <a:ea typeface="+mj-ea"/>
+            </a:endParaRPr>
+          </a:p>
+        </p:txBody>
+      </p:sp>
+    </p:spTree>
+    <p:extLst>
+      <p:ext uri="{BB962C8B-B14F-4D97-AF65-F5344CB8AC3E}">
+        <p14:creationId xmlns:p14="http://schemas.microsoft.com/office/powerpoint/2010/main" val="2588564445"/>
+      </p:ext>
+    </p:extLst>
+  </p:cSld>
+  <p:clrMapOvr>
+    <a:masterClrMapping/>
+  </p:clrMapOvr>
+</p:sld>
+</file>
+
+<file path=ppt/slides/slide18.xml><?xml version="1.0" encoding="utf-8"?>
+<p:sld xmlns:a="http://schemas.openxmlformats.org/drawingml/2006/main" xmlns:r="http://schemas.openxmlformats.org/officeDocument/2006/relationships" xmlns:p="http://schemas.openxmlformats.org/presentationml/2006/main">
+  <p:cSld>
+    <p:spTree>
+      <p:nvGrpSpPr>
+        <p:cNvPr id="1" name=""/>
+        <p:cNvGrpSpPr/>
+        <p:nvPr/>
+      </p:nvGrpSpPr>
+      <p:grpSpPr>
+        <a:xfrm>
+          <a:off x="0" y="0"/>
+          <a:ext cx="0" cy="0"/>
+          <a:chOff x="0" y="0"/>
+          <a:chExt cx="0" cy="0"/>
+        </a:xfrm>
+      </p:grpSpPr>
+      <p:sp>
+        <p:nvSpPr>
+          <p:cNvPr id="4" name="슬라이드 번호 개체 틀 3"/>
+          <p:cNvSpPr>
+            <a:spLocks noGrp="1"/>
+          </p:cNvSpPr>
+          <p:nvPr>
+            <p:ph type="sldNum" sz="quarter" idx="12"/>
+          </p:nvPr>
+        </p:nvSpPr>
+        <p:spPr/>
+        <p:txBody>
+          <a:bodyPr/>
+          <a:lstStyle/>
+          <a:p>
+            <a:fld id="{33796E3F-F6B7-490E-938A-9F8EC05675D0}" type="slidenum">
+              <a:rPr lang="ko-KR" altLang="en-US" smtClean="0"/>
+              <a:pPr/>
+              <a:t>17</a:t>
             </a:fld>
             <a:endParaRPr lang="ko-KR" altLang="en-US"/>
           </a:p>
@@ -16114,7 +17223,7 @@
 </p:sld>
 </file>
 
-<file path=ppt/slides/slide18.xml><?xml version="1.0" encoding="utf-8"?>
+<file path=ppt/slides/slide19.xml><?xml version="1.0" encoding="utf-8"?>
 <p:sld xmlns:a="http://schemas.openxmlformats.org/drawingml/2006/main" xmlns:r="http://schemas.openxmlformats.org/officeDocument/2006/relationships" xmlns:p="http://schemas.openxmlformats.org/presentationml/2006/main">
   <p:cSld>
     <p:spTree>
@@ -16149,7 +17258,7 @@
             <a:fld id="{33796E3F-F6B7-490E-938A-9F8EC05675D0}" type="slidenum">
               <a:rPr lang="ko-KR" altLang="en-US" smtClean="0"/>
               <a:pPr/>
-              <a:t>17</a:t>
+              <a:t>18</a:t>
             </a:fld>
             <a:endParaRPr lang="ko-KR" altLang="en-US"/>
           </a:p>
@@ -16191,10 +17300,10 @@
                   </a:schemeClr>
                 </a:solidFill>
               </a:rPr>
-              <a:t>전체 </a:t>
-            </a:r>
-            <a:r>
-              <a:rPr lang="ko-KR" altLang="en-US" dirty="0" smtClean="0">
+              <a:t>전체 데이터의 일부를 </a:t>
+            </a:r>
+            <a:r>
+              <a:rPr lang="en-US" altLang="ko-KR" dirty="0" smtClean="0">
                 <a:solidFill>
                   <a:schemeClr val="tx1">
                     <a:lumMod val="65000"/>
@@ -16202,10 +17311,10 @@
                   </a:schemeClr>
                 </a:solidFill>
               </a:rPr>
-              <a:t>데이터의 일부를 </a:t>
-            </a:r>
-            <a:r>
-              <a:rPr lang="en-US" altLang="ko-KR" dirty="0" smtClean="0">
+              <a:t>validation set </a:t>
+            </a:r>
+            <a:r>
+              <a:rPr lang="ko-KR" altLang="en-US" dirty="0" smtClean="0">
                 <a:solidFill>
                   <a:schemeClr val="tx1">
                     <a:lumMod val="65000"/>
@@ -16213,10 +17322,10 @@
                   </a:schemeClr>
                 </a:solidFill>
               </a:rPr>
-              <a:t>validation set </a:t>
-            </a:r>
-            <a:r>
-              <a:rPr lang="ko-KR" altLang="en-US" dirty="0" smtClean="0">
+              <a:t>으로</a:t>
+            </a:r>
+            <a:r>
+              <a:rPr lang="en-US" altLang="ko-KR" dirty="0" smtClean="0">
                 <a:solidFill>
                   <a:schemeClr val="tx1">
                     <a:lumMod val="65000"/>
@@ -16224,10 +17333,10 @@
                   </a:schemeClr>
                 </a:solidFill>
               </a:rPr>
-              <a:t>으로</a:t>
-            </a:r>
-            <a:r>
-              <a:rPr lang="en-US" altLang="ko-KR" dirty="0" smtClean="0">
+              <a:t> </a:t>
+            </a:r>
+            <a:r>
+              <a:rPr lang="ko-KR" altLang="en-US" dirty="0" smtClean="0">
                 <a:solidFill>
                   <a:schemeClr val="tx1">
                     <a:lumMod val="65000"/>
@@ -16235,10 +17344,10 @@
                   </a:schemeClr>
                 </a:solidFill>
               </a:rPr>
-              <a:t> </a:t>
-            </a:r>
-            <a:r>
-              <a:rPr lang="ko-KR" altLang="en-US" dirty="0" smtClean="0">
+              <a:t>사용해 모델 성능을 평가하는 경우</a:t>
+            </a:r>
+            <a:r>
+              <a:rPr lang="en-US" altLang="ko-KR" dirty="0" smtClean="0">
                 <a:solidFill>
                   <a:schemeClr val="tx1">
                     <a:lumMod val="65000"/>
@@ -16246,10 +17355,10 @@
                   </a:schemeClr>
                 </a:solidFill>
               </a:rPr>
-              <a:t>사용해 모델 성능을 평가하는 경우</a:t>
-            </a:r>
-            <a:r>
-              <a:rPr lang="en-US" altLang="ko-KR" dirty="0" smtClean="0">
+              <a:t>, </a:t>
+            </a:r>
+            <a:r>
+              <a:rPr lang="ko-KR" altLang="en-US" dirty="0" err="1" smtClean="0">
                 <a:solidFill>
                   <a:schemeClr val="tx1">
                     <a:lumMod val="65000"/>
@@ -16257,10 +17366,10 @@
                   </a:schemeClr>
                 </a:solidFill>
               </a:rPr>
-              <a:t>, </a:t>
-            </a:r>
-            <a:r>
-              <a:rPr lang="ko-KR" altLang="en-US" dirty="0" err="1" smtClean="0">
+              <a:t>데이터셋의</a:t>
+            </a:r>
+            <a:r>
+              <a:rPr lang="ko-KR" altLang="en-US" dirty="0" smtClean="0">
                 <a:solidFill>
                   <a:schemeClr val="tx1">
                     <a:lumMod val="65000"/>
@@ -16268,10 +17377,10 @@
                   </a:schemeClr>
                 </a:solidFill>
               </a:rPr>
-              <a:t>데이터셋의</a:t>
-            </a:r>
-            <a:r>
-              <a:rPr lang="ko-KR" altLang="en-US" dirty="0" smtClean="0">
+              <a:t> 크기가 </a:t>
+            </a:r>
+            <a:r>
+              <a:rPr lang="ko-KR" altLang="en-US" dirty="0" err="1" smtClean="0">
                 <a:solidFill>
                   <a:schemeClr val="tx1">
                     <a:lumMod val="65000"/>
@@ -16279,7 +17388,7 @@
                   </a:schemeClr>
                 </a:solidFill>
               </a:rPr>
-              <a:t> </a:t>
+              <a:t>작을때</a:t>
             </a:r>
             <a:r>
               <a:rPr lang="ko-KR" altLang="en-US" dirty="0" smtClean="0">
@@ -16290,51 +17399,7 @@
                   </a:schemeClr>
                 </a:solidFill>
               </a:rPr>
-              <a:t>크기가 </a:t>
-            </a:r>
-            <a:r>
-              <a:rPr lang="ko-KR" altLang="en-US" dirty="0" err="1" smtClean="0">
-                <a:solidFill>
-                  <a:schemeClr val="tx1">
-                    <a:lumMod val="65000"/>
-                    <a:lumOff val="35000"/>
-                  </a:schemeClr>
-                </a:solidFill>
-              </a:rPr>
-              <a:t>작을때</a:t>
-            </a:r>
-            <a:r>
-              <a:rPr lang="ko-KR" altLang="en-US" dirty="0" smtClean="0">
-                <a:solidFill>
-                  <a:schemeClr val="tx1">
-                    <a:lumMod val="65000"/>
-                    <a:lumOff val="35000"/>
-                  </a:schemeClr>
-                </a:solidFill>
-              </a:rPr>
-              <a:t> 성능 </a:t>
-            </a:r>
-            <a:r>
-              <a:rPr lang="ko-KR" altLang="en-US" dirty="0" smtClean="0">
-                <a:solidFill>
-                  <a:schemeClr val="tx1">
-                    <a:lumMod val="65000"/>
-                    <a:lumOff val="35000"/>
-                  </a:schemeClr>
-                </a:solidFill>
-              </a:rPr>
-              <a:t>평가의 신뢰성이 </a:t>
-            </a:r>
-            <a:r>
-              <a:rPr lang="ko-KR" altLang="en-US" dirty="0" smtClean="0">
-                <a:solidFill>
-                  <a:schemeClr val="tx1">
-                    <a:lumMod val="65000"/>
-                    <a:lumOff val="35000"/>
-                  </a:schemeClr>
-                </a:solidFill>
-              </a:rPr>
-              <a:t>떨어지는 문제를 해결하기 위해 고안된 방법</a:t>
+              <a:t> 성능 평가의 신뢰성이 떨어지는 문제를 해결하기 위해 고안된 방법</a:t>
             </a:r>
             <a:r>
               <a:rPr lang="en-US" altLang="ko-KR" dirty="0">
@@ -16382,10 +17447,10 @@
                   </a:schemeClr>
                 </a:solidFill>
               </a:rPr>
-              <a:t>모든 </a:t>
-            </a:r>
-            <a:r>
-              <a:rPr lang="ko-KR" altLang="en-US" dirty="0" smtClean="0">
+              <a:t>모든 데이터가 최소 한 번은 테스트셋으로 쓰이도록 한다</a:t>
+            </a:r>
+            <a:r>
+              <a:rPr lang="en-US" altLang="ko-KR" dirty="0" smtClean="0">
                 <a:solidFill>
                   <a:schemeClr val="tx1">
                     <a:lumMod val="65000"/>
@@ -16393,38 +17458,8 @@
                   </a:schemeClr>
                 </a:solidFill>
               </a:rPr>
-              <a:t>데이터가 최소 한 번은 테스트셋으로 쓰이도록 한다</a:t>
-            </a:r>
-            <a:r>
-              <a:rPr lang="en-US" altLang="ko-KR" dirty="0" smtClean="0">
-                <a:solidFill>
-                  <a:schemeClr val="tx1">
-                    <a:lumMod val="65000"/>
-                    <a:lumOff val="35000"/>
-                  </a:schemeClr>
-                </a:solidFill>
-              </a:rPr>
-              <a:t>. </a:t>
-            </a:r>
-            <a:r>
-              <a:rPr lang="en-US" altLang="ko-KR" dirty="0" smtClean="0">
-                <a:solidFill>
-                  <a:schemeClr val="tx1">
-                    <a:lumMod val="65000"/>
-                    <a:lumOff val="35000"/>
-                  </a:schemeClr>
-                </a:solidFill>
-              </a:rPr>
-              <a:t>)</a:t>
-            </a:r>
-            <a:endParaRPr lang="en-US" altLang="ko-KR" dirty="0" smtClean="0">
-              <a:solidFill>
-                <a:schemeClr val="tx1">
-                  <a:lumMod val="65000"/>
-                  <a:lumOff val="35000"/>
-                </a:schemeClr>
-              </a:solidFill>
-            </a:endParaRPr>
+              <a:t>. )</a:t>
+            </a:r>
           </a:p>
           <a:p>
             <a:pPr>
@@ -18887,11 +19922,7 @@
             </a:pPr>
             <a:r>
               <a:rPr lang="en-US" altLang="ko-KR" sz="1800" dirty="0" smtClean="0"/>
-              <a:t>Feature </a:t>
-            </a:r>
-            <a:r>
-              <a:rPr lang="en-US" altLang="ko-KR" sz="1800" dirty="0" smtClean="0"/>
-              <a:t>Extraction</a:t>
+              <a:t>Feature Extraction</a:t>
             </a:r>
             <a:r>
               <a:rPr lang="ko-KR" altLang="en-US" sz="1800" dirty="0" smtClean="0"/>

</xml_diff>

<commit_message>
change dnn ppt file
</commit_message>
<xml_diff>
--- a/dnn/dnn_hyunq.pptx
+++ b/dnn/dnn_hyunq.pptx
@@ -14188,21 +14188,7 @@
                 <a:latin typeface="+mj-ea"/>
                 <a:ea typeface="+mj-ea"/>
               </a:rPr>
-              <a:t>an </a:t>
-            </a:r>
-            <a:r>
-              <a:rPr lang="en-US" altLang="ko-KR" b="0" dirty="0" smtClean="0">
-                <a:latin typeface="+mj-ea"/>
-                <a:ea typeface="+mj-ea"/>
-              </a:rPr>
-              <a:t>Entire dataset is passed forward and backward through the neural network only </a:t>
-            </a:r>
-            <a:r>
-              <a:rPr lang="en-US" altLang="ko-KR" b="0" dirty="0" smtClean="0">
-                <a:latin typeface="+mj-ea"/>
-                <a:ea typeface="+mj-ea"/>
-              </a:rPr>
-              <a:t>once</a:t>
+              <a:t>an Entire dataset is passed forward and backward through the neural network only once</a:t>
             </a:r>
             <a:endParaRPr lang="en-US" altLang="ko-KR" sz="1600" dirty="0">
               <a:latin typeface="+mj-ea"/>
@@ -14220,14 +14206,7 @@
                 <a:latin typeface="+mj-ea"/>
                 <a:ea typeface="+mj-ea"/>
               </a:rPr>
-              <a:t>Batch </a:t>
-            </a:r>
-            <a:r>
-              <a:rPr lang="en-US" altLang="ko-KR" sz="1600" dirty="0" smtClean="0">
-                <a:latin typeface="+mj-ea"/>
-                <a:ea typeface="+mj-ea"/>
-              </a:rPr>
-              <a:t>size</a:t>
+              <a:t>Batch size</a:t>
             </a:r>
           </a:p>
           <a:p>
@@ -14255,14 +14234,7 @@
                 <a:latin typeface="+mj-ea"/>
                 <a:ea typeface="+mj-ea"/>
               </a:rPr>
-              <a:t>Total </a:t>
-            </a:r>
-            <a:r>
-              <a:rPr lang="en-US" altLang="ko-KR" b="0" dirty="0" smtClean="0">
-                <a:latin typeface="+mj-ea"/>
-                <a:ea typeface="+mj-ea"/>
-              </a:rPr>
-              <a:t>number of training examples present in a single batch</a:t>
+              <a:t>Total number of training examples present in a single batch</a:t>
             </a:r>
           </a:p>
           <a:p>
@@ -14317,23 +14289,7 @@
                 <a:ea typeface="+mj-ea"/>
                 <a:sym typeface="Wingdings" panose="05000000000000000000" pitchFamily="2" charset="2"/>
               </a:rPr>
-              <a:t>메모리 </a:t>
-            </a:r>
-            <a:r>
-              <a:rPr lang="ko-KR" altLang="en-US" sz="1200" b="0" dirty="0" smtClean="0">
-                <a:latin typeface="+mj-ea"/>
-                <a:ea typeface="+mj-ea"/>
-                <a:sym typeface="Wingdings" panose="05000000000000000000" pitchFamily="2" charset="2"/>
-              </a:rPr>
-              <a:t>사용량 </a:t>
-            </a:r>
-            <a:r>
-              <a:rPr lang="ko-KR" altLang="en-US" sz="1200" b="0" dirty="0" smtClean="0">
-                <a:latin typeface="+mj-ea"/>
-                <a:ea typeface="+mj-ea"/>
-                <a:sym typeface="Wingdings" panose="05000000000000000000" pitchFamily="2" charset="2"/>
-              </a:rPr>
-              <a:t>절감</a:t>
+              <a:t>메모리 사용량 절감</a:t>
             </a:r>
             <a:endParaRPr lang="en-US" altLang="ko-KR" b="0" dirty="0">
               <a:latin typeface="+mj-ea"/>
@@ -14372,21 +14328,7 @@
                 <a:latin typeface="+mj-ea"/>
                 <a:ea typeface="+mj-ea"/>
               </a:rPr>
-              <a:t> </a:t>
-            </a:r>
-            <a:r>
-              <a:rPr lang="en-US" altLang="ko-KR" b="0" dirty="0" smtClean="0">
-                <a:latin typeface="+mj-ea"/>
-                <a:ea typeface="+mj-ea"/>
-              </a:rPr>
-              <a:t>the </a:t>
-            </a:r>
-            <a:r>
-              <a:rPr lang="en-US" altLang="ko-KR" b="0" dirty="0" smtClean="0">
-                <a:latin typeface="+mj-ea"/>
-                <a:ea typeface="+mj-ea"/>
-              </a:rPr>
-              <a:t>number of passes to complete one epoch</a:t>
+              <a:t> the number of passes to complete one epoch</a:t>
             </a:r>
             <a:endParaRPr lang="en-US" altLang="ko-KR" b="0" dirty="0">
               <a:latin typeface="+mj-ea"/>
@@ -14740,8 +14682,8 @@
         </p:nvSpPr>
         <p:spPr bwMode="auto">
           <a:xfrm>
-            <a:off x="4448944" y="-2042242"/>
-            <a:ext cx="8928992" cy="2384622"/>
+            <a:off x="9993560" y="129544"/>
+            <a:ext cx="3442514" cy="1970762"/>
           </a:xfrm>
           <a:prstGeom prst="rect">
             <a:avLst/>
@@ -14765,7 +14707,7 @@
               </a:lnSpc>
             </a:pPr>
             <a:r>
-              <a:rPr lang="en-US" altLang="ko-KR" sz="1600" dirty="0" smtClean="0">
+              <a:rPr lang="en-US" altLang="ko-KR" sz="1100" dirty="0" smtClean="0">
                 <a:latin typeface="+mj-ea"/>
                 <a:ea typeface="+mj-ea"/>
               </a:rPr>
@@ -14778,7 +14720,7 @@
                 <a:spcPct val="150000"/>
               </a:lnSpc>
             </a:pPr>
-            <a:endParaRPr lang="en-US" altLang="ko-KR" sz="1600" dirty="0">
+            <a:endParaRPr lang="en-US" altLang="ko-KR" sz="1100" dirty="0">
               <a:latin typeface="+mj-ea"/>
               <a:ea typeface="+mj-ea"/>
             </a:endParaRPr>
@@ -14790,7 +14732,7 @@
               </a:lnSpc>
             </a:pPr>
             <a:r>
-              <a:rPr lang="en-US" altLang="ko-KR" sz="1600" dirty="0" smtClean="0">
+              <a:rPr lang="en-US" altLang="ko-KR" sz="1100" dirty="0" smtClean="0">
                 <a:latin typeface="+mj-ea"/>
                 <a:ea typeface="+mj-ea"/>
               </a:rPr>
@@ -14803,7 +14745,7 @@
                 <a:spcPct val="150000"/>
               </a:lnSpc>
             </a:pPr>
-            <a:endParaRPr lang="en-US" altLang="ko-KR" sz="1600" dirty="0">
+            <a:endParaRPr lang="en-US" altLang="ko-KR" sz="1100" dirty="0">
               <a:latin typeface="+mj-ea"/>
               <a:ea typeface="+mj-ea"/>
             </a:endParaRPr>
@@ -14814,7 +14756,7 @@
                 <a:spcPct val="150000"/>
               </a:lnSpc>
             </a:pPr>
-            <a:endParaRPr lang="en-US" altLang="ko-KR" sz="1600" dirty="0">
+            <a:endParaRPr lang="en-US" altLang="ko-KR" sz="1100" dirty="0">
               <a:latin typeface="+mj-ea"/>
               <a:ea typeface="+mj-ea"/>
             </a:endParaRPr>
@@ -15004,18 +14946,7 @@
                 <a:ea typeface="+mj-ea"/>
                 <a:sym typeface="Wingdings" pitchFamily="2" charset="2"/>
               </a:rPr>
-              <a:t>Batch vs </a:t>
-            </a:r>
-            <a:r>
-              <a:rPr lang="en-US" altLang="ko-KR" sz="2000" dirty="0" smtClean="0">
-                <a:solidFill>
-                  <a:schemeClr val="bg1"/>
-                </a:solidFill>
-                <a:latin typeface="+mj-ea"/>
-                <a:ea typeface="+mj-ea"/>
-                <a:sym typeface="Wingdings" pitchFamily="2" charset="2"/>
-              </a:rPr>
-              <a:t>Small Batch</a:t>
+              <a:t>Batch vs Small Batch</a:t>
             </a:r>
             <a:endParaRPr lang="en-US" altLang="ko-KR" sz="2000" dirty="0">
               <a:solidFill>
@@ -15036,8 +14967,8 @@
         </p:nvGrpSpPr>
         <p:grpSpPr>
           <a:xfrm>
-            <a:off x="1021223" y="1260875"/>
-            <a:ext cx="7632848" cy="3805145"/>
+            <a:off x="1021223" y="908720"/>
+            <a:ext cx="7632848" cy="2797033"/>
             <a:chOff x="1021223" y="1400540"/>
             <a:chExt cx="7632848" cy="3805145"/>
           </a:xfrm>
@@ -15285,7 +15216,7 @@
           <p:spPr>
             <a:xfrm>
               <a:off x="1236829" y="2204864"/>
-              <a:ext cx="3356131" cy="3000821"/>
+              <a:ext cx="3356131" cy="2031325"/>
             </a:xfrm>
             <a:prstGeom prst="rect">
               <a:avLst/>
@@ -15306,48 +15237,48 @@
                 <a:buChar char="•"/>
               </a:pPr>
               <a:r>
-                <a:rPr lang="en-US" altLang="ko-KR" b="0" dirty="0" smtClean="0">
+                <a:rPr lang="en-US" altLang="ko-KR" sz="1200" b="0" dirty="0" smtClean="0">
                   <a:latin typeface="+mj-ea"/>
                   <a:ea typeface="+mj-ea"/>
                 </a:rPr>
                 <a:t>Gradient</a:t>
               </a:r>
               <a:r>
-                <a:rPr lang="ko-KR" altLang="en-US" b="0" dirty="0" smtClean="0">
+                <a:rPr lang="ko-KR" altLang="en-US" sz="1200" b="0" dirty="0" smtClean="0">
                   <a:latin typeface="+mj-ea"/>
                   <a:ea typeface="+mj-ea"/>
                 </a:rPr>
                 <a:t>에 대한 정확한 추정</a:t>
               </a:r>
               <a:r>
-                <a:rPr lang="en-US" altLang="ko-KR" b="0" dirty="0" smtClean="0">
+                <a:rPr lang="en-US" altLang="ko-KR" sz="1200" b="0" dirty="0" smtClean="0">
                   <a:latin typeface="+mj-ea"/>
                   <a:ea typeface="+mj-ea"/>
                 </a:rPr>
                 <a:t/>
               </a:r>
               <a:br>
-                <a:rPr lang="en-US" altLang="ko-KR" b="0" dirty="0" smtClean="0">
+                <a:rPr lang="en-US" altLang="ko-KR" sz="1200" b="0" dirty="0" smtClean="0">
                   <a:latin typeface="+mj-ea"/>
                   <a:ea typeface="+mj-ea"/>
                 </a:rPr>
               </a:br>
               <a:r>
-                <a:rPr lang="en-US" altLang="ko-KR" b="0" dirty="0" smtClean="0">
+                <a:rPr lang="en-US" altLang="ko-KR" sz="1200" b="0" dirty="0" smtClean="0">
                   <a:latin typeface="+mj-ea"/>
                   <a:ea typeface="+mj-ea"/>
                 </a:rPr>
                 <a:t>(low </a:t>
               </a:r>
               <a:r>
-                <a:rPr lang="en-US" altLang="ko-KR" b="0" dirty="0" err="1" smtClean="0">
+                <a:rPr lang="en-US" altLang="ko-KR" sz="1200" b="0" dirty="0" err="1" smtClean="0">
                   <a:latin typeface="+mj-ea"/>
                   <a:ea typeface="+mj-ea"/>
                 </a:rPr>
                 <a:t>varience</a:t>
               </a:r>
               <a:r>
-                <a:rPr lang="en-US" altLang="ko-KR" b="0" dirty="0" smtClean="0">
+                <a:rPr lang="en-US" altLang="ko-KR" sz="1200" b="0" dirty="0" smtClean="0">
                   <a:latin typeface="+mj-ea"/>
                   <a:ea typeface="+mj-ea"/>
                 </a:rPr>
@@ -15363,27 +15294,27 @@
                 <a:buChar char="•"/>
               </a:pPr>
               <a:r>
-                <a:rPr lang="ko-KR" altLang="en-US" b="0" dirty="0" smtClean="0">
+                <a:rPr lang="ko-KR" altLang="en-US" sz="1200" b="0" dirty="0" smtClean="0">
                   <a:latin typeface="+mj-ea"/>
                   <a:ea typeface="+mj-ea"/>
                 </a:rPr>
                 <a:t>각 </a:t>
               </a:r>
               <a:r>
-                <a:rPr lang="en-US" altLang="ko-KR" b="0" dirty="0" smtClean="0">
+                <a:rPr lang="en-US" altLang="ko-KR" sz="1200" b="0" dirty="0" smtClean="0">
                   <a:latin typeface="+mj-ea"/>
                   <a:ea typeface="+mj-ea"/>
                 </a:rPr>
                 <a:t>iteration </a:t>
               </a:r>
               <a:r>
-                <a:rPr lang="ko-KR" altLang="en-US" b="0" dirty="0" smtClean="0">
+                <a:rPr lang="ko-KR" altLang="en-US" sz="1200" b="0" dirty="0" smtClean="0">
                   <a:latin typeface="+mj-ea"/>
                   <a:ea typeface="+mj-ea"/>
                 </a:rPr>
                 <a:t>마다 컴퓨팅 자원 많이 소모</a:t>
               </a:r>
-              <a:endParaRPr lang="en-US" altLang="ko-KR" b="0" dirty="0" smtClean="0">
+              <a:endParaRPr lang="en-US" altLang="ko-KR" sz="1200" b="0" dirty="0" smtClean="0">
                 <a:latin typeface="+mj-ea"/>
                 <a:ea typeface="+mj-ea"/>
               </a:endParaRPr>
@@ -15397,20 +15328,20 @@
                 <a:buChar char="•"/>
               </a:pPr>
               <a:r>
-                <a:rPr lang="ko-KR" altLang="en-US" b="0" dirty="0" err="1" smtClean="0">
+                <a:rPr lang="ko-KR" altLang="en-US" sz="1200" b="0" dirty="0" err="1" smtClean="0">
                   <a:latin typeface="+mj-ea"/>
                   <a:ea typeface="+mj-ea"/>
                 </a:rPr>
                 <a:t>병렬처리에</a:t>
               </a:r>
               <a:r>
-                <a:rPr lang="ko-KR" altLang="en-US" b="0" dirty="0" smtClean="0">
+                <a:rPr lang="ko-KR" altLang="en-US" sz="1200" b="0" dirty="0" smtClean="0">
                   <a:latin typeface="+mj-ea"/>
                   <a:ea typeface="+mj-ea"/>
                 </a:rPr>
                 <a:t> 용이함</a:t>
               </a:r>
-              <a:endParaRPr lang="en-US" altLang="ko-KR" b="0" dirty="0" smtClean="0">
+              <a:endParaRPr lang="en-US" altLang="ko-KR" sz="1200" b="0" dirty="0" smtClean="0">
                 <a:latin typeface="+mj-ea"/>
                 <a:ea typeface="+mj-ea"/>
               </a:endParaRPr>
@@ -15424,62 +15355,62 @@
                 <a:buChar char="•"/>
               </a:pPr>
               <a:r>
-                <a:rPr lang="en-US" altLang="ko-KR" b="0" dirty="0" smtClean="0">
+                <a:rPr lang="en-US" altLang="ko-KR" sz="1200" b="0" dirty="0" smtClean="0">
                   <a:latin typeface="+mj-ea"/>
                   <a:ea typeface="+mj-ea"/>
                 </a:rPr>
                 <a:t>Gradient</a:t>
               </a:r>
               <a:r>
-                <a:rPr lang="ko-KR" altLang="en-US" b="0" dirty="0" smtClean="0">
+                <a:rPr lang="ko-KR" altLang="en-US" sz="1200" b="0" dirty="0" smtClean="0">
                   <a:latin typeface="+mj-ea"/>
                   <a:ea typeface="+mj-ea"/>
                 </a:rPr>
                 <a:t>의 </a:t>
               </a:r>
               <a:r>
-                <a:rPr lang="ko-KR" altLang="en-US" b="0" dirty="0" err="1" smtClean="0">
+                <a:rPr lang="ko-KR" altLang="en-US" sz="1200" b="0" dirty="0" err="1" smtClean="0">
                   <a:latin typeface="+mj-ea"/>
                   <a:ea typeface="+mj-ea"/>
                 </a:rPr>
                 <a:t>없데이트가</a:t>
               </a:r>
               <a:r>
-                <a:rPr lang="ko-KR" altLang="en-US" b="0" dirty="0" smtClean="0">
+                <a:rPr lang="ko-KR" altLang="en-US" sz="1200" b="0" dirty="0" smtClean="0">
                   <a:latin typeface="+mj-ea"/>
                   <a:ea typeface="+mj-ea"/>
                 </a:rPr>
                 <a:t> 느려 </a:t>
               </a:r>
               <a:r>
-                <a:rPr lang="en-US" altLang="ko-KR" b="0" dirty="0" smtClean="0">
+                <a:rPr lang="en-US" altLang="ko-KR" sz="1200" b="0" dirty="0" smtClean="0">
                   <a:latin typeface="+mj-ea"/>
                   <a:ea typeface="+mj-ea"/>
                 </a:rPr>
                 <a:t>weight update</a:t>
               </a:r>
               <a:r>
-                <a:rPr lang="ko-KR" altLang="en-US" b="0" dirty="0" smtClean="0">
+                <a:rPr lang="ko-KR" altLang="en-US" sz="1200" b="0" dirty="0" smtClean="0">
                   <a:latin typeface="+mj-ea"/>
                   <a:ea typeface="+mj-ea"/>
                 </a:rPr>
                 <a:t>가 부정확해 질 수 있다</a:t>
               </a:r>
               <a:r>
-                <a:rPr lang="en-US" altLang="ko-KR" b="0" dirty="0" smtClean="0">
+                <a:rPr lang="en-US" altLang="ko-KR" sz="1200" b="0" dirty="0" smtClean="0">
                   <a:latin typeface="+mj-ea"/>
                   <a:ea typeface="+mj-ea"/>
                 </a:rPr>
                 <a:t/>
               </a:r>
               <a:br>
-                <a:rPr lang="en-US" altLang="ko-KR" b="0" dirty="0" smtClean="0">
+                <a:rPr lang="en-US" altLang="ko-KR" sz="1200" b="0" dirty="0" smtClean="0">
                   <a:latin typeface="+mj-ea"/>
                   <a:ea typeface="+mj-ea"/>
                 </a:rPr>
               </a:br>
               <a:r>
-                <a:rPr lang="en-US" altLang="ko-KR" b="0" dirty="0" smtClean="0">
+                <a:rPr lang="en-US" altLang="ko-KR" sz="1200" b="0" dirty="0" smtClean="0">
                   <a:latin typeface="+mj-ea"/>
                   <a:ea typeface="+mj-ea"/>
                   <a:sym typeface="Wingdings" panose="05000000000000000000" pitchFamily="2" charset="2"/>
@@ -15487,7 +15418,7 @@
                 <a:t> learning rate</a:t>
               </a:r>
               <a:r>
-                <a:rPr lang="ko-KR" altLang="en-US" b="0" dirty="0" smtClean="0">
+                <a:rPr lang="ko-KR" altLang="en-US" sz="1200" b="0" dirty="0" smtClean="0">
                   <a:latin typeface="+mj-ea"/>
                   <a:ea typeface="+mj-ea"/>
                   <a:sym typeface="Wingdings" panose="05000000000000000000" pitchFamily="2" charset="2"/>
@@ -15495,14 +15426,14 @@
                 <a:t>를 크게 가져가지 못한다</a:t>
               </a:r>
               <a:r>
-                <a:rPr lang="en-US" altLang="ko-KR" b="0" dirty="0" smtClean="0">
+                <a:rPr lang="en-US" altLang="ko-KR" sz="1200" b="0" dirty="0" smtClean="0">
                   <a:latin typeface="+mj-ea"/>
                   <a:ea typeface="+mj-ea"/>
                   <a:sym typeface="Wingdings" panose="05000000000000000000" pitchFamily="2" charset="2"/>
                 </a:rPr>
                 <a:t>.</a:t>
               </a:r>
-              <a:endParaRPr lang="en-US" altLang="ko-KR" b="0" dirty="0" smtClean="0">
+              <a:endParaRPr lang="en-US" altLang="ko-KR" sz="1200" b="0" dirty="0" smtClean="0">
                 <a:latin typeface="+mj-ea"/>
                 <a:ea typeface="+mj-ea"/>
               </a:endParaRPr>
@@ -15518,7 +15449,7 @@
           <p:spPr>
             <a:xfrm>
               <a:off x="5101784" y="2204864"/>
-              <a:ext cx="3356131" cy="2677656"/>
+              <a:ext cx="3356131" cy="2031325"/>
             </a:xfrm>
             <a:prstGeom prst="rect">
               <a:avLst/>
@@ -15539,34 +15470,34 @@
                 <a:buChar char="•"/>
               </a:pPr>
               <a:r>
-                <a:rPr lang="en-US" altLang="ko-KR" b="0" dirty="0" smtClean="0">
+                <a:rPr lang="en-US" altLang="ko-KR" sz="1200" b="0" dirty="0" smtClean="0">
                   <a:latin typeface="+mj-ea"/>
                   <a:ea typeface="+mj-ea"/>
                 </a:rPr>
                 <a:t>Gradient</a:t>
               </a:r>
               <a:r>
-                <a:rPr lang="ko-KR" altLang="en-US" b="0" dirty="0" smtClean="0">
+                <a:rPr lang="ko-KR" altLang="en-US" sz="1200" b="0" dirty="0" smtClean="0">
                   <a:latin typeface="+mj-ea"/>
                   <a:ea typeface="+mj-ea"/>
                 </a:rPr>
                 <a:t>에 대한 부정확한 추정</a:t>
               </a:r>
               <a:r>
-                <a:rPr lang="en-US" altLang="ko-KR" b="0" dirty="0" smtClean="0">
+                <a:rPr lang="en-US" altLang="ko-KR" sz="1200" b="0" dirty="0" smtClean="0">
                   <a:latin typeface="+mj-ea"/>
                   <a:ea typeface="+mj-ea"/>
                 </a:rPr>
                 <a:t/>
               </a:r>
               <a:br>
-                <a:rPr lang="en-US" altLang="ko-KR" b="0" dirty="0" smtClean="0">
+                <a:rPr lang="en-US" altLang="ko-KR" sz="1200" b="0" dirty="0" smtClean="0">
                   <a:latin typeface="+mj-ea"/>
                   <a:ea typeface="+mj-ea"/>
                 </a:rPr>
               </a:br>
               <a:r>
-                <a:rPr lang="en-US" altLang="ko-KR" b="0" dirty="0" smtClean="0">
+                <a:rPr lang="en-US" altLang="ko-KR" sz="1200" b="0" dirty="0" smtClean="0">
                   <a:latin typeface="+mj-ea"/>
                   <a:ea typeface="+mj-ea"/>
                 </a:rPr>
@@ -15582,27 +15513,27 @@
                 <a:buChar char="•"/>
               </a:pPr>
               <a:r>
-                <a:rPr lang="ko-KR" altLang="en-US" b="0" dirty="0" smtClean="0">
+                <a:rPr lang="ko-KR" altLang="en-US" sz="1200" b="0" dirty="0" smtClean="0">
                   <a:latin typeface="+mj-ea"/>
                   <a:ea typeface="+mj-ea"/>
                 </a:rPr>
                 <a:t>각 </a:t>
               </a:r>
               <a:r>
-                <a:rPr lang="en-US" altLang="ko-KR" b="0" dirty="0" smtClean="0">
+                <a:rPr lang="en-US" altLang="ko-KR" sz="1200" b="0" dirty="0" smtClean="0">
                   <a:latin typeface="+mj-ea"/>
                   <a:ea typeface="+mj-ea"/>
                 </a:rPr>
                 <a:t>iteration </a:t>
               </a:r>
               <a:r>
-                <a:rPr lang="ko-KR" altLang="en-US" b="0" dirty="0" smtClean="0">
+                <a:rPr lang="ko-KR" altLang="en-US" sz="1200" b="0" dirty="0" smtClean="0">
                   <a:latin typeface="+mj-ea"/>
                   <a:ea typeface="+mj-ea"/>
                 </a:rPr>
                 <a:t>마다 컴퓨팅 자원 조금 소모</a:t>
               </a:r>
-              <a:endParaRPr lang="en-US" altLang="ko-KR" b="0" dirty="0" smtClean="0">
+              <a:endParaRPr lang="en-US" altLang="ko-KR" sz="1200" b="0" dirty="0" smtClean="0">
                 <a:latin typeface="+mj-ea"/>
                 <a:ea typeface="+mj-ea"/>
               </a:endParaRPr>
@@ -15616,20 +15547,20 @@
                 <a:buChar char="•"/>
               </a:pPr>
               <a:r>
-                <a:rPr lang="ko-KR" altLang="en-US" b="0" dirty="0" err="1" smtClean="0">
+                <a:rPr lang="ko-KR" altLang="en-US" sz="1200" b="0" dirty="0" err="1" smtClean="0">
                   <a:latin typeface="+mj-ea"/>
                   <a:ea typeface="+mj-ea"/>
                 </a:rPr>
                 <a:t>병렬처리에</a:t>
               </a:r>
               <a:r>
-                <a:rPr lang="ko-KR" altLang="en-US" b="0" dirty="0" smtClean="0">
+                <a:rPr lang="ko-KR" altLang="en-US" sz="1200" b="0" dirty="0" smtClean="0">
                   <a:latin typeface="+mj-ea"/>
                   <a:ea typeface="+mj-ea"/>
                 </a:rPr>
                 <a:t> 용이하지 않음</a:t>
               </a:r>
-              <a:endParaRPr lang="en-US" altLang="ko-KR" b="0" dirty="0" smtClean="0">
+              <a:endParaRPr lang="en-US" altLang="ko-KR" sz="1200" b="0" dirty="0" smtClean="0">
                 <a:latin typeface="+mj-ea"/>
                 <a:ea typeface="+mj-ea"/>
               </a:endParaRPr>
@@ -15643,13 +15574,13 @@
                 <a:buChar char="•"/>
               </a:pPr>
               <a:r>
-                <a:rPr lang="ko-KR" altLang="en-US" b="0" dirty="0" smtClean="0">
+                <a:rPr lang="ko-KR" altLang="en-US" sz="1200" b="0" dirty="0" smtClean="0">
                   <a:latin typeface="+mj-ea"/>
                   <a:ea typeface="+mj-ea"/>
                 </a:rPr>
                 <a:t>빠르다</a:t>
               </a:r>
-              <a:endParaRPr lang="en-US" altLang="ko-KR" b="0" dirty="0" smtClean="0">
+              <a:endParaRPr lang="en-US" altLang="ko-KR" sz="1200" b="0" dirty="0" smtClean="0">
                 <a:latin typeface="+mj-ea"/>
                 <a:ea typeface="+mj-ea"/>
               </a:endParaRPr>
@@ -15663,27 +15594,27 @@
                 <a:buChar char="•"/>
               </a:pPr>
               <a:r>
-                <a:rPr lang="ko-KR" altLang="en-US" b="0" dirty="0" smtClean="0">
+                <a:rPr lang="ko-KR" altLang="en-US" sz="1200" b="0" dirty="0" smtClean="0">
                   <a:latin typeface="+mj-ea"/>
                   <a:ea typeface="+mj-ea"/>
                 </a:rPr>
                 <a:t>노이즈가 발생하여 일반화 오류를 </a:t>
               </a:r>
               <a:r>
-                <a:rPr lang="ko-KR" altLang="en-US" b="0" dirty="0" err="1" smtClean="0">
+                <a:rPr lang="ko-KR" altLang="en-US" sz="1200" b="0" dirty="0" err="1" smtClean="0">
                   <a:latin typeface="+mj-ea"/>
                   <a:ea typeface="+mj-ea"/>
                 </a:rPr>
                 <a:t>줄일수</a:t>
               </a:r>
               <a:r>
-                <a:rPr lang="ko-KR" altLang="en-US" b="0" dirty="0" smtClean="0">
+                <a:rPr lang="ko-KR" altLang="en-US" sz="1200" b="0" dirty="0" smtClean="0">
                   <a:latin typeface="+mj-ea"/>
                   <a:ea typeface="+mj-ea"/>
                 </a:rPr>
                 <a:t> 있음</a:t>
               </a:r>
-              <a:endParaRPr lang="en-US" altLang="ko-KR" b="0" dirty="0" smtClean="0">
+              <a:endParaRPr lang="en-US" altLang="ko-KR" sz="1200" b="0" dirty="0" smtClean="0">
                 <a:latin typeface="+mj-ea"/>
                 <a:ea typeface="+mj-ea"/>
               </a:endParaRPr>
@@ -15699,13 +15630,17 @@
         </p:nvSpPr>
         <p:spPr>
           <a:xfrm>
-            <a:off x="1021223" y="5282044"/>
-            <a:ext cx="7632848" cy="523220"/>
+            <a:off x="5313040" y="4281127"/>
+            <a:ext cx="2668321" cy="1754326"/>
           </a:xfrm>
           <a:prstGeom prst="rect">
             <a:avLst/>
           </a:prstGeom>
-          <a:noFill/>
+          <a:solidFill>
+            <a:schemeClr val="bg1">
+              <a:lumMod val="95000"/>
+            </a:schemeClr>
+          </a:solidFill>
         </p:spPr>
         <p:txBody>
           <a:bodyPr wrap="square" rtlCol="0">
@@ -15713,133 +15648,50 @@
           </a:bodyPr>
           <a:lstStyle/>
           <a:p>
-            <a:r>
-              <a:rPr lang="ko-KR" altLang="en-US" dirty="0" smtClean="0">
+            <a:pPr>
+              <a:lnSpc>
+                <a:spcPct val="150000"/>
+              </a:lnSpc>
+            </a:pPr>
+            <a:r>
+              <a:rPr lang="ko-KR" altLang="en-US" sz="1200" dirty="0" smtClean="0">
                 <a:solidFill>
                   <a:schemeClr val="tx1">
-                    <a:lumMod val="75000"/>
-                    <a:lumOff val="25000"/>
+                    <a:lumMod val="65000"/>
+                    <a:lumOff val="35000"/>
                   </a:schemeClr>
                 </a:solidFill>
                 <a:latin typeface="+mj-ea"/>
                 <a:ea typeface="+mj-ea"/>
               </a:rPr>
-              <a:t>문제에 따라 </a:t>
-            </a:r>
-            <a:r>
-              <a:rPr lang="en-US" altLang="ko-KR" dirty="0" smtClean="0">
+              <a:t> 작은 </a:t>
+            </a:r>
+            <a:r>
+              <a:rPr lang="ko-KR" altLang="en-US" sz="1200" dirty="0">
                 <a:solidFill>
                   <a:schemeClr val="tx1">
-                    <a:lumMod val="75000"/>
-                    <a:lumOff val="25000"/>
+                    <a:lumMod val="65000"/>
+                    <a:lumOff val="35000"/>
                   </a:schemeClr>
                 </a:solidFill>
                 <a:latin typeface="+mj-ea"/>
                 <a:ea typeface="+mj-ea"/>
               </a:rPr>
-              <a:t>batch size </a:t>
-            </a:r>
-            <a:r>
-              <a:rPr lang="ko-KR" altLang="en-US" dirty="0" smtClean="0">
+              <a:t>배치 사이즈를 사용하는 경우 급격하게 학습을 하지만  높은 분산의 형태를 나타내고 큰 배치 사이즈를 사용하는 경우 학습의 속도는 오래 걸리지만 모델이 안정적인 특징을 보인다</a:t>
+            </a:r>
+            <a:r>
+              <a:rPr lang="en-US" altLang="ko-KR" sz="1200" dirty="0">
                 <a:solidFill>
                   <a:schemeClr val="tx1">
-                    <a:lumMod val="75000"/>
-                    <a:lumOff val="25000"/>
+                    <a:lumMod val="65000"/>
+                    <a:lumOff val="35000"/>
                   </a:schemeClr>
                 </a:solidFill>
                 <a:latin typeface="+mj-ea"/>
                 <a:ea typeface="+mj-ea"/>
               </a:rPr>
-              <a:t>가</a:t>
-            </a:r>
-            <a:r>
-              <a:rPr lang="en-US" altLang="ko-KR" dirty="0" smtClean="0">
-                <a:solidFill>
-                  <a:schemeClr val="tx1">
-                    <a:lumMod val="75000"/>
-                    <a:lumOff val="25000"/>
-                  </a:schemeClr>
-                </a:solidFill>
-                <a:latin typeface="+mj-ea"/>
-                <a:ea typeface="+mj-ea"/>
-              </a:rPr>
-              <a:t> </a:t>
-            </a:r>
-            <a:r>
-              <a:rPr lang="ko-KR" altLang="en-US" dirty="0" smtClean="0">
-                <a:solidFill>
-                  <a:schemeClr val="tx1">
-                    <a:lumMod val="75000"/>
-                    <a:lumOff val="25000"/>
-                  </a:schemeClr>
-                </a:solidFill>
-                <a:latin typeface="+mj-ea"/>
-                <a:ea typeface="+mj-ea"/>
-              </a:rPr>
-              <a:t>작용하는 특징은 다르기 때문에 그때그때 적절한 </a:t>
-            </a:r>
-            <a:r>
-              <a:rPr lang="en-US" altLang="ko-KR" dirty="0" smtClean="0">
-                <a:solidFill>
-                  <a:schemeClr val="tx1">
-                    <a:lumMod val="75000"/>
-                    <a:lumOff val="25000"/>
-                  </a:schemeClr>
-                </a:solidFill>
-                <a:latin typeface="+mj-ea"/>
-                <a:ea typeface="+mj-ea"/>
-              </a:rPr>
-              <a:t>batch size</a:t>
-            </a:r>
-            <a:r>
-              <a:rPr lang="ko-KR" altLang="en-US" dirty="0" smtClean="0">
-                <a:solidFill>
-                  <a:schemeClr val="tx1">
-                    <a:lumMod val="75000"/>
-                    <a:lumOff val="25000"/>
-                  </a:schemeClr>
-                </a:solidFill>
-                <a:latin typeface="+mj-ea"/>
-                <a:ea typeface="+mj-ea"/>
-              </a:rPr>
-              <a:t>를 선정하는 것이 중요하다</a:t>
-            </a:r>
-            <a:r>
-              <a:rPr lang="en-US" altLang="ko-KR" dirty="0" smtClean="0">
-                <a:solidFill>
-                  <a:schemeClr val="tx1">
-                    <a:lumMod val="75000"/>
-                    <a:lumOff val="25000"/>
-                  </a:schemeClr>
-                </a:solidFill>
-                <a:latin typeface="+mj-ea"/>
-                <a:ea typeface="+mj-ea"/>
-              </a:rPr>
               <a:t>.</a:t>
             </a:r>
-            <a:r>
-              <a:rPr lang="ko-KR" altLang="en-US" dirty="0" smtClean="0">
-                <a:solidFill>
-                  <a:schemeClr val="tx1">
-                    <a:lumMod val="75000"/>
-                    <a:lumOff val="25000"/>
-                  </a:schemeClr>
-                </a:solidFill>
-                <a:latin typeface="+mj-ea"/>
-                <a:ea typeface="+mj-ea"/>
-              </a:rPr>
-              <a:t> </a:t>
-            </a:r>
-            <a:endParaRPr lang="ko-KR" altLang="en-US" dirty="0">
-              <a:solidFill>
-                <a:schemeClr val="tx1">
-                  <a:lumMod val="75000"/>
-                  <a:lumOff val="25000"/>
-                </a:schemeClr>
-              </a:solidFill>
-              <a:latin typeface="+mj-ea"/>
-              <a:ea typeface="+mj-ea"/>
-            </a:endParaRPr>
           </a:p>
         </p:txBody>
       </p:sp>
@@ -15852,6 +15704,200 @@
         <p:spPr>
           <a:xfrm>
             <a:off x="0" y="7029400"/>
+            <a:ext cx="4953000" cy="2246769"/>
+          </a:xfrm>
+          <a:prstGeom prst="rect">
+            <a:avLst/>
+          </a:prstGeom>
+        </p:spPr>
+        <p:txBody>
+          <a:bodyPr>
+            <a:spAutoFit/>
+          </a:bodyPr>
+          <a:lstStyle/>
+          <a:p>
+            <a:r>
+              <a:rPr lang="en-US" altLang="ko-KR" dirty="0">
+                <a:latin typeface="+mj-ea"/>
+                <a:ea typeface="+mj-ea"/>
+                <a:hlinkClick r:id="rId2"/>
+              </a:rPr>
+              <a:t>https://blog.lunit.io/2018/08/03/batch-size-in-deep-learning</a:t>
+            </a:r>
+            <a:r>
+              <a:rPr lang="en-US" altLang="ko-KR" dirty="0" smtClean="0">
+                <a:latin typeface="+mj-ea"/>
+                <a:ea typeface="+mj-ea"/>
+                <a:hlinkClick r:id="rId2"/>
+              </a:rPr>
+              <a:t>/</a:t>
+            </a:r>
+            <a:endParaRPr lang="en-US" altLang="ko-KR" dirty="0" smtClean="0">
+              <a:latin typeface="+mj-ea"/>
+              <a:ea typeface="+mj-ea"/>
+            </a:endParaRPr>
+          </a:p>
+          <a:p>
+            <a:endParaRPr lang="en-US" altLang="ko-KR" dirty="0">
+              <a:latin typeface="+mj-ea"/>
+              <a:ea typeface="+mj-ea"/>
+            </a:endParaRPr>
+          </a:p>
+          <a:p>
+            <a:r>
+              <a:rPr lang="en-US" altLang="ko-KR" dirty="0">
+                <a:latin typeface="+mj-ea"/>
+                <a:ea typeface="+mj-ea"/>
+                <a:hlinkClick r:id="rId3"/>
+              </a:rPr>
+              <a:t>https://</a:t>
+            </a:r>
+            <a:r>
+              <a:rPr lang="en-US" altLang="ko-KR" dirty="0" smtClean="0">
+                <a:latin typeface="+mj-ea"/>
+                <a:ea typeface="+mj-ea"/>
+                <a:hlinkClick r:id="rId3"/>
+              </a:rPr>
+              <a:t>stats.stackexchange.com/questions/153531/what-is-batch-size-in-neural-network</a:t>
+            </a:r>
+            <a:endParaRPr lang="en-US" altLang="ko-KR" dirty="0" smtClean="0">
+              <a:latin typeface="+mj-ea"/>
+              <a:ea typeface="+mj-ea"/>
+            </a:endParaRPr>
+          </a:p>
+          <a:p>
+            <a:endParaRPr lang="en-US" altLang="ko-KR" dirty="0">
+              <a:latin typeface="+mj-ea"/>
+              <a:ea typeface="+mj-ea"/>
+            </a:endParaRPr>
+          </a:p>
+          <a:p>
+            <a:r>
+              <a:rPr lang="en-US" altLang="ko-KR" dirty="0">
+                <a:hlinkClick r:id="rId4"/>
+              </a:rPr>
+              <a:t>https://machinelearningmastery.com/how-to-control-the-speed-and-stability-of-training-neural-networks-with-gradient-descent-batch-size/</a:t>
+            </a:r>
+            <a:endParaRPr lang="ko-KR" altLang="en-US" dirty="0">
+              <a:latin typeface="+mj-ea"/>
+              <a:ea typeface="+mj-ea"/>
+            </a:endParaRPr>
+          </a:p>
+          <a:p>
+            <a:endParaRPr lang="en-US" altLang="ko-KR" dirty="0">
+              <a:latin typeface="+mj-ea"/>
+              <a:ea typeface="+mj-ea"/>
+            </a:endParaRPr>
+          </a:p>
+        </p:txBody>
+      </p:sp>
+      <p:sp>
+        <p:nvSpPr>
+          <p:cNvPr id="23" name="직사각형 22"/>
+          <p:cNvSpPr/>
+          <p:nvPr/>
+        </p:nvSpPr>
+        <p:spPr>
+          <a:xfrm>
+            <a:off x="9959806" y="2476053"/>
+            <a:ext cx="5616624" cy="1384995"/>
+          </a:xfrm>
+          <a:prstGeom prst="rect">
+            <a:avLst/>
+          </a:prstGeom>
+        </p:spPr>
+        <p:txBody>
+          <a:bodyPr wrap="square">
+            <a:spAutoFit/>
+          </a:bodyPr>
+          <a:lstStyle/>
+          <a:p>
+            <a:pPr>
+              <a:buFont typeface="Arial" panose="020B0604020202020204" pitchFamily="34" charset="0"/>
+              <a:buChar char="•"/>
+            </a:pPr>
+            <a:r>
+              <a:rPr lang="en-US" altLang="ko-KR" b="0" dirty="0">
+                <a:solidFill>
+                  <a:srgbClr val="555555"/>
+                </a:solidFill>
+                <a:latin typeface="+mj-ea"/>
+                <a:ea typeface="+mj-ea"/>
+              </a:rPr>
+              <a:t>Batch size controls the accuracy of the estimate of the error gradient when training neural networks.</a:t>
+            </a:r>
+          </a:p>
+          <a:p>
+            <a:pPr>
+              <a:buFont typeface="Arial" panose="020B0604020202020204" pitchFamily="34" charset="0"/>
+              <a:buChar char="•"/>
+            </a:pPr>
+            <a:r>
+              <a:rPr lang="en-US" altLang="ko-KR" b="0" dirty="0">
+                <a:solidFill>
+                  <a:srgbClr val="555555"/>
+                </a:solidFill>
+                <a:latin typeface="+mj-ea"/>
+                <a:ea typeface="+mj-ea"/>
+              </a:rPr>
+              <a:t>Batch, Stochastic, and </a:t>
+            </a:r>
+            <a:r>
+              <a:rPr lang="en-US" altLang="ko-KR" b="0" dirty="0" err="1">
+                <a:solidFill>
+                  <a:srgbClr val="555555"/>
+                </a:solidFill>
+                <a:latin typeface="+mj-ea"/>
+                <a:ea typeface="+mj-ea"/>
+              </a:rPr>
+              <a:t>Minibatch</a:t>
+            </a:r>
+            <a:r>
+              <a:rPr lang="en-US" altLang="ko-KR" b="0" dirty="0">
+                <a:solidFill>
+                  <a:srgbClr val="555555"/>
+                </a:solidFill>
+                <a:latin typeface="+mj-ea"/>
+                <a:ea typeface="+mj-ea"/>
+              </a:rPr>
+              <a:t> gradient descent are the three main flavors of the learning algorithm.</a:t>
+            </a:r>
+          </a:p>
+          <a:p>
+            <a:pPr>
+              <a:buFont typeface="Arial" panose="020B0604020202020204" pitchFamily="34" charset="0"/>
+              <a:buChar char="•"/>
+            </a:pPr>
+            <a:r>
+              <a:rPr lang="en-US" altLang="ko-KR" b="0" dirty="0">
+                <a:solidFill>
+                  <a:srgbClr val="555555"/>
+                </a:solidFill>
+                <a:latin typeface="+mj-ea"/>
+                <a:ea typeface="+mj-ea"/>
+              </a:rPr>
+              <a:t>There is a tension between batch size and the speed and stability of the learning process.</a:t>
+            </a:r>
+            <a:endParaRPr lang="en-US" altLang="ko-KR" b="0" i="0" dirty="0">
+              <a:solidFill>
+                <a:srgbClr val="555555"/>
+              </a:solidFill>
+              <a:effectLst/>
+              <a:latin typeface="+mj-ea"/>
+              <a:ea typeface="+mj-ea"/>
+            </a:endParaRPr>
+          </a:p>
+        </p:txBody>
+      </p:sp>
+      <p:sp>
+        <p:nvSpPr>
+          <p:cNvPr id="24" name="직사각형 23"/>
+          <p:cNvSpPr/>
+          <p:nvPr/>
+        </p:nvSpPr>
+        <p:spPr>
+          <a:xfrm>
+            <a:off x="9993995" y="3897049"/>
             <a:ext cx="4953000" cy="1384995"/>
           </a:xfrm>
           <a:prstGeom prst="rect">
@@ -15864,81 +15910,21 @@
           </a:bodyPr>
           <a:lstStyle/>
           <a:p>
-            <a:r>
-              <a:rPr lang="en-US" altLang="ko-KR" dirty="0">
-                <a:latin typeface="+mj-ea"/>
-                <a:ea typeface="+mj-ea"/>
-                <a:hlinkClick r:id="rId2"/>
-              </a:rPr>
-              <a:t>https://blog.lunit.io/2018/08/03/batch-size-in-deep-learning</a:t>
-            </a:r>
-            <a:r>
-              <a:rPr lang="en-US" altLang="ko-KR" dirty="0" smtClean="0">
-                <a:latin typeface="+mj-ea"/>
-                <a:ea typeface="+mj-ea"/>
-                <a:hlinkClick r:id="rId2"/>
-              </a:rPr>
-              <a:t>/</a:t>
-            </a:r>
-            <a:endParaRPr lang="en-US" altLang="ko-KR" dirty="0" smtClean="0">
-              <a:latin typeface="+mj-ea"/>
-              <a:ea typeface="+mj-ea"/>
-            </a:endParaRPr>
-          </a:p>
-          <a:p>
-            <a:endParaRPr lang="en-US" altLang="ko-KR" dirty="0">
-              <a:latin typeface="+mj-ea"/>
-              <a:ea typeface="+mj-ea"/>
-            </a:endParaRPr>
-          </a:p>
-          <a:p>
-            <a:r>
-              <a:rPr lang="en-US" altLang="ko-KR" dirty="0">
-                <a:latin typeface="+mj-ea"/>
-                <a:ea typeface="+mj-ea"/>
-                <a:hlinkClick r:id="rId3"/>
-              </a:rPr>
-              <a:t>https://stats.stackexchange.com/questions/153531/what-is-batch-size-in-neural-network</a:t>
-            </a:r>
-            <a:endParaRPr lang="ko-KR" altLang="en-US" dirty="0">
-              <a:latin typeface="+mj-ea"/>
-              <a:ea typeface="+mj-ea"/>
-            </a:endParaRPr>
-          </a:p>
-          <a:p>
-            <a:endParaRPr lang="en-US" altLang="ko-KR" dirty="0">
-              <a:latin typeface="+mj-ea"/>
-              <a:ea typeface="+mj-ea"/>
-            </a:endParaRPr>
-          </a:p>
-        </p:txBody>
-      </p:sp>
-      <p:sp>
-        <p:nvSpPr>
-          <p:cNvPr id="23" name="직사각형 22"/>
-          <p:cNvSpPr/>
-          <p:nvPr/>
-        </p:nvSpPr>
-        <p:spPr>
-          <a:xfrm>
-            <a:off x="9224963" y="1156677"/>
-            <a:ext cx="5616624" cy="1384995"/>
-          </a:xfrm>
-          <a:prstGeom prst="rect">
-            <a:avLst/>
-          </a:prstGeom>
-        </p:spPr>
-        <p:txBody>
-          <a:bodyPr wrap="square">
-            <a:spAutoFit/>
-          </a:bodyPr>
-          <a:lstStyle/>
-          <a:p>
             <a:pPr>
               <a:buFont typeface="Arial" panose="020B0604020202020204" pitchFamily="34" charset="0"/>
               <a:buChar char="•"/>
             </a:pPr>
             <a:r>
+              <a:rPr lang="en-US" altLang="ko-KR" dirty="0">
+                <a:solidFill>
+                  <a:srgbClr val="555555"/>
+                </a:solidFill>
+                <a:latin typeface="+mj-ea"/>
+                <a:ea typeface="+mj-ea"/>
+              </a:rPr>
+              <a:t>Batch Gradient Descent</a:t>
+            </a:r>
+            <a:r>
               <a:rPr lang="en-US" altLang="ko-KR" b="0" dirty="0">
                 <a:solidFill>
                   <a:srgbClr val="555555"/>
@@ -15946,7 +15932,7 @@
                 <a:latin typeface="+mj-ea"/>
                 <a:ea typeface="+mj-ea"/>
               </a:rPr>
-              <a:t>Batch size controls the accuracy of the estimate of the error gradient when training neural networks.</a:t>
+              <a:t>. Batch size is set to the total number of examples in the training dataset.</a:t>
             </a:r>
           </a:p>
           <a:p>
@@ -15955,6 +15941,16 @@
               <a:buChar char="•"/>
             </a:pPr>
             <a:r>
+              <a:rPr lang="en-US" altLang="ko-KR" dirty="0">
+                <a:solidFill>
+                  <a:srgbClr val="555555"/>
+                </a:solidFill>
+                <a:latin typeface="+mj-ea"/>
+                <a:ea typeface="+mj-ea"/>
+              </a:rPr>
+              <a:t>Stochastic Gradient Descent</a:t>
+            </a:r>
+            <a:r>
               <a:rPr lang="en-US" altLang="ko-KR" b="0" dirty="0">
                 <a:solidFill>
                   <a:srgbClr val="555555"/>
@@ -15962,27 +15958,7 @@
                 <a:latin typeface="+mj-ea"/>
                 <a:ea typeface="+mj-ea"/>
               </a:rPr>
-              <a:t>Batch, Stochastic, and </a:t>
-            </a:r>
-            <a:r>
-              <a:rPr lang="en-US" altLang="ko-KR" b="0" dirty="0" err="1">
-                <a:solidFill>
-                  <a:srgbClr val="555555"/>
-                </a:solidFill>
-                <a:latin typeface="+mj-ea"/>
-                <a:ea typeface="+mj-ea"/>
-              </a:rPr>
-              <a:t>Minibatch</a:t>
-            </a:r>
-            <a:r>
-              <a:rPr lang="en-US" altLang="ko-KR" b="0" dirty="0">
-                <a:solidFill>
-                  <a:srgbClr val="555555"/>
-                </a:solidFill>
-                <a:latin typeface="+mj-ea"/>
-                <a:ea typeface="+mj-ea"/>
-              </a:rPr>
-              <a:t> gradient descent are the three main flavors of the learning algorithm.</a:t>
+              <a:t>. Batch size is set to one.</a:t>
             </a:r>
           </a:p>
           <a:p>
@@ -15991,6 +15967,26 @@
               <a:buChar char="•"/>
             </a:pPr>
             <a:r>
+              <a:rPr lang="en-US" altLang="ko-KR" dirty="0" err="1">
+                <a:solidFill>
+                  <a:srgbClr val="555555"/>
+                </a:solidFill>
+                <a:latin typeface="+mj-ea"/>
+                <a:ea typeface="+mj-ea"/>
+              </a:rPr>
+              <a:t>Minibatch</a:t>
+            </a:r>
+            <a:r>
+              <a:rPr lang="en-US" altLang="ko-KR" dirty="0">
+                <a:solidFill>
+                  <a:srgbClr val="555555"/>
+                </a:solidFill>
+                <a:latin typeface="+mj-ea"/>
+                <a:ea typeface="+mj-ea"/>
+              </a:rPr>
+              <a:t> Gradient Descent</a:t>
+            </a:r>
+            <a:r>
               <a:rPr lang="en-US" altLang="ko-KR" b="0" dirty="0">
                 <a:solidFill>
                   <a:srgbClr val="555555"/>
@@ -15998,7 +15994,7 @@
                 <a:latin typeface="+mj-ea"/>
                 <a:ea typeface="+mj-ea"/>
               </a:rPr>
-              <a:t>There is a tension between batch size and the speed and stability of the learning process.</a:t>
+              <a:t>. Batch size is set to more than one and less than the total number of examples in the training dataset.</a:t>
             </a:r>
             <a:endParaRPr lang="en-US" altLang="ko-KR" b="0" i="0" dirty="0">
               <a:solidFill>
@@ -16011,124 +16007,30 @@
           </a:p>
         </p:txBody>
       </p:sp>
-      <p:sp>
-        <p:nvSpPr>
-          <p:cNvPr id="24" name="직사각형 23"/>
-          <p:cNvSpPr/>
+      <p:pic>
+        <p:nvPicPr>
+          <p:cNvPr id="3" name="그림 2"/>
+          <p:cNvPicPr>
+            <a:picLocks noChangeAspect="1"/>
+          </p:cNvPicPr>
           <p:nvPr/>
-        </p:nvSpPr>
+        </p:nvPicPr>
+        <p:blipFill>
+          <a:blip r:embed="rId5"/>
+          <a:stretch>
+            <a:fillRect/>
+          </a:stretch>
+        </p:blipFill>
         <p:spPr>
           <a:xfrm>
-            <a:off x="9489504" y="3131331"/>
-            <a:ext cx="4953000" cy="1384995"/>
+            <a:off x="1424608" y="3862466"/>
+            <a:ext cx="3550227" cy="2676446"/>
           </a:xfrm>
           <a:prstGeom prst="rect">
             <a:avLst/>
           </a:prstGeom>
         </p:spPr>
-        <p:txBody>
-          <a:bodyPr>
-            <a:spAutoFit/>
-          </a:bodyPr>
-          <a:lstStyle/>
-          <a:p>
-            <a:pPr>
-              <a:buFont typeface="Arial" panose="020B0604020202020204" pitchFamily="34" charset="0"/>
-              <a:buChar char="•"/>
-            </a:pPr>
-            <a:r>
-              <a:rPr lang="en-US" altLang="ko-KR" dirty="0">
-                <a:solidFill>
-                  <a:srgbClr val="555555"/>
-                </a:solidFill>
-                <a:latin typeface="+mj-ea"/>
-                <a:ea typeface="+mj-ea"/>
-              </a:rPr>
-              <a:t>Batch Gradient Descent</a:t>
-            </a:r>
-            <a:r>
-              <a:rPr lang="en-US" altLang="ko-KR" b="0" dirty="0">
-                <a:solidFill>
-                  <a:srgbClr val="555555"/>
-                </a:solidFill>
-                <a:latin typeface="+mj-ea"/>
-                <a:ea typeface="+mj-ea"/>
-              </a:rPr>
-              <a:t>. Batch size is set to the total number of examples in the training dataset.</a:t>
-            </a:r>
-          </a:p>
-          <a:p>
-            <a:pPr>
-              <a:buFont typeface="Arial" panose="020B0604020202020204" pitchFamily="34" charset="0"/>
-              <a:buChar char="•"/>
-            </a:pPr>
-            <a:r>
-              <a:rPr lang="en-US" altLang="ko-KR" dirty="0">
-                <a:solidFill>
-                  <a:srgbClr val="555555"/>
-                </a:solidFill>
-                <a:latin typeface="+mj-ea"/>
-                <a:ea typeface="+mj-ea"/>
-              </a:rPr>
-              <a:t>Stochastic Gradient Descent</a:t>
-            </a:r>
-            <a:r>
-              <a:rPr lang="en-US" altLang="ko-KR" b="0" dirty="0">
-                <a:solidFill>
-                  <a:srgbClr val="555555"/>
-                </a:solidFill>
-                <a:latin typeface="+mj-ea"/>
-                <a:ea typeface="+mj-ea"/>
-              </a:rPr>
-              <a:t>. Batch size is set to one.</a:t>
-            </a:r>
-          </a:p>
-          <a:p>
-            <a:pPr>
-              <a:buFont typeface="Arial" panose="020B0604020202020204" pitchFamily="34" charset="0"/>
-              <a:buChar char="•"/>
-            </a:pPr>
-            <a:r>
-              <a:rPr lang="en-US" altLang="ko-KR" dirty="0" err="1">
-                <a:solidFill>
-                  <a:srgbClr val="555555"/>
-                </a:solidFill>
-                <a:latin typeface="+mj-ea"/>
-                <a:ea typeface="+mj-ea"/>
-              </a:rPr>
-              <a:t>Minibatch</a:t>
-            </a:r>
-            <a:r>
-              <a:rPr lang="en-US" altLang="ko-KR" dirty="0">
-                <a:solidFill>
-                  <a:srgbClr val="555555"/>
-                </a:solidFill>
-                <a:latin typeface="+mj-ea"/>
-                <a:ea typeface="+mj-ea"/>
-              </a:rPr>
-              <a:t> Gradient Descent</a:t>
-            </a:r>
-            <a:r>
-              <a:rPr lang="en-US" altLang="ko-KR" b="0" dirty="0">
-                <a:solidFill>
-                  <a:srgbClr val="555555"/>
-                </a:solidFill>
-                <a:latin typeface="+mj-ea"/>
-                <a:ea typeface="+mj-ea"/>
-              </a:rPr>
-              <a:t>. Batch size is set to more than one and less than the total number of examples in the training dataset.</a:t>
-            </a:r>
-            <a:endParaRPr lang="en-US" altLang="ko-KR" b="0" i="0" dirty="0">
-              <a:solidFill>
-                <a:srgbClr val="555555"/>
-              </a:solidFill>
-              <a:effectLst/>
-              <a:latin typeface="+mj-ea"/>
-              <a:ea typeface="+mj-ea"/>
-            </a:endParaRPr>
-          </a:p>
-        </p:txBody>
-      </p:sp>
+      </p:pic>
     </p:spTree>
     <p:extLst>
       <p:ext uri="{BB962C8B-B14F-4D97-AF65-F5344CB8AC3E}">
@@ -16175,11 +16077,17 @@
           <a:lstStyle/>
           <a:p>
             <a:fld id="{33796E3F-F6B7-490E-938A-9F8EC05675D0}" type="slidenum">
-              <a:rPr lang="ko-KR" altLang="en-US" smtClean="0"/>
+              <a:rPr lang="ko-KR" altLang="en-US" smtClean="0">
+                <a:latin typeface="+mj-ea"/>
+                <a:ea typeface="+mj-ea"/>
+              </a:rPr>
               <a:pPr/>
               <a:t>16</a:t>
             </a:fld>
-            <a:endParaRPr lang="ko-KR" altLang="en-US"/>
+            <a:endParaRPr lang="ko-KR" altLang="en-US">
+              <a:latin typeface="+mj-ea"/>
+              <a:ea typeface="+mj-ea"/>
+            </a:endParaRPr>
           </a:p>
         </p:txBody>
       </p:sp>
@@ -16371,7 +16279,7 @@
       </p:sp>
       <p:pic>
         <p:nvPicPr>
-          <p:cNvPr id="6" name="그림 5"/>
+          <p:cNvPr id="7" name="그림 6"/>
           <p:cNvPicPr>
             <a:picLocks noChangeAspect="1"/>
           </p:cNvPicPr>
@@ -16385,32 +16293,8 @@
         </p:blipFill>
         <p:spPr>
           <a:xfrm>
-            <a:off x="632520" y="5445224"/>
-            <a:ext cx="5695950" cy="2409825"/>
-          </a:xfrm>
-          <a:prstGeom prst="rect">
-            <a:avLst/>
-          </a:prstGeom>
-        </p:spPr>
-      </p:pic>
-      <p:pic>
-        <p:nvPicPr>
-          <p:cNvPr id="7" name="그림 6"/>
-          <p:cNvPicPr>
-            <a:picLocks noChangeAspect="1"/>
-          </p:cNvPicPr>
-          <p:nvPr/>
-        </p:nvPicPr>
-        <p:blipFill>
-          <a:blip r:embed="rId3"/>
-          <a:stretch>
-            <a:fillRect/>
-          </a:stretch>
-        </p:blipFill>
-        <p:spPr>
-          <a:xfrm>
-            <a:off x="-87560" y="601232"/>
-            <a:ext cx="8439150" cy="3648075"/>
+            <a:off x="1292835" y="1772816"/>
+            <a:ext cx="6974505" cy="3014938"/>
           </a:xfrm>
           <a:prstGeom prst="rect">
             <a:avLst/>
@@ -16425,19 +16309,24 @@
         </p:nvSpPr>
         <p:spPr>
           <a:xfrm>
-            <a:off x="622152" y="4060229"/>
-            <a:ext cx="4953000" cy="1384995"/>
+            <a:off x="848544" y="4856727"/>
+            <a:ext cx="8136904" cy="1061829"/>
           </a:xfrm>
           <a:prstGeom prst="rect">
             <a:avLst/>
           </a:prstGeom>
         </p:spPr>
         <p:txBody>
-          <a:bodyPr>
+          <a:bodyPr wrap="square">
             <a:spAutoFit/>
           </a:bodyPr>
           <a:lstStyle/>
           <a:p>
+            <a:pPr>
+              <a:lnSpc>
+                <a:spcPct val="150000"/>
+              </a:lnSpc>
+            </a:pPr>
             <a:r>
               <a:rPr lang="en-US" altLang="ko-KR" b="0" dirty="0">
                 <a:solidFill>
@@ -16476,7 +16365,37 @@
                 <a:latin typeface="+mj-ea"/>
                 <a:ea typeface="+mj-ea"/>
               </a:rPr>
-              <a:t>를 변화시킨 그래프 </a:t>
+              <a:t>를 변화시킨 </a:t>
+            </a:r>
+            <a:r>
+              <a:rPr lang="ko-KR" altLang="en-US" b="0" dirty="0" smtClean="0">
+                <a:solidFill>
+                  <a:srgbClr val="5D5D5D"/>
+                </a:solidFill>
+                <a:latin typeface="+mj-ea"/>
+                <a:ea typeface="+mj-ea"/>
+              </a:rPr>
+              <a:t>그래프</a:t>
+            </a:r>
+            <a:r>
+              <a:rPr lang="en-US" altLang="ko-KR" b="0" dirty="0" smtClean="0">
+                <a:solidFill>
+                  <a:srgbClr val="5D5D5D"/>
+                </a:solidFill>
+                <a:latin typeface="+mj-ea"/>
+                <a:ea typeface="+mj-ea"/>
+              </a:rPr>
+              <a:t>(</a:t>
+            </a:r>
+            <a:r>
+              <a:rPr lang="ko-KR" altLang="en-US" b="0" dirty="0">
+                <a:solidFill>
+                  <a:srgbClr val="5D5D5D"/>
+                </a:solidFill>
+                <a:latin typeface="+mj-ea"/>
+                <a:ea typeface="+mj-ea"/>
+              </a:rPr>
+              <a:t>왼쪽</a:t>
             </a:r>
             <a:r>
               <a:rPr lang="en-US" altLang="ko-KR" b="0" dirty="0">
@@ -16486,6 +16405,166 @@
                 <a:latin typeface="+mj-ea"/>
                 <a:ea typeface="+mj-ea"/>
               </a:rPr>
+              <a:t>)</a:t>
+            </a:r>
+            <a:r>
+              <a:rPr lang="ko-KR" altLang="en-US" b="0" dirty="0">
+                <a:solidFill>
+                  <a:srgbClr val="5D5D5D"/>
+                </a:solidFill>
+                <a:latin typeface="+mj-ea"/>
+                <a:ea typeface="+mj-ea"/>
+              </a:rPr>
+              <a:t>는 작은 </a:t>
+            </a:r>
+            <a:r>
+              <a:rPr lang="en-US" altLang="ko-KR" b="0" dirty="0">
+                <a:solidFill>
+                  <a:srgbClr val="5D5D5D"/>
+                </a:solidFill>
+                <a:latin typeface="+mj-ea"/>
+                <a:ea typeface="+mj-ea"/>
+              </a:rPr>
+              <a:t>batch size</a:t>
+            </a:r>
+            <a:r>
+              <a:rPr lang="ko-KR" altLang="en-US" b="0" dirty="0">
+                <a:solidFill>
+                  <a:srgbClr val="5D5D5D"/>
+                </a:solidFill>
+                <a:latin typeface="+mj-ea"/>
+                <a:ea typeface="+mj-ea"/>
+              </a:rPr>
+              <a:t>에서 보다 높은 </a:t>
+            </a:r>
+            <a:r>
+              <a:rPr lang="en-US" altLang="ko-KR" b="0" dirty="0">
+                <a:solidFill>
+                  <a:srgbClr val="5D5D5D"/>
+                </a:solidFill>
+                <a:latin typeface="+mj-ea"/>
+                <a:ea typeface="+mj-ea"/>
+              </a:rPr>
+              <a:t>test accuracy</a:t>
+            </a:r>
+            <a:r>
+              <a:rPr lang="ko-KR" altLang="en-US" b="0" dirty="0">
+                <a:solidFill>
+                  <a:srgbClr val="5D5D5D"/>
+                </a:solidFill>
+                <a:latin typeface="+mj-ea"/>
+                <a:ea typeface="+mj-ea"/>
+              </a:rPr>
+              <a:t>를 얻을 수 있음을 </a:t>
+            </a:r>
+            <a:r>
+              <a:rPr lang="ko-KR" altLang="en-US" b="0" dirty="0" smtClean="0">
+                <a:solidFill>
+                  <a:srgbClr val="5D5D5D"/>
+                </a:solidFill>
+                <a:latin typeface="+mj-ea"/>
+                <a:ea typeface="+mj-ea"/>
+              </a:rPr>
+              <a:t>보여준다</a:t>
+            </a:r>
+            <a:r>
+              <a:rPr lang="en-US" altLang="ko-KR" b="0" dirty="0" smtClean="0">
+                <a:solidFill>
+                  <a:srgbClr val="5D5D5D"/>
+                </a:solidFill>
+                <a:latin typeface="+mj-ea"/>
+                <a:ea typeface="+mj-ea"/>
+              </a:rPr>
+              <a:t>. </a:t>
+            </a:r>
+            <a:r>
+              <a:rPr lang="ko-KR" altLang="en-US" b="0" dirty="0" smtClean="0">
+                <a:solidFill>
+                  <a:srgbClr val="5D5D5D"/>
+                </a:solidFill>
+                <a:latin typeface="+mj-ea"/>
+                <a:ea typeface="+mj-ea"/>
+              </a:rPr>
+              <a:t>반대로</a:t>
+            </a:r>
+            <a:r>
+              <a:rPr lang="en-US" altLang="ko-KR" b="0" dirty="0" smtClean="0">
+                <a:solidFill>
+                  <a:srgbClr val="5D5D5D"/>
+                </a:solidFill>
+                <a:latin typeface="+mj-ea"/>
+                <a:ea typeface="+mj-ea"/>
+              </a:rPr>
+              <a:t>,</a:t>
+            </a:r>
+            <a:r>
+              <a:rPr lang="ko-KR" altLang="en-US" b="0" dirty="0" smtClean="0">
+                <a:solidFill>
+                  <a:srgbClr val="5D5D5D"/>
+                </a:solidFill>
+                <a:latin typeface="+mj-ea"/>
+                <a:ea typeface="+mj-ea"/>
+              </a:rPr>
+              <a:t> </a:t>
+            </a:r>
+            <a:r>
+              <a:rPr lang="en-US" altLang="ko-KR" b="0" dirty="0">
+                <a:solidFill>
+                  <a:srgbClr val="5D5D5D"/>
+                </a:solidFill>
+                <a:latin typeface="+mj-ea"/>
+                <a:ea typeface="+mj-ea"/>
+              </a:rPr>
+              <a:t>batch size</a:t>
+            </a:r>
+            <a:r>
+              <a:rPr lang="ko-KR" altLang="en-US" b="0" dirty="0">
+                <a:solidFill>
+                  <a:srgbClr val="5D5D5D"/>
+                </a:solidFill>
+                <a:latin typeface="+mj-ea"/>
+                <a:ea typeface="+mj-ea"/>
+              </a:rPr>
+              <a:t>를 고정하고 </a:t>
+            </a:r>
+            <a:r>
+              <a:rPr lang="en-US" altLang="ko-KR" b="0" dirty="0">
+                <a:solidFill>
+                  <a:srgbClr val="5D5D5D"/>
+                </a:solidFill>
+                <a:latin typeface="+mj-ea"/>
+                <a:ea typeface="+mj-ea"/>
+              </a:rPr>
+              <a:t>learning rate</a:t>
+            </a:r>
+            <a:r>
+              <a:rPr lang="ko-KR" altLang="en-US" b="0" dirty="0">
+                <a:solidFill>
+                  <a:srgbClr val="5D5D5D"/>
+                </a:solidFill>
+                <a:latin typeface="+mj-ea"/>
+                <a:ea typeface="+mj-ea"/>
+              </a:rPr>
+              <a:t>를 변화시킨 </a:t>
+            </a:r>
+            <a:r>
+              <a:rPr lang="ko-KR" altLang="en-US" b="0" dirty="0" smtClean="0">
+                <a:solidFill>
+                  <a:srgbClr val="5D5D5D"/>
+                </a:solidFill>
+                <a:latin typeface="+mj-ea"/>
+                <a:ea typeface="+mj-ea"/>
+              </a:rPr>
+              <a:t>그래프</a:t>
+            </a:r>
+            <a:r>
+              <a:rPr lang="en-US" altLang="ko-KR" b="0" dirty="0" smtClean="0">
+                <a:solidFill>
+                  <a:srgbClr val="5D5D5D"/>
+                </a:solidFill>
+                <a:latin typeface="+mj-ea"/>
+                <a:ea typeface="+mj-ea"/>
+              </a:rPr>
               <a:t>(</a:t>
             </a:r>
             <a:r>
@@ -16496,7 +16575,7 @@
                 <a:latin typeface="+mj-ea"/>
                 <a:ea typeface="+mj-ea"/>
               </a:rPr>
-              <a:t>왼쪽</a:t>
+              <a:t>오른쪽</a:t>
             </a:r>
             <a:r>
               <a:rPr lang="en-US" altLang="ko-KR" b="0" dirty="0">
@@ -16516,7 +16595,7 @@
                 <a:latin typeface="+mj-ea"/>
                 <a:ea typeface="+mj-ea"/>
               </a:rPr>
-              <a:t>는 작은 </a:t>
+              <a:t>를 보면</a:t>
             </a:r>
             <a:r>
               <a:rPr lang="en-US" altLang="ko-KR" b="0" dirty="0">
@@ -16526,7 +16605,7 @@
                 <a:latin typeface="+mj-ea"/>
                 <a:ea typeface="+mj-ea"/>
               </a:rPr>
-              <a:t>batch size</a:t>
+              <a:t>, </a:t>
             </a:r>
             <a:r>
               <a:rPr lang="ko-KR" altLang="en-US" b="0" dirty="0">
@@ -16536,7 +16615,7 @@
                 <a:latin typeface="+mj-ea"/>
                 <a:ea typeface="+mj-ea"/>
               </a:rPr>
-              <a:t>에서 보다 높은 </a:t>
+              <a:t>작은 </a:t>
             </a:r>
             <a:r>
               <a:rPr lang="en-US" altLang="ko-KR" b="0" dirty="0">
@@ -16546,7 +16625,7 @@
                 <a:latin typeface="+mj-ea"/>
                 <a:ea typeface="+mj-ea"/>
               </a:rPr>
-              <a:t>test accuracy</a:t>
+              <a:t>batch</a:t>
             </a:r>
             <a:r>
               <a:rPr lang="ko-KR" altLang="en-US" b="0" dirty="0">
@@ -16556,7 +16635,27 @@
                 <a:latin typeface="+mj-ea"/>
                 <a:ea typeface="+mj-ea"/>
               </a:rPr>
-              <a:t>를 얻을 수 있음을 보여줍니다</a:t>
+              <a:t>를 사용할 경우 더 </a:t>
+            </a:r>
+            <a:r>
+              <a:rPr lang="ko-KR" altLang="en-US" b="0" dirty="0" smtClean="0">
+                <a:solidFill>
+                  <a:srgbClr val="5D5D5D"/>
+                </a:solidFill>
+                <a:latin typeface="+mj-ea"/>
+                <a:ea typeface="+mj-ea"/>
+              </a:rPr>
+              <a:t>큰</a:t>
+            </a:r>
+            <a:r>
+              <a:rPr lang="ko-KR" altLang="en-US" b="0" dirty="0" smtClean="0">
+                <a:solidFill>
+                  <a:srgbClr val="5D5D5D"/>
+                </a:solidFill>
+                <a:latin typeface="+mj-ea"/>
+                <a:ea typeface="+mj-ea"/>
+              </a:rPr>
+              <a:t> </a:t>
             </a:r>
             <a:r>
               <a:rPr lang="en-US" altLang="ko-KR" b="0" dirty="0">
@@ -16566,7 +16665,7 @@
                 <a:latin typeface="+mj-ea"/>
                 <a:ea typeface="+mj-ea"/>
               </a:rPr>
-              <a:t>. </a:t>
+              <a:t>learning rate</a:t>
             </a:r>
             <a:r>
               <a:rPr lang="ko-KR" altLang="en-US" b="0" dirty="0">
@@ -16576,157 +16675,87 @@
                 <a:latin typeface="+mj-ea"/>
                 <a:ea typeface="+mj-ea"/>
               </a:rPr>
-              <a:t>또한 </a:t>
-            </a:r>
-            <a:r>
-              <a:rPr lang="en-US" altLang="ko-KR" b="0" dirty="0">
+              <a:t>에서 안정적인 </a:t>
+            </a:r>
+            <a:r>
+              <a:rPr lang="ko-KR" altLang="en-US" b="0" dirty="0" smtClean="0">
                 <a:solidFill>
                   <a:srgbClr val="5D5D5D"/>
                 </a:solidFill>
                 <a:latin typeface="+mj-ea"/>
                 <a:ea typeface="+mj-ea"/>
               </a:rPr>
-              <a:t>batch size</a:t>
-            </a:r>
-            <a:r>
-              <a:rPr lang="ko-KR" altLang="en-US" b="0" dirty="0">
+              <a:t>학습이 가능하다</a:t>
+            </a:r>
+            <a:r>
+              <a:rPr lang="en-US" altLang="ko-KR" b="0" dirty="0" smtClean="0">
                 <a:solidFill>
                   <a:srgbClr val="5D5D5D"/>
                 </a:solidFill>
                 <a:latin typeface="+mj-ea"/>
                 <a:ea typeface="+mj-ea"/>
               </a:rPr>
-              <a:t>를 고정하고 </a:t>
-            </a:r>
-            <a:r>
-              <a:rPr lang="en-US" altLang="ko-KR" b="0" dirty="0">
-                <a:solidFill>
-                  <a:srgbClr val="5D5D5D"/>
-                </a:solidFill>
-                <a:latin typeface="+mj-ea"/>
-                <a:ea typeface="+mj-ea"/>
-              </a:rPr>
-              <a:t>learning rate</a:t>
-            </a:r>
-            <a:r>
-              <a:rPr lang="ko-KR" altLang="en-US" b="0" dirty="0">
-                <a:solidFill>
-                  <a:srgbClr val="5D5D5D"/>
-                </a:solidFill>
-                <a:latin typeface="+mj-ea"/>
-                <a:ea typeface="+mj-ea"/>
-              </a:rPr>
-              <a:t>를 변화시킨 그래프 </a:t>
-            </a:r>
-            <a:r>
-              <a:rPr lang="en-US" altLang="ko-KR" b="0" dirty="0">
-                <a:solidFill>
-                  <a:srgbClr val="5D5D5D"/>
-                </a:solidFill>
-                <a:latin typeface="+mj-ea"/>
-                <a:ea typeface="+mj-ea"/>
-              </a:rPr>
-              <a:t>(</a:t>
-            </a:r>
-            <a:r>
-              <a:rPr lang="ko-KR" altLang="en-US" b="0" dirty="0">
-                <a:solidFill>
-                  <a:srgbClr val="5D5D5D"/>
-                </a:solidFill>
-                <a:latin typeface="+mj-ea"/>
-                <a:ea typeface="+mj-ea"/>
-              </a:rPr>
-              <a:t>오른쪽</a:t>
-            </a:r>
-            <a:r>
-              <a:rPr lang="en-US" altLang="ko-KR" b="0" dirty="0">
-                <a:solidFill>
-                  <a:srgbClr val="5D5D5D"/>
-                </a:solidFill>
-                <a:latin typeface="+mj-ea"/>
-                <a:ea typeface="+mj-ea"/>
-              </a:rPr>
-              <a:t>)</a:t>
-            </a:r>
-            <a:r>
-              <a:rPr lang="ko-KR" altLang="en-US" b="0" dirty="0">
-                <a:solidFill>
-                  <a:srgbClr val="5D5D5D"/>
-                </a:solidFill>
-                <a:latin typeface="+mj-ea"/>
-                <a:ea typeface="+mj-ea"/>
-              </a:rPr>
-              <a:t>를 보면</a:t>
-            </a:r>
-            <a:r>
-              <a:rPr lang="en-US" altLang="ko-KR" b="0" dirty="0">
-                <a:solidFill>
-                  <a:srgbClr val="5D5D5D"/>
-                </a:solidFill>
-                <a:latin typeface="+mj-ea"/>
-                <a:ea typeface="+mj-ea"/>
-              </a:rPr>
-              <a:t>, </a:t>
-            </a:r>
-            <a:r>
-              <a:rPr lang="ko-KR" altLang="en-US" b="0" dirty="0">
-                <a:solidFill>
-                  <a:srgbClr val="5D5D5D"/>
-                </a:solidFill>
-                <a:latin typeface="+mj-ea"/>
-                <a:ea typeface="+mj-ea"/>
-              </a:rPr>
-              <a:t>작은 </a:t>
-            </a:r>
-            <a:r>
-              <a:rPr lang="en-US" altLang="ko-KR" b="0" dirty="0">
-                <a:solidFill>
-                  <a:srgbClr val="5D5D5D"/>
-                </a:solidFill>
-                <a:latin typeface="+mj-ea"/>
-                <a:ea typeface="+mj-ea"/>
-              </a:rPr>
-              <a:t>batch</a:t>
-            </a:r>
-            <a:r>
-              <a:rPr lang="ko-KR" altLang="en-US" b="0" dirty="0">
-                <a:solidFill>
-                  <a:srgbClr val="5D5D5D"/>
-                </a:solidFill>
-                <a:latin typeface="+mj-ea"/>
-                <a:ea typeface="+mj-ea"/>
-              </a:rPr>
-              <a:t>를 사용할 경우 더 넓은 범위의 </a:t>
-            </a:r>
-            <a:r>
-              <a:rPr lang="en-US" altLang="ko-KR" b="0" dirty="0">
-                <a:solidFill>
-                  <a:srgbClr val="5D5D5D"/>
-                </a:solidFill>
-                <a:latin typeface="+mj-ea"/>
-                <a:ea typeface="+mj-ea"/>
-              </a:rPr>
-              <a:t>learning rate</a:t>
-            </a:r>
-            <a:r>
-              <a:rPr lang="ko-KR" altLang="en-US" b="0" dirty="0">
-                <a:solidFill>
-                  <a:srgbClr val="5D5D5D"/>
-                </a:solidFill>
-                <a:latin typeface="+mj-ea"/>
-                <a:ea typeface="+mj-ea"/>
-              </a:rPr>
-              <a:t>에서 안정적인 학습이 가능함을 알 수 있습니다</a:t>
-            </a:r>
-            <a:r>
-              <a:rPr lang="en-US" altLang="ko-KR" b="0" dirty="0">
-                <a:solidFill>
-                  <a:srgbClr val="5D5D5D"/>
-                </a:solidFill>
-                <a:latin typeface="+mj-ea"/>
-                <a:ea typeface="+mj-ea"/>
-              </a:rPr>
               <a:t>.</a:t>
+            </a:r>
+            <a:endParaRPr lang="ko-KR" altLang="en-US" dirty="0">
+              <a:latin typeface="+mj-ea"/>
+              <a:ea typeface="+mj-ea"/>
+            </a:endParaRPr>
+          </a:p>
+        </p:txBody>
+      </p:sp>
+      <p:sp>
+        <p:nvSpPr>
+          <p:cNvPr id="2" name="직사각형 1"/>
+          <p:cNvSpPr/>
+          <p:nvPr/>
+        </p:nvSpPr>
+        <p:spPr>
+          <a:xfrm>
+            <a:off x="704528" y="987495"/>
+            <a:ext cx="8136904" cy="784830"/>
+          </a:xfrm>
+          <a:prstGeom prst="rect">
+            <a:avLst/>
+          </a:prstGeom>
+        </p:spPr>
+        <p:txBody>
+          <a:bodyPr wrap="square">
+            <a:spAutoFit/>
+          </a:bodyPr>
+          <a:lstStyle/>
+          <a:p>
+            <a:pPr>
+              <a:lnSpc>
+                <a:spcPct val="150000"/>
+              </a:lnSpc>
+            </a:pPr>
+            <a:r>
+              <a:rPr lang="en-US" altLang="ko-KR" sz="1600" dirty="0" smtClean="0">
+                <a:solidFill>
+                  <a:srgbClr val="555555"/>
+                </a:solidFill>
+                <a:latin typeface="+mj-ea"/>
+                <a:ea typeface="+mj-ea"/>
+              </a:rPr>
+              <a:t>Learning Rate</a:t>
+            </a:r>
+          </a:p>
+          <a:p>
+            <a:pPr>
+              <a:lnSpc>
+                <a:spcPct val="150000"/>
+              </a:lnSpc>
+            </a:pPr>
+            <a:r>
+              <a:rPr lang="ko-KR" altLang="en-US" b="0" dirty="0" smtClean="0">
+                <a:solidFill>
+                  <a:srgbClr val="555555"/>
+                </a:solidFill>
+                <a:latin typeface="+mj-ea"/>
+                <a:ea typeface="+mj-ea"/>
+              </a:rPr>
+              <a:t>   모델의 가중치 업데이트마다 추정된 오류에 대해 모델을 변경하는 정도</a:t>
             </a:r>
             <a:endParaRPr lang="ko-KR" altLang="en-US" dirty="0">
               <a:latin typeface="+mj-ea"/>
@@ -17272,7 +17301,7 @@
         </p:nvSpPr>
         <p:spPr>
           <a:xfrm>
-            <a:off x="396438" y="4221088"/>
+            <a:off x="396438" y="4428271"/>
             <a:ext cx="5036823" cy="1708160"/>
           </a:xfrm>
           <a:prstGeom prst="rect">
@@ -17402,7 +17431,7 @@
               <a:t> 성능 평가의 신뢰성이 떨어지는 문제를 해결하기 위해 고안된 방법</a:t>
             </a:r>
             <a:r>
-              <a:rPr lang="en-US" altLang="ko-KR" dirty="0">
+              <a:rPr lang="en-US" altLang="ko-KR" dirty="0" smtClean="0">
                 <a:solidFill>
                   <a:schemeClr val="tx1">
                     <a:lumMod val="65000"/>
@@ -17412,14 +17441,6 @@
               </a:rPr>
               <a:t> </a:t>
             </a:r>
-            <a:endParaRPr lang="en-US" altLang="ko-KR" dirty="0" smtClean="0">
-              <a:solidFill>
-                <a:schemeClr val="tx1">
-                  <a:lumMod val="65000"/>
-                  <a:lumOff val="35000"/>
-                </a:schemeClr>
-              </a:solidFill>
-            </a:endParaRPr>
           </a:p>
           <a:p>
             <a:pPr>
@@ -17494,8 +17515,8 @@
         </p:blipFill>
         <p:spPr>
           <a:xfrm>
-            <a:off x="5505903" y="3192878"/>
-            <a:ext cx="3864387" cy="2973106"/>
+            <a:off x="5825080" y="3924215"/>
+            <a:ext cx="3193708" cy="2457113"/>
           </a:xfrm>
           <a:prstGeom prst="rect">
             <a:avLst/>
@@ -17749,12 +17770,17 @@
         </p:nvSpPr>
         <p:spPr>
           <a:xfrm>
-            <a:off x="396438" y="936011"/>
-            <a:ext cx="3796167" cy="338554"/>
+            <a:off x="396438" y="1927414"/>
+            <a:ext cx="3350725" cy="307777"/>
           </a:xfrm>
           <a:prstGeom prst="rect">
             <a:avLst/>
           </a:prstGeom>
+          <a:solidFill>
+            <a:schemeClr val="bg1">
+              <a:lumMod val="95000"/>
+            </a:schemeClr>
+          </a:solidFill>
         </p:spPr>
         <p:txBody>
           <a:bodyPr wrap="none">
@@ -17763,7 +17789,7 @@
           <a:lstStyle/>
           <a:p>
             <a:r>
-              <a:rPr lang="en-US" altLang="ko-KR" sz="1600" dirty="0" smtClean="0">
+              <a:rPr lang="en-US" altLang="ko-KR" dirty="0" smtClean="0">
                 <a:solidFill>
                   <a:srgbClr val="222222"/>
                 </a:solidFill>
@@ -17772,7 +17798,7 @@
               </a:rPr>
               <a:t>Use a Automatic Verification Dataset</a:t>
             </a:r>
-            <a:endParaRPr lang="en-US" altLang="ko-KR" sz="1600" dirty="0">
+            <a:endParaRPr lang="en-US" altLang="ko-KR" dirty="0">
               <a:solidFill>
                 <a:srgbClr val="222222"/>
               </a:solidFill>
@@ -17790,12 +17816,17 @@
         </p:nvSpPr>
         <p:spPr>
           <a:xfrm>
-            <a:off x="396438" y="1940896"/>
-            <a:ext cx="3514937" cy="338554"/>
+            <a:off x="396438" y="2990897"/>
+            <a:ext cx="3103029" cy="307777"/>
           </a:xfrm>
           <a:prstGeom prst="rect">
             <a:avLst/>
           </a:prstGeom>
+          <a:solidFill>
+            <a:schemeClr val="bg1">
+              <a:lumMod val="95000"/>
+            </a:schemeClr>
+          </a:solidFill>
         </p:spPr>
         <p:txBody>
           <a:bodyPr wrap="none">
@@ -17804,7 +17835,7 @@
           <a:lstStyle/>
           <a:p>
             <a:r>
-              <a:rPr lang="en-US" altLang="ko-KR" sz="1600" dirty="0" smtClean="0">
+              <a:rPr lang="en-US" altLang="ko-KR" dirty="0" smtClean="0">
                 <a:solidFill>
                   <a:srgbClr val="222222"/>
                 </a:solidFill>
@@ -17813,7 +17844,7 @@
               </a:rPr>
               <a:t>Use a Manual Verification Dataset</a:t>
             </a:r>
-            <a:endParaRPr lang="en-US" altLang="ko-KR" sz="1600" dirty="0">
+            <a:endParaRPr lang="en-US" altLang="ko-KR" dirty="0">
               <a:solidFill>
                 <a:srgbClr val="222222"/>
               </a:solidFill>
@@ -17831,12 +17862,17 @@
         </p:nvSpPr>
         <p:spPr>
           <a:xfrm>
-            <a:off x="396438" y="3789040"/>
-            <a:ext cx="2432333" cy="338554"/>
+            <a:off x="396438" y="4057327"/>
+            <a:ext cx="2152384" cy="307777"/>
           </a:xfrm>
           <a:prstGeom prst="rect">
             <a:avLst/>
           </a:prstGeom>
+          <a:solidFill>
+            <a:schemeClr val="bg1">
+              <a:lumMod val="95000"/>
+            </a:schemeClr>
+          </a:solidFill>
         </p:spPr>
         <p:txBody>
           <a:bodyPr wrap="none">
@@ -17845,7 +17881,7 @@
           <a:lstStyle/>
           <a:p>
             <a:r>
-              <a:rPr lang="en-US" altLang="ko-KR" sz="1600" dirty="0">
+              <a:rPr lang="en-US" altLang="ko-KR" dirty="0">
                 <a:solidFill>
                   <a:srgbClr val="222222"/>
                 </a:solidFill>
@@ -17865,7 +17901,7 @@
         </p:nvGrpSpPr>
         <p:grpSpPr>
           <a:xfrm>
-            <a:off x="2792760" y="1340768"/>
+            <a:off x="2792760" y="2329665"/>
             <a:ext cx="5229225" cy="533400"/>
             <a:chOff x="3995738" y="1488293"/>
             <a:chExt cx="5229225" cy="533400"/>
@@ -17950,7 +17986,7 @@
         </p:nvGrpSpPr>
         <p:grpSpPr>
           <a:xfrm>
-            <a:off x="2751117" y="2429501"/>
+            <a:off x="2751117" y="3418398"/>
             <a:ext cx="5246881" cy="514658"/>
             <a:chOff x="4016896" y="2122254"/>
             <a:chExt cx="5246881" cy="514658"/>
@@ -18026,6 +18062,156 @@
           </p:txBody>
         </p:sp>
       </p:grpSp>
+      <p:sp>
+        <p:nvSpPr>
+          <p:cNvPr id="18" name="Rectangle 41">
+            <a:extLst>
+              <a:ext uri="{FF2B5EF4-FFF2-40B4-BE49-F238E27FC236}">
+                <a16:creationId xmlns:a16="http://schemas.microsoft.com/office/drawing/2014/main" id="{83FF4C79-FD07-4B45-A74F-F47818CE5E37}"/>
+              </a:ext>
+            </a:extLst>
+          </p:cNvPr>
+          <p:cNvSpPr>
+            <a:spLocks noChangeArrowheads="1"/>
+          </p:cNvSpPr>
+          <p:nvPr/>
+        </p:nvSpPr>
+        <p:spPr bwMode="auto">
+          <a:xfrm>
+            <a:off x="488504" y="980728"/>
+            <a:ext cx="8928992" cy="733678"/>
+          </a:xfrm>
+          <a:prstGeom prst="rect">
+            <a:avLst/>
+          </a:prstGeom>
+          <a:noFill/>
+          <a:ln w="9525" algn="ctr">
+            <a:noFill/>
+            <a:miter lim="800000"/>
+            <a:headEnd/>
+            <a:tailEnd/>
+          </a:ln>
+          <a:effectLst/>
+        </p:spPr>
+        <p:txBody>
+          <a:bodyPr lIns="72000" tIns="0" rIns="0" bIns="0" anchor="t"/>
+          <a:lstStyle/>
+          <a:p>
+            <a:pPr latinLnBrk="0">
+              <a:lnSpc>
+                <a:spcPct val="150000"/>
+              </a:lnSpc>
+            </a:pPr>
+            <a:r>
+              <a:rPr lang="ko-KR" altLang="en-US" sz="1600" dirty="0">
+                <a:latin typeface="+mj-ea"/>
+                <a:ea typeface="+mj-ea"/>
+              </a:rPr>
+              <a:t>모델 학습 시 </a:t>
+            </a:r>
+            <a:r>
+              <a:rPr lang="en-US" altLang="ko-KR" sz="1600" dirty="0">
+                <a:latin typeface="+mj-ea"/>
+                <a:ea typeface="+mj-ea"/>
+              </a:rPr>
+              <a:t>validation data</a:t>
+            </a:r>
+            <a:r>
+              <a:rPr lang="ko-KR" altLang="en-US" sz="1600" dirty="0">
+                <a:latin typeface="+mj-ea"/>
+                <a:ea typeface="+mj-ea"/>
+              </a:rPr>
+              <a:t>를 자동으로 만들거나</a:t>
+            </a:r>
+            <a:r>
+              <a:rPr lang="en-US" altLang="ko-KR" sz="1600" dirty="0">
+                <a:latin typeface="+mj-ea"/>
+                <a:ea typeface="+mj-ea"/>
+              </a:rPr>
+              <a:t>, </a:t>
+            </a:r>
+            <a:r>
+              <a:rPr lang="ko-KR" altLang="en-US" sz="1600" dirty="0">
+                <a:latin typeface="+mj-ea"/>
+                <a:ea typeface="+mj-ea"/>
+              </a:rPr>
+              <a:t>만들어진 데이터를 입력하여 모델 평가에 사용한다</a:t>
+            </a:r>
+            <a:r>
+              <a:rPr lang="en-US" altLang="ko-KR" sz="1600" dirty="0" smtClean="0">
+                <a:latin typeface="+mj-ea"/>
+                <a:ea typeface="+mj-ea"/>
+              </a:rPr>
+              <a:t>. </a:t>
+            </a:r>
+            <a:r>
+              <a:rPr lang="ko-KR" altLang="en-US" sz="1600" dirty="0" smtClean="0">
+                <a:latin typeface="+mj-ea"/>
+                <a:ea typeface="+mj-ea"/>
+              </a:rPr>
+              <a:t>또는 </a:t>
+            </a:r>
+            <a:r>
+              <a:rPr lang="en-US" altLang="ko-KR" sz="1600" dirty="0">
+                <a:solidFill>
+                  <a:srgbClr val="222222"/>
+                </a:solidFill>
+                <a:latin typeface="+mj-ea"/>
+                <a:ea typeface="+mj-ea"/>
+              </a:rPr>
+              <a:t>k-Fold Cross </a:t>
+            </a:r>
+            <a:r>
+              <a:rPr lang="en-US" altLang="ko-KR" sz="1600" dirty="0" smtClean="0">
+                <a:solidFill>
+                  <a:srgbClr val="222222"/>
+                </a:solidFill>
+                <a:latin typeface="+mj-ea"/>
+                <a:ea typeface="+mj-ea"/>
+              </a:rPr>
+              <a:t>Validation</a:t>
+            </a:r>
+            <a:r>
+              <a:rPr lang="ko-KR" altLang="en-US" sz="1600" dirty="0" smtClean="0">
+                <a:solidFill>
+                  <a:srgbClr val="222222"/>
+                </a:solidFill>
+                <a:latin typeface="+mj-ea"/>
+                <a:ea typeface="+mj-ea"/>
+              </a:rPr>
+              <a:t>을 통해서 모델에 대한 평가를 할 수도 있다</a:t>
+            </a:r>
+            <a:r>
+              <a:rPr lang="en-US" altLang="ko-KR" sz="1600" dirty="0" smtClean="0">
+                <a:solidFill>
+                  <a:srgbClr val="222222"/>
+                </a:solidFill>
+                <a:latin typeface="+mj-ea"/>
+                <a:ea typeface="+mj-ea"/>
+              </a:rPr>
+              <a:t>.</a:t>
+            </a:r>
+            <a:endParaRPr lang="en-US" altLang="ko-KR" sz="1600" dirty="0">
+              <a:solidFill>
+                <a:srgbClr val="222222"/>
+              </a:solidFill>
+              <a:latin typeface="+mj-ea"/>
+              <a:ea typeface="+mj-ea"/>
+            </a:endParaRPr>
+          </a:p>
+          <a:p>
+            <a:pPr latinLnBrk="0">
+              <a:lnSpc>
+                <a:spcPct val="150000"/>
+              </a:lnSpc>
+            </a:pPr>
+            <a:endParaRPr lang="en-US" altLang="ko-KR" sz="1600" dirty="0">
+              <a:latin typeface="+mj-ea"/>
+              <a:ea typeface="+mj-ea"/>
+            </a:endParaRPr>
+          </a:p>
+        </p:txBody>
+      </p:sp>
     </p:spTree>
     <p:extLst>
       <p:ext uri="{BB962C8B-B14F-4D97-AF65-F5344CB8AC3E}">
@@ -22744,6 +22930,7 @@
                   <a:schemeClr val="bg1"/>
                 </a:solidFill>
                 <a:latin typeface="+mj-ea"/>
+                <a:ea typeface="+mj-ea"/>
                 <a:sym typeface="Wingdings" pitchFamily="2" charset="2"/>
               </a:rPr>
               <a:t>Vanishing Gradient </a:t>
@@ -22754,6 +22941,7 @@
                   <a:schemeClr val="bg1"/>
                 </a:solidFill>
                 <a:latin typeface="+mj-ea"/>
+                <a:ea typeface="+mj-ea"/>
                 <a:sym typeface="Wingdings" pitchFamily="2" charset="2"/>
               </a:rPr>
               <a:t>해결 방법 </a:t>
@@ -22764,6 +22952,7 @@
                   <a:schemeClr val="bg1"/>
                 </a:solidFill>
                 <a:latin typeface="+mj-ea"/>
+                <a:ea typeface="+mj-ea"/>
                 <a:sym typeface="Wingdings" pitchFamily="2" charset="2"/>
               </a:rPr>
               <a:t>- </a:t>

</xml_diff>